<commit_message>
Updated text in presentation and code for good example page.
</commit_message>
<xml_diff>
--- a/Presenations/2023 Presentations/2023_Accessibility Testing.pptx
+++ b/Presenations/2023 Presentations/2023_Accessibility Testing.pptx
@@ -2620,8 +2620,8 @@
       </dsp:nvSpPr>
       <dsp:spPr>
         <a:xfrm>
-          <a:off x="0" y="25312"/>
-          <a:ext cx="7374467" cy="1228500"/>
+          <a:off x="0" y="30330"/>
+          <a:ext cx="7374467" cy="1223235"/>
         </a:xfrm>
         <a:prstGeom prst="roundRect">
           <a:avLst/>
@@ -2659,12 +2659,12 @@
         </a:fontRef>
       </dsp:style>
       <dsp:txBody>
-        <a:bodyPr spcFirstLastPara="0" vert="horz" wrap="square" lIns="190500" tIns="190500" rIns="190500" bIns="190500" numCol="1" spcCol="1270" anchor="ctr" anchorCtr="0">
+        <a:bodyPr spcFirstLastPara="0" vert="horz" wrap="square" lIns="194310" tIns="194310" rIns="194310" bIns="194310" numCol="1" spcCol="1270" anchor="ctr" anchorCtr="0">
           <a:noAutofit/>
         </a:bodyPr>
         <a:lstStyle/>
         <a:p>
-          <a:pPr marL="0" lvl="0" indent="0" algn="l" defTabSz="2222500">
+          <a:pPr marL="0" lvl="0" indent="0" algn="l" defTabSz="2266950">
             <a:lnSpc>
               <a:spcPct val="90000"/>
             </a:lnSpc>
@@ -2677,15 +2677,15 @@
             <a:buNone/>
           </a:pPr>
           <a:r>
-            <a:rPr lang="en-US" sz="5000" b="1" kern="1200" dirty="0"/>
+            <a:rPr lang="en-US" sz="5100" b="1" kern="1200" dirty="0"/>
             <a:t>Accessibility</a:t>
           </a:r>
-          <a:endParaRPr lang="en-US" sz="5000" kern="1200" dirty="0"/>
+          <a:endParaRPr lang="en-US" sz="5100" kern="1200" dirty="0"/>
         </a:p>
       </dsp:txBody>
       <dsp:txXfrm>
-        <a:off x="59970" y="85282"/>
-        <a:ext cx="7254527" cy="1108560"/>
+        <a:off x="59713" y="90043"/>
+        <a:ext cx="7255041" cy="1103809"/>
       </dsp:txXfrm>
     </dsp:sp>
     <dsp:sp modelId="{5F5B2010-9F7C-4F85-BA19-0E749BF12EAC}">
@@ -2695,8 +2695,8 @@
       </dsp:nvSpPr>
       <dsp:spPr>
         <a:xfrm>
-          <a:off x="0" y="1397812"/>
-          <a:ext cx="7374467" cy="1228500"/>
+          <a:off x="0" y="1400445"/>
+          <a:ext cx="7374467" cy="1223235"/>
         </a:xfrm>
         <a:prstGeom prst="roundRect">
           <a:avLst/>
@@ -2734,12 +2734,12 @@
         </a:fontRef>
       </dsp:style>
       <dsp:txBody>
-        <a:bodyPr spcFirstLastPara="0" vert="horz" wrap="square" lIns="190500" tIns="190500" rIns="190500" bIns="190500" numCol="1" spcCol="1270" anchor="ctr" anchorCtr="0">
+        <a:bodyPr spcFirstLastPara="0" vert="horz" wrap="square" lIns="194310" tIns="194310" rIns="194310" bIns="194310" numCol="1" spcCol="1270" anchor="ctr" anchorCtr="0">
           <a:noAutofit/>
         </a:bodyPr>
         <a:lstStyle/>
         <a:p>
-          <a:pPr marL="0" lvl="0" indent="0" algn="l" defTabSz="2222500">
+          <a:pPr marL="0" lvl="0" indent="0" algn="l" defTabSz="2266950">
             <a:lnSpc>
               <a:spcPct val="90000"/>
             </a:lnSpc>
@@ -2752,15 +2752,15 @@
             <a:buNone/>
           </a:pPr>
           <a:r>
-            <a:rPr lang="en-US" sz="5000" b="1" kern="1200" dirty="0"/>
+            <a:rPr lang="en-US" sz="5100" b="1" kern="1200" dirty="0"/>
             <a:t>Disability</a:t>
           </a:r>
-          <a:endParaRPr lang="en-US" sz="5000" kern="1200" dirty="0"/>
+          <a:endParaRPr lang="en-US" sz="5100" kern="1200" dirty="0"/>
         </a:p>
       </dsp:txBody>
       <dsp:txXfrm>
-        <a:off x="59970" y="1457782"/>
-        <a:ext cx="7254527" cy="1108560"/>
+        <a:off x="59713" y="1460158"/>
+        <a:ext cx="7255041" cy="1103809"/>
       </dsp:txXfrm>
     </dsp:sp>
     <dsp:sp modelId="{06F41BA6-3DBC-4621-BDD3-1D5CA7FD9296}">
@@ -2770,8 +2770,8 @@
       </dsp:nvSpPr>
       <dsp:spPr>
         <a:xfrm>
-          <a:off x="0" y="2770312"/>
-          <a:ext cx="7374467" cy="1228500"/>
+          <a:off x="0" y="2770559"/>
+          <a:ext cx="7374467" cy="1223235"/>
         </a:xfrm>
         <a:prstGeom prst="roundRect">
           <a:avLst/>
@@ -2809,12 +2809,12 @@
         </a:fontRef>
       </dsp:style>
       <dsp:txBody>
-        <a:bodyPr spcFirstLastPara="0" vert="horz" wrap="square" lIns="190500" tIns="190500" rIns="190500" bIns="190500" numCol="1" spcCol="1270" anchor="ctr" anchorCtr="0">
+        <a:bodyPr spcFirstLastPara="0" vert="horz" wrap="square" lIns="194310" tIns="194310" rIns="194310" bIns="194310" numCol="1" spcCol="1270" anchor="ctr" anchorCtr="0">
           <a:noAutofit/>
         </a:bodyPr>
         <a:lstStyle/>
         <a:p>
-          <a:pPr marL="0" lvl="0" indent="0" algn="l" defTabSz="2222500">
+          <a:pPr marL="0" lvl="0" indent="0" algn="l" defTabSz="2266950">
             <a:lnSpc>
               <a:spcPct val="90000"/>
             </a:lnSpc>
@@ -2827,14 +2827,14 @@
             <a:buNone/>
           </a:pPr>
           <a:r>
-            <a:rPr lang="en-US" sz="5000" b="1" kern="1200" dirty="0"/>
+            <a:rPr lang="en-US" sz="5100" b="1" kern="1200" dirty="0"/>
             <a:t>Assistive Technology</a:t>
           </a:r>
         </a:p>
       </dsp:txBody>
       <dsp:txXfrm>
-        <a:off x="59970" y="2830282"/>
-        <a:ext cx="7254527" cy="1108560"/>
+        <a:off x="59713" y="2830272"/>
+        <a:ext cx="7255041" cy="1103809"/>
       </dsp:txXfrm>
     </dsp:sp>
   </dsp:spTree>
@@ -15270,8 +15270,18 @@
           </a:p>
           <a:p>
             <a:r>
+              <a:rPr lang="en-US"/>
+              <a:t>More likely to be innovative</a:t>
+            </a:r>
+          </a:p>
+          <a:p>
+            <a:r>
+              <a:rPr lang="en-US"/>
+              <a:t>Don’t </a:t>
+            </a:r>
+            <a:r>
               <a:rPr lang="en-US" dirty="0"/>
-              <a:t>Don’t miss out on the market</a:t>
+              <a:t>miss out on the market</a:t>
             </a:r>
           </a:p>
           <a:p>
@@ -15283,12 +15293,6 @@
               <a:t>A Hidden Market: The Purchasing Power of Working-Age Adults With Disabilities | American Institutes for Research (air.org)</a:t>
             </a:r>
             <a:endParaRPr lang="en-US" dirty="0"/>
-          </a:p>
-          <a:p>
-            <a:r>
-              <a:rPr lang="en-US" dirty="0"/>
-              <a:t>More likely to be innovative</a:t>
-            </a:r>
           </a:p>
         </p:txBody>
       </p:sp>

</xml_diff>

<commit_message>
Update presentations for next conferences
</commit_message>
<xml_diff>
--- a/Presenations/2023 Presentations/2023_Accessibility Testing.pptx
+++ b/Presenations/2023 Presentations/2023_Accessibility Testing.pptx
@@ -5,26 +5,27 @@
     <p:sldMasterId id="2147483708" r:id="rId1"/>
   </p:sldMasterIdLst>
   <p:notesMasterIdLst>
-    <p:notesMasterId r:id="rId19"/>
+    <p:notesMasterId r:id="rId20"/>
   </p:notesMasterIdLst>
   <p:sldIdLst>
     <p:sldId id="256" r:id="rId2"/>
-    <p:sldId id="263" r:id="rId3"/>
-    <p:sldId id="266" r:id="rId4"/>
-    <p:sldId id="269" r:id="rId5"/>
-    <p:sldId id="273" r:id="rId6"/>
-    <p:sldId id="270" r:id="rId7"/>
-    <p:sldId id="279" r:id="rId8"/>
-    <p:sldId id="275" r:id="rId9"/>
-    <p:sldId id="282" r:id="rId10"/>
-    <p:sldId id="278" r:id="rId11"/>
-    <p:sldId id="274" r:id="rId12"/>
-    <p:sldId id="280" r:id="rId13"/>
-    <p:sldId id="281" r:id="rId14"/>
-    <p:sldId id="276" r:id="rId15"/>
-    <p:sldId id="271" r:id="rId16"/>
+    <p:sldId id="283" r:id="rId3"/>
+    <p:sldId id="263" r:id="rId4"/>
+    <p:sldId id="266" r:id="rId5"/>
+    <p:sldId id="269" r:id="rId6"/>
+    <p:sldId id="273" r:id="rId7"/>
+    <p:sldId id="270" r:id="rId8"/>
+    <p:sldId id="279" r:id="rId9"/>
+    <p:sldId id="275" r:id="rId10"/>
+    <p:sldId id="282" r:id="rId11"/>
+    <p:sldId id="278" r:id="rId12"/>
+    <p:sldId id="274" r:id="rId13"/>
+    <p:sldId id="280" r:id="rId14"/>
+    <p:sldId id="281" r:id="rId15"/>
+    <p:sldId id="276" r:id="rId16"/>
     <p:sldId id="277" r:id="rId17"/>
-    <p:sldId id="272" r:id="rId18"/>
+    <p:sldId id="271" r:id="rId18"/>
+    <p:sldId id="272" r:id="rId19"/>
   </p:sldIdLst>
   <p:sldSz cx="12192000" cy="6858000"/>
   <p:notesSz cx="6858000" cy="9144000"/>
@@ -134,14 +135,6 @@
 </p:presentation>
 </file>
 
-<file path=ppt/revisionInfo.xml><?xml version="1.0" encoding="utf-8"?>
-<p1510:revInfo xmlns:a="http://schemas.openxmlformats.org/drawingml/2006/main" xmlns:r="http://schemas.openxmlformats.org/officeDocument/2006/relationships" xmlns:p1510="http://schemas.microsoft.com/office/powerpoint/2015/10/main">
-  <p1510:revLst>
-    <p1510:client id="{358807CD-A910-4B3F-BB59-2E7DDBEA2023}" v="64" dt="2020-07-24T18:58:59.735"/>
-  </p1510:revLst>
-</p1510:revInfo>
-</file>
-
 <file path=ppt/diagrams/colors1.xml><?xml version="1.0" encoding="utf-8"?>
 <dgm:colorsDef xmlns:dgm="http://schemas.openxmlformats.org/drawingml/2006/diagram" xmlns:a="http://schemas.openxmlformats.org/drawingml/2006/main" uniqueId="urn:microsoft.com/office/officeart/2005/8/colors/accent1_2">
   <dgm:title val=""/>
@@ -1908,7 +1901,7 @@
         </a:p>
       </dgm:t>
     </dgm:pt>
-    <dgm:pt modelId="{35076E6F-56B4-4C9C-B87F-C1A2DDBFEAE6}">
+    <dgm:pt modelId="{EBD8C222-A5D6-4DCC-8C15-D059A7625C93}">
       <dgm:prSet/>
       <dgm:spPr>
         <a:solidFill>
@@ -1928,11 +1921,11 @@
         </a:p>
       </dgm:t>
     </dgm:pt>
-    <dgm:pt modelId="{FDBD053D-13E7-4D5F-B314-4CFECDAC5A4A}" type="parTrans" cxnId="{966B93F3-875F-4774-9989-390ADF95D6C3}">
+    <dgm:pt modelId="{E1A0108E-0817-48E8-983E-D900206C9739}" type="parTrans" cxnId="{161D5D94-C5FF-4943-BCC1-158BA444B5CD}">
       <dgm:prSet/>
       <dgm:spPr/>
     </dgm:pt>
-    <dgm:pt modelId="{1E3D3135-8A49-4B2C-B72C-81DD51058AD5}" type="sibTrans" cxnId="{966B93F3-875F-4774-9989-390ADF95D6C3}">
+    <dgm:pt modelId="{6210841F-ACC9-40F9-A276-D8F0F9663678}" type="sibTrans" cxnId="{161D5D94-C5FF-4943-BCC1-158BA444B5CD}">
       <dgm:prSet/>
       <dgm:spPr/>
     </dgm:pt>
@@ -1967,12 +1960,12 @@
       </dgm:prSet>
       <dgm:spPr/>
     </dgm:pt>
-    <dgm:pt modelId="{BA6209A0-4C6B-49A5-B6AC-098789F09423}" type="pres">
+    <dgm:pt modelId="{8C8C02FF-CD74-4F81-B058-80CA100381AE}" type="pres">
       <dgm:prSet presAssocID="{51716F28-F5E8-46B4-986F-D770CD714D65}" presName="spacer" presStyleCnt="0"/>
       <dgm:spPr/>
     </dgm:pt>
-    <dgm:pt modelId="{06F41BA6-3DBC-4621-BDD3-1D5CA7FD9296}" type="pres">
-      <dgm:prSet presAssocID="{35076E6F-56B4-4C9C-B87F-C1A2DDBFEAE6}" presName="parentText" presStyleLbl="node1" presStyleIdx="2" presStyleCnt="3">
+    <dgm:pt modelId="{BFFE1686-2C08-410B-9B46-1898A88DB390}" type="pres">
+      <dgm:prSet presAssocID="{EBD8C222-A5D6-4DCC-8C15-D059A7625C93}" presName="parentText" presStyleLbl="node1" presStyleIdx="2" presStyleCnt="3">
         <dgm:presLayoutVars>
           <dgm:chMax val="0"/>
           <dgm:bulletEnabled val="1"/>
@@ -1983,17 +1976,17 @@
   </dgm:ptLst>
   <dgm:cxnLst>
     <dgm:cxn modelId="{5761E447-6517-4272-9AAF-535B2394440D}" type="presOf" srcId="{6F4D5E34-9650-4044-9B1F-DE1F8F532AB2}" destId="{511B63DA-5090-4298-95ED-4E5112359373}" srcOrd="0" destOrd="0" presId="urn:microsoft.com/office/officeart/2005/8/layout/vList2"/>
+    <dgm:cxn modelId="{108CC16D-245A-44AF-94C0-BDE0C056EC35}" type="presOf" srcId="{EBD8C222-A5D6-4DCC-8C15-D059A7625C93}" destId="{BFFE1686-2C08-410B-9B46-1898A88DB390}" srcOrd="0" destOrd="0" presId="urn:microsoft.com/office/officeart/2005/8/layout/vList2"/>
     <dgm:cxn modelId="{A1000950-0962-4D9C-91C2-6A56360F227F}" srcId="{6F4D5E34-9650-4044-9B1F-DE1F8F532AB2}" destId="{A4E0FFCC-A483-439F-8B12-5057321045DC}" srcOrd="0" destOrd="0" parTransId="{913F08B9-C6B0-4633-8D68-5A990C8F02F0}" sibTransId="{BFDFB5E9-99E2-4637-9D4B-2FE454ADBEE9}"/>
-    <dgm:cxn modelId="{C949835A-4CFE-4EDA-918D-B4895112A994}" type="presOf" srcId="{35076E6F-56B4-4C9C-B87F-C1A2DDBFEAE6}" destId="{06F41BA6-3DBC-4621-BDD3-1D5CA7FD9296}" srcOrd="0" destOrd="0" presId="urn:microsoft.com/office/officeart/2005/8/layout/vList2"/>
+    <dgm:cxn modelId="{161D5D94-C5FF-4943-BCC1-158BA444B5CD}" srcId="{6F4D5E34-9650-4044-9B1F-DE1F8F532AB2}" destId="{EBD8C222-A5D6-4DCC-8C15-D059A7625C93}" srcOrd="2" destOrd="0" parTransId="{E1A0108E-0817-48E8-983E-D900206C9739}" sibTransId="{6210841F-ACC9-40F9-A276-D8F0F9663678}"/>
     <dgm:cxn modelId="{208883B9-2542-4482-A83D-A6E64B8C43D5}" type="presOf" srcId="{A4E0FFCC-A483-439F-8B12-5057321045DC}" destId="{10DBB67B-63E3-4C9E-BB08-DE638FD9059B}" srcOrd="0" destOrd="0" presId="urn:microsoft.com/office/officeart/2005/8/layout/vList2"/>
     <dgm:cxn modelId="{2B2497C1-CC4A-4DB4-B4C3-34336F104B0E}" srcId="{6F4D5E34-9650-4044-9B1F-DE1F8F532AB2}" destId="{D5E078B7-92E1-4CF0-A96A-3580312A9B6C}" srcOrd="1" destOrd="0" parTransId="{05430F3B-BFF1-447D-AF85-E8924D938F4A}" sibTransId="{51716F28-F5E8-46B4-986F-D770CD714D65}"/>
     <dgm:cxn modelId="{C976B1EF-F414-483F-8BB3-1F1EC30BA743}" type="presOf" srcId="{D5E078B7-92E1-4CF0-A96A-3580312A9B6C}" destId="{5F5B2010-9F7C-4F85-BA19-0E749BF12EAC}" srcOrd="0" destOrd="0" presId="urn:microsoft.com/office/officeart/2005/8/layout/vList2"/>
-    <dgm:cxn modelId="{966B93F3-875F-4774-9989-390ADF95D6C3}" srcId="{6F4D5E34-9650-4044-9B1F-DE1F8F532AB2}" destId="{35076E6F-56B4-4C9C-B87F-C1A2DDBFEAE6}" srcOrd="2" destOrd="0" parTransId="{FDBD053D-13E7-4D5F-B314-4CFECDAC5A4A}" sibTransId="{1E3D3135-8A49-4B2C-B72C-81DD51058AD5}"/>
     <dgm:cxn modelId="{F65C402A-B2C2-444E-A6E3-07D2C669EF28}" type="presParOf" srcId="{511B63DA-5090-4298-95ED-4E5112359373}" destId="{10DBB67B-63E3-4C9E-BB08-DE638FD9059B}" srcOrd="0" destOrd="0" presId="urn:microsoft.com/office/officeart/2005/8/layout/vList2"/>
     <dgm:cxn modelId="{517E4F55-B8D6-4950-B525-CDC8401F747C}" type="presParOf" srcId="{511B63DA-5090-4298-95ED-4E5112359373}" destId="{A255F266-8E08-4F65-B1C6-A736D4C9DABA}" srcOrd="1" destOrd="0" presId="urn:microsoft.com/office/officeart/2005/8/layout/vList2"/>
     <dgm:cxn modelId="{52B99D24-03E7-4629-9EF1-0F27ABD83401}" type="presParOf" srcId="{511B63DA-5090-4298-95ED-4E5112359373}" destId="{5F5B2010-9F7C-4F85-BA19-0E749BF12EAC}" srcOrd="2" destOrd="0" presId="urn:microsoft.com/office/officeart/2005/8/layout/vList2"/>
-    <dgm:cxn modelId="{856E8D77-9763-4814-A137-5E325EDB5F25}" type="presParOf" srcId="{511B63DA-5090-4298-95ED-4E5112359373}" destId="{BA6209A0-4C6B-49A5-B6AC-098789F09423}" srcOrd="3" destOrd="0" presId="urn:microsoft.com/office/officeart/2005/8/layout/vList2"/>
-    <dgm:cxn modelId="{ECA4ECBB-5CBC-4A33-AAA3-5CC83D546FC2}" type="presParOf" srcId="{511B63DA-5090-4298-95ED-4E5112359373}" destId="{06F41BA6-3DBC-4621-BDD3-1D5CA7FD9296}" srcOrd="4" destOrd="0" presId="urn:microsoft.com/office/officeart/2005/8/layout/vList2"/>
+    <dgm:cxn modelId="{55000FC3-3018-44FF-8DB4-91253AD04D17}" type="presParOf" srcId="{511B63DA-5090-4298-95ED-4E5112359373}" destId="{8C8C02FF-CD74-4F81-B058-80CA100381AE}" srcOrd="3" destOrd="0" presId="urn:microsoft.com/office/officeart/2005/8/layout/vList2"/>
+    <dgm:cxn modelId="{19A978BB-C0F1-436C-9986-94178A559622}" type="presParOf" srcId="{511B63DA-5090-4298-95ED-4E5112359373}" destId="{BFFE1686-2C08-410B-9B46-1898A88DB390}" srcOrd="4" destOrd="0" presId="urn:microsoft.com/office/officeart/2005/8/layout/vList2"/>
   </dgm:cxnLst>
   <dgm:bg/>
   <dgm:whole/>
@@ -2033,7 +2026,7 @@
         <a:lstStyle/>
         <a:p>
           <a:r>
-            <a:rPr lang="en-US" dirty="0">
+            <a:rPr lang="en-US" b="1" dirty="0">
               <a:solidFill>
                 <a:schemeClr val="bg1"/>
               </a:solidFill>
@@ -2079,7 +2072,7 @@
         <a:lstStyle/>
         <a:p>
           <a:r>
-            <a:rPr lang="en-US" dirty="0">
+            <a:rPr lang="en-US" b="1" dirty="0">
               <a:solidFill>
                 <a:schemeClr val="bg1"/>
               </a:solidFill>
@@ -2112,14 +2105,14 @@
       </dgm:t>
     </dgm:pt>
     <dgm:pt modelId="{309E972A-70A4-4A01-92B0-202B97F1D387}">
-      <dgm:prSet/>
+      <dgm:prSet custT="1"/>
       <dgm:spPr/>
       <dgm:t>
         <a:bodyPr/>
         <a:lstStyle/>
         <a:p>
           <a:r>
-            <a:rPr lang="en-US"/>
+            <a:rPr lang="en-US" sz="2400" dirty="0"/>
             <a:t>Temporary</a:t>
           </a:r>
         </a:p>
@@ -2148,14 +2141,14 @@
       </dgm:t>
     </dgm:pt>
     <dgm:pt modelId="{CC1479AC-B9E3-4FC1-88C2-1A5526491BBE}">
-      <dgm:prSet/>
+      <dgm:prSet custT="1"/>
       <dgm:spPr/>
       <dgm:t>
         <a:bodyPr/>
         <a:lstStyle/>
         <a:p>
           <a:r>
-            <a:rPr lang="en-US" dirty="0"/>
+            <a:rPr lang="en-US" sz="2400" dirty="0"/>
             <a:t>Situational</a:t>
           </a:r>
         </a:p>
@@ -2184,14 +2177,14 @@
       </dgm:t>
     </dgm:pt>
     <dgm:pt modelId="{16D81420-F14C-4B22-B792-3D32D94EA1DB}">
-      <dgm:prSet/>
+      <dgm:prSet custT="1"/>
       <dgm:spPr/>
       <dgm:t>
         <a:bodyPr/>
         <a:lstStyle/>
         <a:p>
           <a:r>
-            <a:rPr lang="en-US"/>
+            <a:rPr lang="en-US" sz="2400" dirty="0"/>
             <a:t>Permanent</a:t>
           </a:r>
         </a:p>
@@ -2233,7 +2226,7 @@
         <a:lstStyle/>
         <a:p>
           <a:r>
-            <a:rPr lang="en-US" dirty="0">
+            <a:rPr lang="en-US" b="1" dirty="0">
               <a:solidFill>
                 <a:schemeClr val="bg1"/>
               </a:solidFill>
@@ -2266,14 +2259,14 @@
       </dgm:t>
     </dgm:pt>
     <dgm:pt modelId="{D180F917-FABE-4F07-BF68-9309EA1AB377}">
-      <dgm:prSet/>
+      <dgm:prSet custT="1"/>
       <dgm:spPr/>
       <dgm:t>
         <a:bodyPr/>
         <a:lstStyle/>
         <a:p>
           <a:r>
-            <a:rPr lang="en-US"/>
+            <a:rPr lang="en-US" sz="2400" dirty="0"/>
             <a:t>Visible</a:t>
           </a:r>
         </a:p>
@@ -2302,14 +2295,14 @@
       </dgm:t>
     </dgm:pt>
     <dgm:pt modelId="{371AAE62-6DC6-40C1-B396-0C0551660A69}">
-      <dgm:prSet/>
+      <dgm:prSet custT="1"/>
       <dgm:spPr/>
       <dgm:t>
         <a:bodyPr/>
         <a:lstStyle/>
         <a:p>
           <a:r>
-            <a:rPr lang="en-US"/>
+            <a:rPr lang="en-US" sz="2400" dirty="0"/>
             <a:t>Invisible</a:t>
           </a:r>
         </a:p>
@@ -2338,14 +2331,14 @@
       </dgm:t>
     </dgm:pt>
     <dgm:pt modelId="{875E756B-ECC8-41F9-9083-B14ECA08DB4C}">
-      <dgm:prSet/>
+      <dgm:prSet custT="1"/>
       <dgm:spPr/>
       <dgm:t>
         <a:bodyPr/>
         <a:lstStyle/>
         <a:p>
           <a:r>
-            <a:rPr lang="en-US" dirty="0"/>
+            <a:rPr lang="en-US" sz="2400" dirty="0"/>
             <a:t>Hearing</a:t>
           </a:r>
         </a:p>
@@ -2374,14 +2367,14 @@
       </dgm:t>
     </dgm:pt>
     <dgm:pt modelId="{2379A58B-4DBC-47BF-BC4C-2AA182A3A226}">
-      <dgm:prSet/>
+      <dgm:prSet custT="1"/>
       <dgm:spPr/>
       <dgm:t>
         <a:bodyPr/>
         <a:lstStyle/>
         <a:p>
           <a:r>
-            <a:rPr lang="en-US"/>
+            <a:rPr lang="en-US" sz="2400" dirty="0"/>
             <a:t>Vision</a:t>
           </a:r>
         </a:p>
@@ -2410,14 +2403,14 @@
       </dgm:t>
     </dgm:pt>
     <dgm:pt modelId="{20A9D522-7B5D-49B6-AAEB-1F5015F0E51A}">
-      <dgm:prSet/>
+      <dgm:prSet custT="1"/>
       <dgm:spPr/>
       <dgm:t>
         <a:bodyPr/>
         <a:lstStyle/>
         <a:p>
           <a:r>
-            <a:rPr lang="en-US"/>
+            <a:rPr lang="en-US" sz="2400" dirty="0"/>
             <a:t>Mobility</a:t>
           </a:r>
         </a:p>
@@ -2446,14 +2439,14 @@
       </dgm:t>
     </dgm:pt>
     <dgm:pt modelId="{86E40419-D901-4951-9304-29B69BC5A101}">
-      <dgm:prSet/>
+      <dgm:prSet custT="1"/>
       <dgm:spPr/>
       <dgm:t>
         <a:bodyPr/>
         <a:lstStyle/>
         <a:p>
           <a:r>
-            <a:rPr lang="en-US"/>
+            <a:rPr lang="en-US" sz="2400" dirty="0"/>
             <a:t>Comprehension</a:t>
           </a:r>
         </a:p>
@@ -2763,7 +2756,7 @@
         <a:ext cx="7255041" cy="1103809"/>
       </dsp:txXfrm>
     </dsp:sp>
-    <dsp:sp modelId="{06F41BA6-3DBC-4621-BDD3-1D5CA7FD9296}">
+    <dsp:sp modelId="{BFFE1686-2C08-410B-9B46-1898A88DB390}">
       <dsp:nvSpPr>
         <dsp:cNvPr id="0" name=""/>
         <dsp:cNvSpPr/>
@@ -2856,7 +2849,7 @@
       </dsp:nvSpPr>
       <dsp:spPr>
         <a:xfrm>
-          <a:off x="5592" y="166138"/>
+          <a:off x="5592" y="0"/>
           <a:ext cx="3531141" cy="1059342"/>
         </a:xfrm>
         <a:prstGeom prst="rect">
@@ -2900,7 +2893,7 @@
         </a:bodyPr>
         <a:lstStyle/>
         <a:p>
-          <a:pPr marL="0" lvl="0" indent="0" algn="ctr" defTabSz="1555750">
+          <a:pPr marL="0" lvl="0" indent="0" algn="ctr" defTabSz="1600200">
             <a:lnSpc>
               <a:spcPct val="90000"/>
             </a:lnSpc>
@@ -2913,7 +2906,7 @@
             <a:buNone/>
           </a:pPr>
           <a:r>
-            <a:rPr lang="en-US" sz="3500" kern="1200" dirty="0">
+            <a:rPr lang="en-US" sz="3600" b="1" kern="1200" dirty="0">
               <a:solidFill>
                 <a:schemeClr val="bg1"/>
               </a:solidFill>
@@ -2923,7 +2916,7 @@
         </a:p>
       </dsp:txBody>
       <dsp:txXfrm>
-        <a:off x="5592" y="166138"/>
+        <a:off x="5592" y="0"/>
         <a:ext cx="3531141" cy="1059342"/>
       </dsp:txXfrm>
     </dsp:sp>
@@ -2934,8 +2927,8 @@
       </dsp:nvSpPr>
       <dsp:spPr>
         <a:xfrm>
-          <a:off x="5592" y="1225481"/>
-          <a:ext cx="3531141" cy="1948479"/>
+          <a:off x="5592" y="1059342"/>
+          <a:ext cx="3531141" cy="2280757"/>
         </a:xfrm>
         <a:prstGeom prst="rect">
           <a:avLst/>
@@ -2983,7 +2976,7 @@
         </a:bodyPr>
         <a:lstStyle/>
         <a:p>
-          <a:pPr marL="0" lvl="0" indent="0" algn="l" defTabSz="755650">
+          <a:pPr marL="0" lvl="0" indent="0" algn="l" defTabSz="1066800">
             <a:lnSpc>
               <a:spcPct val="90000"/>
             </a:lnSpc>
@@ -2996,12 +2989,12 @@
             <a:buNone/>
           </a:pPr>
           <a:r>
-            <a:rPr lang="en-US" sz="1700" kern="1200" dirty="0"/>
+            <a:rPr lang="en-US" sz="2400" kern="1200" dirty="0"/>
             <a:t>Hearing</a:t>
           </a:r>
         </a:p>
         <a:p>
-          <a:pPr marL="0" lvl="0" indent="0" algn="l" defTabSz="755650">
+          <a:pPr marL="0" lvl="0" indent="0" algn="l" defTabSz="1066800">
             <a:lnSpc>
               <a:spcPct val="90000"/>
             </a:lnSpc>
@@ -3014,12 +3007,12 @@
             <a:buNone/>
           </a:pPr>
           <a:r>
-            <a:rPr lang="en-US" sz="1700" kern="1200"/>
+            <a:rPr lang="en-US" sz="2400" kern="1200" dirty="0"/>
             <a:t>Vision</a:t>
           </a:r>
         </a:p>
         <a:p>
-          <a:pPr marL="0" lvl="0" indent="0" algn="l" defTabSz="755650">
+          <a:pPr marL="0" lvl="0" indent="0" algn="l" defTabSz="1066800">
             <a:lnSpc>
               <a:spcPct val="90000"/>
             </a:lnSpc>
@@ -3032,12 +3025,12 @@
             <a:buNone/>
           </a:pPr>
           <a:r>
-            <a:rPr lang="en-US" sz="1700" kern="1200"/>
+            <a:rPr lang="en-US" sz="2400" kern="1200" dirty="0"/>
             <a:t>Mobility</a:t>
           </a:r>
         </a:p>
         <a:p>
-          <a:pPr marL="0" lvl="0" indent="0" algn="l" defTabSz="755650">
+          <a:pPr marL="0" lvl="0" indent="0" algn="l" defTabSz="1066800">
             <a:lnSpc>
               <a:spcPct val="90000"/>
             </a:lnSpc>
@@ -3050,14 +3043,14 @@
             <a:buNone/>
           </a:pPr>
           <a:r>
-            <a:rPr lang="en-US" sz="1700" kern="1200"/>
+            <a:rPr lang="en-US" sz="2400" kern="1200" dirty="0"/>
             <a:t>Comprehension</a:t>
           </a:r>
         </a:p>
       </dsp:txBody>
       <dsp:txXfrm>
-        <a:off x="5592" y="1225481"/>
-        <a:ext cx="3531141" cy="1948479"/>
+        <a:off x="5592" y="1059342"/>
+        <a:ext cx="3531141" cy="2280757"/>
       </dsp:txXfrm>
     </dsp:sp>
     <dsp:sp modelId="{4509828A-1885-4608-9CA4-0F861650D937}">
@@ -3067,7 +3060,7 @@
       </dsp:nvSpPr>
       <dsp:spPr>
         <a:xfrm>
-          <a:off x="3644629" y="166138"/>
+          <a:off x="3644629" y="0"/>
           <a:ext cx="3531141" cy="1059342"/>
         </a:xfrm>
         <a:prstGeom prst="rect">
@@ -3111,7 +3104,7 @@
         </a:bodyPr>
         <a:lstStyle/>
         <a:p>
-          <a:pPr marL="0" lvl="0" indent="0" algn="ctr" defTabSz="1555750">
+          <a:pPr marL="0" lvl="0" indent="0" algn="ctr" defTabSz="1600200">
             <a:lnSpc>
               <a:spcPct val="90000"/>
             </a:lnSpc>
@@ -3124,7 +3117,7 @@
             <a:buNone/>
           </a:pPr>
           <a:r>
-            <a:rPr lang="en-US" sz="3500" kern="1200" dirty="0">
+            <a:rPr lang="en-US" sz="3600" b="1" kern="1200" dirty="0">
               <a:solidFill>
                 <a:schemeClr val="bg1"/>
               </a:solidFill>
@@ -3134,7 +3127,7 @@
         </a:p>
       </dsp:txBody>
       <dsp:txXfrm>
-        <a:off x="3644629" y="166138"/>
+        <a:off x="3644629" y="0"/>
         <a:ext cx="3531141" cy="1059342"/>
       </dsp:txXfrm>
     </dsp:sp>
@@ -3145,8 +3138,8 @@
       </dsp:nvSpPr>
       <dsp:spPr>
         <a:xfrm>
-          <a:off x="3644629" y="1225481"/>
-          <a:ext cx="3531141" cy="1948479"/>
+          <a:off x="3644629" y="1059342"/>
+          <a:ext cx="3531141" cy="2280757"/>
         </a:xfrm>
         <a:prstGeom prst="rect">
           <a:avLst/>
@@ -3194,7 +3187,7 @@
         </a:bodyPr>
         <a:lstStyle/>
         <a:p>
-          <a:pPr marL="0" lvl="0" indent="0" algn="l" defTabSz="755650">
+          <a:pPr marL="0" lvl="0" indent="0" algn="l" defTabSz="1066800">
             <a:lnSpc>
               <a:spcPct val="90000"/>
             </a:lnSpc>
@@ -3207,12 +3200,12 @@
             <a:buNone/>
           </a:pPr>
           <a:r>
-            <a:rPr lang="en-US" sz="1700" kern="1200"/>
+            <a:rPr lang="en-US" sz="2400" kern="1200" dirty="0"/>
             <a:t>Temporary</a:t>
           </a:r>
         </a:p>
         <a:p>
-          <a:pPr marL="0" lvl="0" indent="0" algn="l" defTabSz="755650">
+          <a:pPr marL="0" lvl="0" indent="0" algn="l" defTabSz="1066800">
             <a:lnSpc>
               <a:spcPct val="90000"/>
             </a:lnSpc>
@@ -3225,12 +3218,12 @@
             <a:buNone/>
           </a:pPr>
           <a:r>
-            <a:rPr lang="en-US" sz="1700" kern="1200" dirty="0"/>
+            <a:rPr lang="en-US" sz="2400" kern="1200" dirty="0"/>
             <a:t>Situational</a:t>
           </a:r>
         </a:p>
         <a:p>
-          <a:pPr marL="0" lvl="0" indent="0" algn="l" defTabSz="755650">
+          <a:pPr marL="0" lvl="0" indent="0" algn="l" defTabSz="1066800">
             <a:lnSpc>
               <a:spcPct val="90000"/>
             </a:lnSpc>
@@ -3243,14 +3236,14 @@
             <a:buNone/>
           </a:pPr>
           <a:r>
-            <a:rPr lang="en-US" sz="1700" kern="1200"/>
+            <a:rPr lang="en-US" sz="2400" kern="1200" dirty="0"/>
             <a:t>Permanent</a:t>
           </a:r>
         </a:p>
       </dsp:txBody>
       <dsp:txXfrm>
-        <a:off x="3644629" y="1225481"/>
-        <a:ext cx="3531141" cy="1948479"/>
+        <a:off x="3644629" y="1059342"/>
+        <a:ext cx="3531141" cy="2280757"/>
       </dsp:txXfrm>
     </dsp:sp>
     <dsp:sp modelId="{FC53DE69-2466-43F5-A0D3-415A85444237}">
@@ -3260,7 +3253,7 @@
       </dsp:nvSpPr>
       <dsp:spPr>
         <a:xfrm>
-          <a:off x="7283665" y="166138"/>
+          <a:off x="7283665" y="0"/>
           <a:ext cx="3531141" cy="1059342"/>
         </a:xfrm>
         <a:prstGeom prst="rect">
@@ -3304,7 +3297,7 @@
         </a:bodyPr>
         <a:lstStyle/>
         <a:p>
-          <a:pPr marL="0" lvl="0" indent="0" algn="ctr" defTabSz="1555750">
+          <a:pPr marL="0" lvl="0" indent="0" algn="ctr" defTabSz="1600200">
             <a:lnSpc>
               <a:spcPct val="90000"/>
             </a:lnSpc>
@@ -3317,7 +3310,7 @@
             <a:buNone/>
           </a:pPr>
           <a:r>
-            <a:rPr lang="en-US" sz="3500" kern="1200" dirty="0">
+            <a:rPr lang="en-US" sz="3600" b="1" kern="1200" dirty="0">
               <a:solidFill>
                 <a:schemeClr val="bg1"/>
               </a:solidFill>
@@ -3327,7 +3320,7 @@
         </a:p>
       </dsp:txBody>
       <dsp:txXfrm>
-        <a:off x="7283665" y="166138"/>
+        <a:off x="7283665" y="0"/>
         <a:ext cx="3531141" cy="1059342"/>
       </dsp:txXfrm>
     </dsp:sp>
@@ -3338,8 +3331,8 @@
       </dsp:nvSpPr>
       <dsp:spPr>
         <a:xfrm>
-          <a:off x="7283665" y="1225481"/>
-          <a:ext cx="3531141" cy="1948479"/>
+          <a:off x="7283665" y="1059342"/>
+          <a:ext cx="3531141" cy="2280757"/>
         </a:xfrm>
         <a:prstGeom prst="rect">
           <a:avLst/>
@@ -3387,7 +3380,7 @@
         </a:bodyPr>
         <a:lstStyle/>
         <a:p>
-          <a:pPr marL="0" lvl="0" indent="0" algn="l" defTabSz="755650">
+          <a:pPr marL="0" lvl="0" indent="0" algn="l" defTabSz="1066800">
             <a:lnSpc>
               <a:spcPct val="90000"/>
             </a:lnSpc>
@@ -3400,12 +3393,12 @@
             <a:buNone/>
           </a:pPr>
           <a:r>
-            <a:rPr lang="en-US" sz="1700" kern="1200"/>
+            <a:rPr lang="en-US" sz="2400" kern="1200" dirty="0"/>
             <a:t>Visible</a:t>
           </a:r>
         </a:p>
         <a:p>
-          <a:pPr marL="0" lvl="0" indent="0" algn="l" defTabSz="755650">
+          <a:pPr marL="0" lvl="0" indent="0" algn="l" defTabSz="1066800">
             <a:lnSpc>
               <a:spcPct val="90000"/>
             </a:lnSpc>
@@ -3418,14 +3411,14 @@
             <a:buNone/>
           </a:pPr>
           <a:r>
-            <a:rPr lang="en-US" sz="1700" kern="1200"/>
+            <a:rPr lang="en-US" sz="2400" kern="1200" dirty="0"/>
             <a:t>Invisible</a:t>
           </a:r>
         </a:p>
       </dsp:txBody>
       <dsp:txXfrm>
-        <a:off x="7283665" y="1225481"/>
-        <a:ext cx="3531141" cy="1948479"/>
+        <a:off x="7283665" y="1059342"/>
+        <a:ext cx="3531141" cy="2280757"/>
       </dsp:txXfrm>
     </dsp:sp>
   </dsp:spTree>
@@ -5916,7 +5909,7 @@
           <a:p>
             <a:fld id="{BEFAACEF-CC9A-483E-9B56-DECAFB57975A}" type="datetimeFigureOut">
               <a:rPr lang="en-US" smtClean="0"/>
-              <a:t>7/27/2023</a:t>
+              <a:t>7/30/2023</a:t>
             </a:fld>
             <a:endParaRPr lang="en-US"/>
           </a:p>
@@ -6311,23 +6304,9 @@
           <a:bodyPr/>
           <a:lstStyle/>
           <a:p>
-            <a:pPr marL="171450" indent="-171450">
-              <a:buFont typeface="Arial" panose="020B0604020202020204" pitchFamily="34" charset="0"/>
-              <a:buChar char="•"/>
-            </a:pPr>
             <a:r>
               <a:rPr lang="en-US" dirty="0"/>
-              <a:t>Web Accessibility Evaluation Extensions, API, and web app - https://wave.webaim.org/</a:t>
-            </a:r>
-          </a:p>
-          <a:p>
-            <a:pPr marL="171450" indent="-171450">
-              <a:buFont typeface="Arial" panose="020B0604020202020204" pitchFamily="34" charset="0"/>
-              <a:buChar char="•"/>
-            </a:pPr>
-            <a:r>
-              <a:rPr lang="en-US" dirty="0"/>
-              <a:t>Axe </a:t>
+              <a:t>Technically the screenshots I have here are of the browser extension version of Accessibility Insights, but it also has 2 Desktop applications, one for testing Windows applications and websites and one for testing Android apps. It is built on Axe Core. Axe </a:t>
             </a:r>
             <a:r>
               <a:rPr lang="en-US" dirty="0" err="1"/>
@@ -6335,15 +6314,8 @@
             </a:r>
             <a:r>
               <a:rPr lang="en-US" dirty="0"/>
-              <a:t> (Can use forever for free. Pro just offers some extra testing features.) - https://www.deque.com/axe-devtools-accessibility-testing/</a:t>
-            </a:r>
-          </a:p>
-          <a:p>
-            <a:pPr marL="171450" indent="-171450">
-              <a:buFont typeface="Arial" panose="020B0604020202020204" pitchFamily="34" charset="0"/>
-              <a:buChar char="•"/>
-            </a:pPr>
-            <a:endParaRPr lang="en-US" dirty="0"/>
+              <a:t> provides a similar browser extension as well.</a:t>
+            </a:r>
           </a:p>
         </p:txBody>
       </p:sp>
@@ -6373,7 +6345,7 @@
     </p:spTree>
     <p:extLst>
       <p:ext uri="{BB962C8B-B14F-4D97-AF65-F5344CB8AC3E}">
-        <p14:creationId xmlns:p14="http://schemas.microsoft.com/office/powerpoint/2010/main" val="1314952345"/>
+        <p14:creationId xmlns:p14="http://schemas.microsoft.com/office/powerpoint/2010/main" val="2810766991"/>
       </p:ext>
     </p:extLst>
   </p:cSld>
@@ -6427,27 +6399,39 @@
           <a:bodyPr/>
           <a:lstStyle/>
           <a:p>
-            <a:pPr marL="171450" marR="0" lvl="0" indent="-171450" algn="l" defTabSz="914400" rtl="0" eaLnBrk="1" fontAlgn="auto" latinLnBrk="0" hangingPunct="1">
-              <a:lnSpc>
-                <a:spcPct val="100000"/>
-              </a:lnSpc>
-              <a:spcBef>
-                <a:spcPts val="0"/>
-              </a:spcBef>
-              <a:spcAft>
-                <a:spcPts val="0"/>
-              </a:spcAft>
-              <a:buClrTx/>
-              <a:buSzTx/>
+            <a:pPr marL="171450" indent="-171450">
               <a:buFont typeface="Arial" panose="020B0604020202020204" pitchFamily="34" charset="0"/>
               <a:buChar char="•"/>
-              <a:tabLst/>
-              <a:defRPr/>
             </a:pPr>
             <a:r>
               <a:rPr lang="en-US" dirty="0"/>
-              <a:t>The W3C Markup Validation Service - https://validator.w3.org/</a:t>
-            </a:r>
+              <a:t>Web Accessibility Evaluation Extensions, API, and web app - https://wave.webaim.org/</a:t>
+            </a:r>
+          </a:p>
+          <a:p>
+            <a:pPr marL="171450" indent="-171450">
+              <a:buFont typeface="Arial" panose="020B0604020202020204" pitchFamily="34" charset="0"/>
+              <a:buChar char="•"/>
+            </a:pPr>
+            <a:r>
+              <a:rPr lang="en-US" dirty="0"/>
+              <a:t>Axe </a:t>
+            </a:r>
+            <a:r>
+              <a:rPr lang="en-US" dirty="0" err="1"/>
+              <a:t>DevTools</a:t>
+            </a:r>
+            <a:r>
+              <a:rPr lang="en-US" dirty="0"/>
+              <a:t> (Can use forever for free. Pro just offers some extra testing features.) - https://www.deque.com/axe-devtools-accessibility-testing/</a:t>
+            </a:r>
+          </a:p>
+          <a:p>
+            <a:pPr marL="171450" indent="-171450">
+              <a:buFont typeface="Arial" panose="020B0604020202020204" pitchFamily="34" charset="0"/>
+              <a:buChar char="•"/>
+            </a:pPr>
+            <a:endParaRPr lang="en-US" dirty="0"/>
           </a:p>
         </p:txBody>
       </p:sp>
@@ -6477,7 +6461,7 @@
     </p:spTree>
     <p:extLst>
       <p:ext uri="{BB962C8B-B14F-4D97-AF65-F5344CB8AC3E}">
-        <p14:creationId xmlns:p14="http://schemas.microsoft.com/office/powerpoint/2010/main" val="1708861789"/>
+        <p14:creationId xmlns:p14="http://schemas.microsoft.com/office/powerpoint/2010/main" val="1314952345"/>
       </p:ext>
     </p:extLst>
   </p:cSld>
@@ -6531,7 +6515,27 @@
           <a:bodyPr/>
           <a:lstStyle/>
           <a:p>
-            <a:endParaRPr lang="en-US" dirty="0"/>
+            <a:pPr marL="171450" marR="0" lvl="0" indent="-171450" algn="l" defTabSz="914400" rtl="0" eaLnBrk="1" fontAlgn="auto" latinLnBrk="0" hangingPunct="1">
+              <a:lnSpc>
+                <a:spcPct val="100000"/>
+              </a:lnSpc>
+              <a:spcBef>
+                <a:spcPts val="0"/>
+              </a:spcBef>
+              <a:spcAft>
+                <a:spcPts val="0"/>
+              </a:spcAft>
+              <a:buClrTx/>
+              <a:buSzTx/>
+              <a:buFont typeface="Arial" panose="020B0604020202020204" pitchFamily="34" charset="0"/>
+              <a:buChar char="•"/>
+              <a:tabLst/>
+              <a:defRPr/>
+            </a:pPr>
+            <a:r>
+              <a:rPr lang="en-US" dirty="0"/>
+              <a:t>The W3C Markup Validation Service - https://validator.w3.org/</a:t>
+            </a:r>
           </a:p>
         </p:txBody>
       </p:sp>
@@ -6561,7 +6565,7 @@
     </p:spTree>
     <p:extLst>
       <p:ext uri="{BB962C8B-B14F-4D97-AF65-F5344CB8AC3E}">
-        <p14:creationId xmlns:p14="http://schemas.microsoft.com/office/powerpoint/2010/main" val="2144912867"/>
+        <p14:creationId xmlns:p14="http://schemas.microsoft.com/office/powerpoint/2010/main" val="1708861789"/>
       </p:ext>
     </p:extLst>
   </p:cSld>
@@ -6645,7 +6649,7 @@
     </p:spTree>
     <p:extLst>
       <p:ext uri="{BB962C8B-B14F-4D97-AF65-F5344CB8AC3E}">
-        <p14:creationId xmlns:p14="http://schemas.microsoft.com/office/powerpoint/2010/main" val="1964582518"/>
+        <p14:creationId xmlns:p14="http://schemas.microsoft.com/office/powerpoint/2010/main" val="2144912867"/>
       </p:ext>
     </p:extLst>
   </p:cSld>
@@ -6813,6 +6817,90 @@
     </p:spTree>
     <p:extLst>
       <p:ext uri="{BB962C8B-B14F-4D97-AF65-F5344CB8AC3E}">
+        <p14:creationId xmlns:p14="http://schemas.microsoft.com/office/powerpoint/2010/main" val="1964582518"/>
+      </p:ext>
+    </p:extLst>
+  </p:cSld>
+  <p:clrMapOvr>
+    <a:masterClrMapping/>
+  </p:clrMapOvr>
+</p:notes>
+</file>
+
+<file path=ppt/notesSlides/notesSlide16.xml><?xml version="1.0" encoding="utf-8"?>
+<p:notes xmlns:a="http://schemas.openxmlformats.org/drawingml/2006/main" xmlns:r="http://schemas.openxmlformats.org/officeDocument/2006/relationships" xmlns:p="http://schemas.openxmlformats.org/presentationml/2006/main">
+  <p:cSld>
+    <p:spTree>
+      <p:nvGrpSpPr>
+        <p:cNvPr id="1" name=""/>
+        <p:cNvGrpSpPr/>
+        <p:nvPr/>
+      </p:nvGrpSpPr>
+      <p:grpSpPr>
+        <a:xfrm>
+          <a:off x="0" y="0"/>
+          <a:ext cx="0" cy="0"/>
+          <a:chOff x="0" y="0"/>
+          <a:chExt cx="0" cy="0"/>
+        </a:xfrm>
+      </p:grpSpPr>
+      <p:sp>
+        <p:nvSpPr>
+          <p:cNvPr id="2" name="Slide Image Placeholder 1"/>
+          <p:cNvSpPr>
+            <a:spLocks noGrp="1" noRot="1" noChangeAspect="1"/>
+          </p:cNvSpPr>
+          <p:nvPr>
+            <p:ph type="sldImg"/>
+          </p:nvPr>
+        </p:nvSpPr>
+        <p:spPr/>
+      </p:sp>
+      <p:sp>
+        <p:nvSpPr>
+          <p:cNvPr id="3" name="Notes Placeholder 2"/>
+          <p:cNvSpPr>
+            <a:spLocks noGrp="1"/>
+          </p:cNvSpPr>
+          <p:nvPr>
+            <p:ph type="body" idx="1"/>
+          </p:nvPr>
+        </p:nvSpPr>
+        <p:spPr/>
+        <p:txBody>
+          <a:bodyPr/>
+          <a:lstStyle/>
+          <a:p>
+            <a:endParaRPr lang="en-US" dirty="0"/>
+          </a:p>
+        </p:txBody>
+      </p:sp>
+      <p:sp>
+        <p:nvSpPr>
+          <p:cNvPr id="4" name="Slide Number Placeholder 3"/>
+          <p:cNvSpPr>
+            <a:spLocks noGrp="1"/>
+          </p:cNvSpPr>
+          <p:nvPr>
+            <p:ph type="sldNum" sz="quarter" idx="5"/>
+          </p:nvPr>
+        </p:nvSpPr>
+        <p:spPr/>
+        <p:txBody>
+          <a:bodyPr/>
+          <a:lstStyle/>
+          <a:p>
+            <a:fld id="{297094E8-3009-47D0-9423-EBC369D53B0E}" type="slidenum">
+              <a:rPr lang="en-US" smtClean="0"/>
+              <a:t>18</a:t>
+            </a:fld>
+            <a:endParaRPr lang="en-US"/>
+          </a:p>
+        </p:txBody>
+      </p:sp>
+    </p:spTree>
+    <p:extLst>
+      <p:ext uri="{BB962C8B-B14F-4D97-AF65-F5344CB8AC3E}">
         <p14:creationId xmlns:p14="http://schemas.microsoft.com/office/powerpoint/2010/main" val="2776525666"/>
       </p:ext>
     </p:extLst>
@@ -6867,54 +6955,6 @@
           <a:bodyPr/>
           <a:lstStyle/>
           <a:p>
-            <a:r>
-              <a:rPr lang="en-US" b="1" dirty="0"/>
-              <a:t>Accessibility</a:t>
-            </a:r>
-            <a:r>
-              <a:rPr lang="en-US" dirty="0"/>
-              <a:t> – how well can your product be used by people of all abilities?</a:t>
-            </a:r>
-          </a:p>
-          <a:p>
-            <a:r>
-              <a:rPr lang="en-US" b="1" dirty="0"/>
-              <a:t>Disability</a:t>
-            </a:r>
-            <a:r>
-              <a:rPr lang="en-US" dirty="0"/>
-              <a:t> – A disability is basically a mismatch in interaction between a person’s body and the features of their environment in which they live.</a:t>
-            </a:r>
-          </a:p>
-          <a:p>
-            <a:r>
-              <a:rPr lang="en-US" b="1" dirty="0"/>
-              <a:t>Accessible Technology (AT) </a:t>
-            </a:r>
-            <a:r>
-              <a:rPr lang="en-US" dirty="0"/>
-              <a:t>- is any item, piece of equipment, software program, or product that is used to increase, maintain, or improve the functional capabilities of people with disabilities.</a:t>
-            </a:r>
-          </a:p>
-          <a:p>
-            <a:r>
-              <a:rPr lang="en-US" b="1" dirty="0"/>
-              <a:t>A11y</a:t>
-            </a:r>
-            <a:r>
-              <a:rPr lang="en-US" dirty="0"/>
-              <a:t> – a commonly accepted </a:t>
-            </a:r>
-            <a:r>
-              <a:rPr lang="en-US" dirty="0" err="1"/>
-              <a:t>numeronym</a:t>
-            </a:r>
-            <a:r>
-              <a:rPr lang="en-US" dirty="0"/>
-              <a:t> for Accessibility that stands for the fact that Accessibility starts with an “A”, ends with a “Y” and has 11 characters in between.</a:t>
-            </a:r>
-          </a:p>
-          <a:p>
             <a:endParaRPr lang="en-US" dirty="0"/>
           </a:p>
         </p:txBody>
@@ -6936,7 +6976,7 @@
           <a:p>
             <a:fld id="{297094E8-3009-47D0-9423-EBC369D53B0E}" type="slidenum">
               <a:rPr lang="en-US" smtClean="0"/>
-              <a:t>3</a:t>
+              <a:t>2</a:t>
             </a:fld>
             <a:endParaRPr lang="en-US"/>
           </a:p>
@@ -6945,7 +6985,7 @@
     </p:spTree>
     <p:extLst>
       <p:ext uri="{BB962C8B-B14F-4D97-AF65-F5344CB8AC3E}">
-        <p14:creationId xmlns:p14="http://schemas.microsoft.com/office/powerpoint/2010/main" val="2786079026"/>
+        <p14:creationId xmlns:p14="http://schemas.microsoft.com/office/powerpoint/2010/main" val="144647743"/>
       </p:ext>
     </p:extLst>
   </p:cSld>
@@ -6999,30 +7039,52 @@
           <a:bodyPr/>
           <a:lstStyle/>
           <a:p>
-            <a:pPr lvl="1"/>
+            <a:r>
+              <a:rPr lang="en-US" b="1" dirty="0"/>
+              <a:t>Accessibility</a:t>
+            </a:r>
             <a:r>
               <a:rPr lang="en-US" dirty="0"/>
-              <a:t>Based on data from the </a:t>
-            </a:r>
-            <a:r>
-              <a:rPr lang="en-US" i="1" dirty="0"/>
-              <a:t>American Institutes for Research (AIR)—A Hidden Market: The Purchasing Power of People With Disabilities</a:t>
-            </a:r>
-          </a:p>
-          <a:p>
-            <a:pPr lvl="2"/>
+              <a:t> – how well can your product be used by people of all abilities?</a:t>
+            </a:r>
+          </a:p>
+          <a:p>
+            <a:r>
+              <a:rPr lang="en-US" b="1" dirty="0"/>
+              <a:t>Disability</a:t>
+            </a:r>
             <a:r>
               <a:rPr lang="en-US" dirty="0"/>
-              <a:t>The total disposable income for U.S. adults with disabilities is about $490 billion, which is comparable to other significant market segments, such as African Americans ($501 billion) and Hispanics ($582 billion). (Disposable income is what is left after taxes are paid.); and</a:t>
-            </a:r>
-          </a:p>
-          <a:p>
-            <a:pPr lvl="2"/>
+              <a:t> – A disability is basically a mismatch in interaction between a person’s body and the features of their environment in which they live.</a:t>
+            </a:r>
+          </a:p>
+          <a:p>
+            <a:r>
+              <a:rPr lang="en-US" b="1" dirty="0"/>
+              <a:t>Adaptive/Assistive Technology (AT) </a:t>
+            </a:r>
             <a:r>
               <a:rPr lang="en-US" dirty="0"/>
-              <a:t>Discretionary income for working-age people with disabilities is about $21 billion, which is greater than that of the African-American ($3 billion) and Hispanic ($16 billion) market segments, combined. (Discretionary income is the money remaining after deducting taxes, other mandatory charges, and spending on necessities, such as food and housing.)</a:t>
-            </a:r>
-            <a:endParaRPr lang="en-US" i="1" dirty="0"/>
+              <a:t>- is any item, piece of equipment, software program, or product that is used to increase, maintain, or improve the functional capabilities of people with disabilities.</a:t>
+            </a:r>
+          </a:p>
+          <a:p>
+            <a:r>
+              <a:rPr lang="en-US" b="1" dirty="0"/>
+              <a:t>A11y</a:t>
+            </a:r>
+            <a:r>
+              <a:rPr lang="en-US" dirty="0"/>
+              <a:t> – a commonly accepted </a:t>
+            </a:r>
+            <a:r>
+              <a:rPr lang="en-US" dirty="0" err="1"/>
+              <a:t>numeronym</a:t>
+            </a:r>
+            <a:r>
+              <a:rPr lang="en-US" dirty="0"/>
+              <a:t> for Accessibility that stands for the fact that Accessibility starts with an “A”, ends with a “Y” and has 11 characters in between.</a:t>
+            </a:r>
           </a:p>
           <a:p>
             <a:endParaRPr lang="en-US" dirty="0"/>
@@ -7046,7 +7108,7 @@
           <a:p>
             <a:fld id="{297094E8-3009-47D0-9423-EBC369D53B0E}" type="slidenum">
               <a:rPr lang="en-US" smtClean="0"/>
-              <a:t>5</a:t>
+              <a:t>4</a:t>
             </a:fld>
             <a:endParaRPr lang="en-US"/>
           </a:p>
@@ -7055,7 +7117,7 @@
     </p:spTree>
     <p:extLst>
       <p:ext uri="{BB962C8B-B14F-4D97-AF65-F5344CB8AC3E}">
-        <p14:creationId xmlns:p14="http://schemas.microsoft.com/office/powerpoint/2010/main" val="2510926267"/>
+        <p14:creationId xmlns:p14="http://schemas.microsoft.com/office/powerpoint/2010/main" val="2786079026"/>
       </p:ext>
     </p:extLst>
   </p:cSld>
@@ -7109,6 +7171,32 @@
           <a:bodyPr/>
           <a:lstStyle/>
           <a:p>
+            <a:pPr lvl="1"/>
+            <a:r>
+              <a:rPr lang="en-US" dirty="0"/>
+              <a:t>Based on data from the </a:t>
+            </a:r>
+            <a:r>
+              <a:rPr lang="en-US" i="1" dirty="0"/>
+              <a:t>American Institutes for Research (AIR)—A Hidden Market: The Purchasing Power of People With Disabilities</a:t>
+            </a:r>
+          </a:p>
+          <a:p>
+            <a:pPr lvl="2"/>
+            <a:r>
+              <a:rPr lang="en-US" dirty="0"/>
+              <a:t>The total disposable income for U.S. adults with disabilities is about $490 billion, which is comparable to other significant market segments, such as African Americans ($501 billion) and Hispanics ($582 billion). (Disposable income is what is left after taxes are paid.); and</a:t>
+            </a:r>
+          </a:p>
+          <a:p>
+            <a:pPr lvl="2"/>
+            <a:r>
+              <a:rPr lang="en-US" dirty="0"/>
+              <a:t>Discretionary income for working-age people with disabilities is about $21 billion, which is greater than that of the African-American ($3 billion) and Hispanic ($16 billion) market segments, combined. (Discretionary income is the money remaining after deducting taxes, other mandatory charges, and spending on necessities, such as food and housing.)</a:t>
+            </a:r>
+            <a:endParaRPr lang="en-US" i="1" dirty="0"/>
+          </a:p>
+          <a:p>
             <a:endParaRPr lang="en-US" dirty="0"/>
           </a:p>
         </p:txBody>
@@ -7139,7 +7227,7 @@
     </p:spTree>
     <p:extLst>
       <p:ext uri="{BB962C8B-B14F-4D97-AF65-F5344CB8AC3E}">
-        <p14:creationId xmlns:p14="http://schemas.microsoft.com/office/powerpoint/2010/main" val="606445707"/>
+        <p14:creationId xmlns:p14="http://schemas.microsoft.com/office/powerpoint/2010/main" val="2510926267"/>
       </p:ext>
     </p:extLst>
   </p:cSld>
@@ -7223,7 +7311,7 @@
     </p:spTree>
     <p:extLst>
       <p:ext uri="{BB962C8B-B14F-4D97-AF65-F5344CB8AC3E}">
-        <p14:creationId xmlns:p14="http://schemas.microsoft.com/office/powerpoint/2010/main" val="2318496554"/>
+        <p14:creationId xmlns:p14="http://schemas.microsoft.com/office/powerpoint/2010/main" val="606445707"/>
       </p:ext>
     </p:extLst>
   </p:cSld>
@@ -7277,40 +7365,6 @@
           <a:bodyPr/>
           <a:lstStyle/>
           <a:p>
-            <a:pPr marL="171450" indent="-171450">
-              <a:buFont typeface="Arial" panose="020B0604020202020204" pitchFamily="34" charset="0"/>
-              <a:buChar char="•"/>
-            </a:pPr>
-            <a:r>
-              <a:rPr lang="en-US" dirty="0"/>
-              <a:t>Lighthouse is built into Chromium based browsers like Google Chrome and Microsoft Edge. It allows you to check Accessibility, SEO, and performance impacting elements of a page.</a:t>
-            </a:r>
-          </a:p>
-          <a:p>
-            <a:pPr marL="628650" lvl="1" indent="-171450">
-              <a:buFont typeface="Arial" panose="020B0604020202020204" pitchFamily="34" charset="0"/>
-              <a:buChar char="•"/>
-            </a:pPr>
-            <a:r>
-              <a:rPr lang="en-US" dirty="0"/>
-              <a:t>Firefox has similar options, but they are separated out into individual scanners, rather than under one option.</a:t>
-            </a:r>
-          </a:p>
-          <a:p>
-            <a:pPr marL="171450" indent="-171450">
-              <a:buFont typeface="Arial" panose="020B0604020202020204" pitchFamily="34" charset="0"/>
-              <a:buChar char="•"/>
-            </a:pPr>
-            <a:r>
-              <a:rPr lang="en-US" dirty="0"/>
-              <a:t>The rendering options are also built into Chromium browsers. They allow you to get an idea for how some disabilities may view your page and see how various custom CSS options may impact your site appearance and behavior.</a:t>
-            </a:r>
-          </a:p>
-          <a:p>
-            <a:pPr marL="171450" indent="-171450">
-              <a:buFont typeface="Arial" panose="020B0604020202020204" pitchFamily="34" charset="0"/>
-              <a:buChar char="•"/>
-            </a:pPr>
             <a:endParaRPr lang="en-US" dirty="0"/>
           </a:p>
         </p:txBody>
@@ -7341,7 +7395,7 @@
     </p:spTree>
     <p:extLst>
       <p:ext uri="{BB962C8B-B14F-4D97-AF65-F5344CB8AC3E}">
-        <p14:creationId xmlns:p14="http://schemas.microsoft.com/office/powerpoint/2010/main" val="333735249"/>
+        <p14:creationId xmlns:p14="http://schemas.microsoft.com/office/powerpoint/2010/main" val="2318496554"/>
       </p:ext>
     </p:extLst>
   </p:cSld>
@@ -7459,7 +7513,7 @@
     </p:spTree>
     <p:extLst>
       <p:ext uri="{BB962C8B-B14F-4D97-AF65-F5344CB8AC3E}">
-        <p14:creationId xmlns:p14="http://schemas.microsoft.com/office/powerpoint/2010/main" val="4112669843"/>
+        <p14:creationId xmlns:p14="http://schemas.microsoft.com/office/powerpoint/2010/main" val="333735249"/>
       </p:ext>
     </p:extLst>
   </p:cSld>
@@ -7513,6 +7567,32 @@
           <a:bodyPr/>
           <a:lstStyle/>
           <a:p>
+            <a:pPr marL="171450" indent="-171450">
+              <a:buFont typeface="Arial" panose="020B0604020202020204" pitchFamily="34" charset="0"/>
+              <a:buChar char="•"/>
+            </a:pPr>
+            <a:r>
+              <a:rPr lang="en-US" dirty="0"/>
+              <a:t>Microsoft and MacOS have a variety of built in accessibility options that help you zoom, have narration, use color filters and more to make a system more accessible based on your needs or test for accessibility in your content.</a:t>
+            </a:r>
+          </a:p>
+          <a:p>
+            <a:pPr marL="171450" indent="-171450">
+              <a:buFont typeface="Arial" panose="020B0604020202020204" pitchFamily="34" charset="0"/>
+              <a:buChar char="•"/>
+            </a:pPr>
+            <a:r>
+              <a:rPr lang="en-US"/>
+              <a:t>Additionally, </a:t>
+            </a:r>
+            <a:r>
+              <a:rPr lang="en-US" dirty="0"/>
+              <a:t>there are keyboard shortcuts that help you turn accessibility features on/</a:t>
+            </a:r>
+            <a:r>
+              <a:rPr lang="en-US"/>
+              <a:t>off quickly as needed.</a:t>
+            </a:r>
             <a:endParaRPr lang="en-US" dirty="0"/>
           </a:p>
         </p:txBody>
@@ -7543,7 +7623,7 @@
     </p:spTree>
     <p:extLst>
       <p:ext uri="{BB962C8B-B14F-4D97-AF65-F5344CB8AC3E}">
-        <p14:creationId xmlns:p14="http://schemas.microsoft.com/office/powerpoint/2010/main" val="2904637208"/>
+        <p14:creationId xmlns:p14="http://schemas.microsoft.com/office/powerpoint/2010/main" val="4112669843"/>
       </p:ext>
     </p:extLst>
   </p:cSld>
@@ -7599,15 +7679,15 @@
           <a:p>
             <a:r>
               <a:rPr lang="en-US" dirty="0"/>
-              <a:t>Technically the screenshots I have here are of the browser extension version of Accessibility Insights, but it also has 2 Desktop applications, one for testing Windows applications and websites and one for testing Android apps. It is built on Axe Core. Axe </a:t>
+              <a:t>Color Contrast Analyzer by </a:t>
             </a:r>
             <a:r>
               <a:rPr lang="en-US" dirty="0" err="1"/>
-              <a:t>DevTools</a:t>
+              <a:t>TPGi</a:t>
             </a:r>
             <a:r>
               <a:rPr lang="en-US" dirty="0"/>
-              <a:t> provides a similar browser extension as well.</a:t>
+              <a:t> - https://www.tpgi.com/color-contrast-checker/</a:t>
             </a:r>
           </a:p>
         </p:txBody>
@@ -7638,7 +7718,7 @@
     </p:spTree>
     <p:extLst>
       <p:ext uri="{BB962C8B-B14F-4D97-AF65-F5344CB8AC3E}">
-        <p14:creationId xmlns:p14="http://schemas.microsoft.com/office/powerpoint/2010/main" val="2810766991"/>
+        <p14:creationId xmlns:p14="http://schemas.microsoft.com/office/powerpoint/2010/main" val="2904637208"/>
       </p:ext>
     </p:extLst>
   </p:cSld>
@@ -7818,7 +7898,7 @@
           <a:p>
             <a:fld id="{BA049CC4-5A97-47DC-86B9-9927E3A2D5F5}" type="datetime1">
               <a:rPr lang="en-US" smtClean="0"/>
-              <a:t>7/27/2023</a:t>
+              <a:t>7/30/2023</a:t>
             </a:fld>
             <a:endParaRPr lang="en-US"/>
           </a:p>
@@ -8090,7 +8170,7 @@
           <a:p>
             <a:fld id="{08A11C66-9C87-4BA8-9534-5EF145E66FE7}" type="datetime1">
               <a:rPr lang="en-US" smtClean="0"/>
-              <a:t>7/27/2023</a:t>
+              <a:t>7/30/2023</a:t>
             </a:fld>
             <a:endParaRPr lang="en-US"/>
           </a:p>
@@ -8321,7 +8401,7 @@
           <a:p>
             <a:fld id="{5AE480A1-3E8F-4FEB-9473-F28D5BA2CE2F}" type="datetime1">
               <a:rPr lang="en-US" smtClean="0"/>
-              <a:t>7/27/2023</a:t>
+              <a:t>7/30/2023</a:t>
             </a:fld>
             <a:endParaRPr lang="en-US"/>
           </a:p>
@@ -8631,7 +8711,7 @@
           <a:p>
             <a:fld id="{51941244-449B-4313-BB5D-CEC8D390AC83}" type="datetime1">
               <a:rPr lang="en-US" smtClean="0"/>
-              <a:t>7/27/2023</a:t>
+              <a:t>7/30/2023</a:t>
             </a:fld>
             <a:endParaRPr lang="en-US"/>
           </a:p>
@@ -9104,7 +9184,7 @@
           <a:p>
             <a:fld id="{D3AAB994-AF9D-407F-AC45-491F65672FB8}" type="datetime1">
               <a:rPr lang="en-US" smtClean="0"/>
-              <a:t>7/27/2023</a:t>
+              <a:t>7/30/2023</a:t>
             </a:fld>
             <a:endParaRPr lang="en-US"/>
           </a:p>
@@ -9651,7 +9731,7 @@
           <a:p>
             <a:fld id="{95B69CAA-71E9-4E32-8F4F-8B1877E6E416}" type="datetime1">
               <a:rPr lang="en-US" smtClean="0"/>
-              <a:t>7/27/2023</a:t>
+              <a:t>7/30/2023</a:t>
             </a:fld>
             <a:endParaRPr lang="en-US"/>
           </a:p>
@@ -10425,7 +10505,7 @@
           <a:p>
             <a:fld id="{4F1F7796-6626-4944-B793-E85205E429DA}" type="datetime1">
               <a:rPr lang="en-US" smtClean="0"/>
-              <a:t>7/27/2023</a:t>
+              <a:t>7/30/2023</a:t>
             </a:fld>
             <a:endParaRPr lang="en-US"/>
           </a:p>
@@ -10600,7 +10680,7 @@
           <a:p>
             <a:fld id="{275BEE86-0E69-41D4-B130-484F9582CF68}" type="datetime1">
               <a:rPr lang="en-US" smtClean="0"/>
-              <a:t>7/27/2023</a:t>
+              <a:t>7/30/2023</a:t>
             </a:fld>
             <a:endParaRPr lang="en-US"/>
           </a:p>
@@ -10823,7 +10903,7 @@
           <a:p>
             <a:fld id="{E8E2E543-8735-43A9-800E-D52D2E6A7570}" type="datetime1">
               <a:rPr lang="en-US" smtClean="0"/>
-              <a:t>7/27/2023</a:t>
+              <a:t>7/30/2023</a:t>
             </a:fld>
             <a:endParaRPr lang="en-US"/>
           </a:p>
@@ -11008,7 +11088,7 @@
           <a:p>
             <a:fld id="{4F562C0E-85F8-4032-A4AC-EAAA621EB697}" type="datetime1">
               <a:rPr lang="en-US" smtClean="0"/>
-              <a:t>7/27/2023</a:t>
+              <a:t>7/30/2023</a:t>
             </a:fld>
             <a:endParaRPr lang="en-US"/>
           </a:p>
@@ -11297,7 +11377,7 @@
           <a:p>
             <a:fld id="{4D4D2949-E030-4779-99B3-FAC018E20B72}" type="datetime1">
               <a:rPr lang="en-US" smtClean="0"/>
-              <a:t>7/27/2023</a:t>
+              <a:t>7/30/2023</a:t>
             </a:fld>
             <a:endParaRPr lang="en-US"/>
           </a:p>
@@ -11544,7 +11624,7 @@
           <a:p>
             <a:fld id="{0F3F8BCC-FB76-4EC4-8AAF-4B5BA4B75FEF}" type="datetime1">
               <a:rPr lang="en-US" smtClean="0"/>
-              <a:t>7/27/2023</a:t>
+              <a:t>7/30/2023</a:t>
             </a:fld>
             <a:endParaRPr lang="en-US"/>
           </a:p>
@@ -11923,7 +12003,7 @@
           <a:p>
             <a:fld id="{7AB60B1E-0147-4747-AD07-17141088A4C3}" type="datetime1">
               <a:rPr lang="en-US" smtClean="0"/>
-              <a:t>7/27/2023</a:t>
+              <a:t>7/30/2023</a:t>
             </a:fld>
             <a:endParaRPr lang="en-US"/>
           </a:p>
@@ -12041,7 +12121,7 @@
           <a:p>
             <a:fld id="{122DC7E5-9295-4EB3-8473-59EEBBFB2383}" type="datetime1">
               <a:rPr lang="en-US" smtClean="0"/>
-              <a:t>7/27/2023</a:t>
+              <a:t>7/30/2023</a:t>
             </a:fld>
             <a:endParaRPr lang="en-US"/>
           </a:p>
@@ -12136,7 +12216,7 @@
           <a:p>
             <a:fld id="{915BDD53-BBE8-4710-8261-574287A899BD}" type="datetime1">
               <a:rPr lang="en-US" smtClean="0"/>
-              <a:t>7/27/2023</a:t>
+              <a:t>7/30/2023</a:t>
             </a:fld>
             <a:endParaRPr lang="en-US"/>
           </a:p>
@@ -12385,7 +12465,7 @@
           <a:p>
             <a:fld id="{68C84FA3-F6D9-4634-9C02-2941F1994736}" type="datetime1">
               <a:rPr lang="en-US" smtClean="0"/>
-              <a:t>7/27/2023</a:t>
+              <a:t>7/30/2023</a:t>
             </a:fld>
             <a:endParaRPr lang="en-US"/>
           </a:p>
@@ -12642,7 +12722,7 @@
           <a:p>
             <a:fld id="{DAC35DB0-0D5A-4AF5-B91D-F5AC233569C2}" type="datetime1">
               <a:rPr lang="en-US" smtClean="0"/>
-              <a:t>7/27/2023</a:t>
+              <a:t>7/30/2023</a:t>
             </a:fld>
             <a:endParaRPr lang="en-US"/>
           </a:p>
@@ -12885,7 +12965,7 @@
           <a:p>
             <a:fld id="{22AFDDC1-071C-48BE-AEB0-C522838D21A3}" type="datetime1">
               <a:rPr lang="en-US" smtClean="0"/>
-              <a:t>7/27/2023</a:t>
+              <a:t>7/30/2023</a:t>
             </a:fld>
             <a:endParaRPr lang="en-US"/>
           </a:p>
@@ -13402,6 +13482,153 @@
             </a:br>
             <a:r>
               <a:rPr lang="en-US" sz="1800" dirty="0"/>
+              <a:t>Built-In to Operating System</a:t>
+            </a:r>
+          </a:p>
+        </p:txBody>
+      </p:sp>
+      <p:pic>
+        <p:nvPicPr>
+          <p:cNvPr id="5" name="Picture 4" descr="Windows Accessibility settings window with options to alter the visual appearance of windows, change audio settings, and change certain interaction behaviors to better suite your needs.">
+            <a:extLst>
+              <a:ext uri="{FF2B5EF4-FFF2-40B4-BE49-F238E27FC236}">
+                <a16:creationId xmlns:a16="http://schemas.microsoft.com/office/drawing/2014/main" id="{33F6C664-202A-B087-D96B-10F8E817CD86}"/>
+              </a:ext>
+            </a:extLst>
+          </p:cNvPr>
+          <p:cNvPicPr>
+            <a:picLocks noChangeAspect="1"/>
+          </p:cNvPicPr>
+          <p:nvPr/>
+        </p:nvPicPr>
+        <p:blipFill>
+          <a:blip r:embed="rId3"/>
+          <a:stretch>
+            <a:fillRect/>
+          </a:stretch>
+        </p:blipFill>
+        <p:spPr>
+          <a:xfrm>
+            <a:off x="685799" y="1789022"/>
+            <a:ext cx="6028350" cy="4684259"/>
+          </a:xfrm>
+          <a:prstGeom prst="rect">
+            <a:avLst/>
+          </a:prstGeom>
+        </p:spPr>
+      </p:pic>
+      <p:pic>
+        <p:nvPicPr>
+          <p:cNvPr id="1028" name="Picture 4" descr="MacOS Accessibility Shortcuts divided up into categories for vision, motor, and hearing.">
+            <a:extLst>
+              <a:ext uri="{FF2B5EF4-FFF2-40B4-BE49-F238E27FC236}">
+                <a16:creationId xmlns:a16="http://schemas.microsoft.com/office/drawing/2014/main" id="{801FDBB5-D9E9-3474-A1D1-27EEF42F9C3B}"/>
+              </a:ext>
+            </a:extLst>
+          </p:cNvPr>
+          <p:cNvPicPr>
+            <a:picLocks noChangeAspect="1" noChangeArrowheads="1"/>
+          </p:cNvPicPr>
+          <p:nvPr/>
+        </p:nvPicPr>
+        <p:blipFill>
+          <a:blip r:embed="rId4">
+            <a:extLst>
+              <a:ext uri="{28A0092B-C50C-407E-A947-70E740481C1C}">
+                <a14:useLocalDpi xmlns:a14="http://schemas.microsoft.com/office/drawing/2010/main" val="0"/>
+              </a:ext>
+            </a:extLst>
+          </a:blip>
+          <a:srcRect/>
+          <a:stretch>
+            <a:fillRect/>
+          </a:stretch>
+        </p:blipFill>
+        <p:spPr bwMode="auto">
+          <a:xfrm>
+            <a:off x="7615646" y="2017225"/>
+            <a:ext cx="2399256" cy="4456056"/>
+          </a:xfrm>
+          <a:prstGeom prst="rect">
+            <a:avLst/>
+          </a:prstGeom>
+          <a:noFill/>
+          <a:extLst>
+            <a:ext uri="{909E8E84-426E-40DD-AFC4-6F175D3DCCD1}">
+              <a14:hiddenFill xmlns:a14="http://schemas.microsoft.com/office/drawing/2010/main">
+                <a:solidFill>
+                  <a:srgbClr val="FFFFFF"/>
+                </a:solidFill>
+              </a14:hiddenFill>
+            </a:ext>
+          </a:extLst>
+        </p:spPr>
+      </p:pic>
+    </p:spTree>
+    <p:extLst>
+      <p:ext uri="{BB962C8B-B14F-4D97-AF65-F5344CB8AC3E}">
+        <p14:creationId xmlns:p14="http://schemas.microsoft.com/office/powerpoint/2010/main" val="941048227"/>
+      </p:ext>
+    </p:extLst>
+  </p:cSld>
+  <p:clrMapOvr>
+    <a:masterClrMapping/>
+  </p:clrMapOvr>
+</p:sld>
+</file>
+
+<file path=ppt/slides/slide11.xml><?xml version="1.0" encoding="utf-8"?>
+<p:sld xmlns:a="http://schemas.openxmlformats.org/drawingml/2006/main" xmlns:r="http://schemas.openxmlformats.org/officeDocument/2006/relationships" xmlns:p="http://schemas.openxmlformats.org/presentationml/2006/main">
+  <p:cSld>
+    <p:spTree>
+      <p:nvGrpSpPr>
+        <p:cNvPr id="1" name=""/>
+        <p:cNvGrpSpPr/>
+        <p:nvPr/>
+      </p:nvGrpSpPr>
+      <p:grpSpPr>
+        <a:xfrm>
+          <a:off x="0" y="0"/>
+          <a:ext cx="0" cy="0"/>
+          <a:chOff x="0" y="0"/>
+          <a:chExt cx="0" cy="0"/>
+        </a:xfrm>
+      </p:grpSpPr>
+      <p:sp>
+        <p:nvSpPr>
+          <p:cNvPr id="2" name="Title 1">
+            <a:extLst>
+              <a:ext uri="{FF2B5EF4-FFF2-40B4-BE49-F238E27FC236}">
+                <a16:creationId xmlns:a16="http://schemas.microsoft.com/office/drawing/2014/main" id="{BFBE0A40-EF52-730B-174C-8DEE5AF23CE4}"/>
+              </a:ext>
+            </a:extLst>
+          </p:cNvPr>
+          <p:cNvSpPr>
+            <a:spLocks noGrp="1"/>
+          </p:cNvSpPr>
+          <p:nvPr>
+            <p:ph type="title"/>
+          </p:nvPr>
+        </p:nvSpPr>
+        <p:spPr>
+          <a:xfrm>
+            <a:off x="1" y="764373"/>
+            <a:ext cx="11506200" cy="1293028"/>
+          </a:xfrm>
+        </p:spPr>
+        <p:txBody>
+          <a:bodyPr/>
+          <a:lstStyle/>
+          <a:p>
+            <a:r>
+              <a:rPr lang="en-US" dirty="0"/>
+              <a:t>Tools and resources</a:t>
+            </a:r>
+            <a:br>
+              <a:rPr lang="en-US" dirty="0"/>
+            </a:br>
+            <a:r>
+              <a:rPr lang="en-US" sz="1800" dirty="0"/>
               <a:t>CCA by </a:t>
             </a:r>
             <a:r>
@@ -13485,7 +13712,7 @@
 </p:sld>
 </file>
 
-<file path=ppt/slides/slide11.xml><?xml version="1.0" encoding="utf-8"?>
+<file path=ppt/slides/slide12.xml><?xml version="1.0" encoding="utf-8"?>
 <p:sld xmlns:a="http://schemas.openxmlformats.org/drawingml/2006/main" xmlns:r="http://schemas.openxmlformats.org/officeDocument/2006/relationships" xmlns:p="http://schemas.openxmlformats.org/presentationml/2006/main">
   <p:cSld>
     <p:spTree>
@@ -13685,7 +13912,7 @@
 </p:sld>
 </file>
 
-<file path=ppt/slides/slide12.xml><?xml version="1.0" encoding="utf-8"?>
+<file path=ppt/slides/slide13.xml><?xml version="1.0" encoding="utf-8"?>
 <p:sld xmlns:a="http://schemas.openxmlformats.org/drawingml/2006/main" xmlns:r="http://schemas.openxmlformats.org/officeDocument/2006/relationships" xmlns:p="http://schemas.openxmlformats.org/presentationml/2006/main">
   <p:cSld>
     <p:spTree>
@@ -13815,7 +14042,7 @@
 </p:sld>
 </file>
 
-<file path=ppt/slides/slide13.xml><?xml version="1.0" encoding="utf-8"?>
+<file path=ppt/slides/slide14.xml><?xml version="1.0" encoding="utf-8"?>
 <p:sld xmlns:a="http://schemas.openxmlformats.org/drawingml/2006/main" xmlns:r="http://schemas.openxmlformats.org/officeDocument/2006/relationships" xmlns:p="http://schemas.openxmlformats.org/presentationml/2006/main">
   <p:cSld>
     <p:spTree>
@@ -13915,248 +14142,6 @@
 </p:sld>
 </file>
 
-<file path=ppt/slides/slide14.xml><?xml version="1.0" encoding="utf-8"?>
-<p:sld xmlns:a="http://schemas.openxmlformats.org/drawingml/2006/main" xmlns:r="http://schemas.openxmlformats.org/officeDocument/2006/relationships" xmlns:p="http://schemas.openxmlformats.org/presentationml/2006/main">
-  <p:cSld>
-    <p:spTree>
-      <p:nvGrpSpPr>
-        <p:cNvPr id="1" name=""/>
-        <p:cNvGrpSpPr/>
-        <p:nvPr/>
-      </p:nvGrpSpPr>
-      <p:grpSpPr>
-        <a:xfrm>
-          <a:off x="0" y="0"/>
-          <a:ext cx="0" cy="0"/>
-          <a:chOff x="0" y="0"/>
-          <a:chExt cx="0" cy="0"/>
-        </a:xfrm>
-      </p:grpSpPr>
-      <p:sp>
-        <p:nvSpPr>
-          <p:cNvPr id="2" name="Title 1">
-            <a:extLst>
-              <a:ext uri="{FF2B5EF4-FFF2-40B4-BE49-F238E27FC236}">
-                <a16:creationId xmlns:a16="http://schemas.microsoft.com/office/drawing/2014/main" id="{BFBE0A40-EF52-730B-174C-8DEE5AF23CE4}"/>
-              </a:ext>
-            </a:extLst>
-          </p:cNvPr>
-          <p:cNvSpPr>
-            <a:spLocks noGrp="1"/>
-          </p:cNvSpPr>
-          <p:nvPr>
-            <p:ph type="title"/>
-          </p:nvPr>
-        </p:nvSpPr>
-        <p:spPr>
-          <a:xfrm>
-            <a:off x="1" y="764373"/>
-            <a:ext cx="11506200" cy="1293028"/>
-          </a:xfrm>
-        </p:spPr>
-        <p:txBody>
-          <a:bodyPr/>
-          <a:lstStyle/>
-          <a:p>
-            <a:r>
-              <a:rPr lang="en-US" dirty="0"/>
-              <a:t>Tools and resources</a:t>
-            </a:r>
-            <a:br>
-              <a:rPr lang="en-US" dirty="0"/>
-            </a:br>
-            <a:r>
-              <a:rPr lang="en-US" sz="1800" dirty="0"/>
-              <a:t>Bookmarklets</a:t>
-            </a:r>
-          </a:p>
-        </p:txBody>
-      </p:sp>
-      <p:sp>
-        <p:nvSpPr>
-          <p:cNvPr id="6" name="TextBox 5">
-            <a:extLst>
-              <a:ext uri="{FF2B5EF4-FFF2-40B4-BE49-F238E27FC236}">
-                <a16:creationId xmlns:a16="http://schemas.microsoft.com/office/drawing/2014/main" id="{2E84A865-1719-50D2-090C-372A6B8E1E71}"/>
-              </a:ext>
-            </a:extLst>
-          </p:cNvPr>
-          <p:cNvSpPr txBox="1"/>
-          <p:nvPr/>
-        </p:nvSpPr>
-        <p:spPr>
-          <a:xfrm>
-            <a:off x="731520" y="2413337"/>
-            <a:ext cx="10528663" cy="2246769"/>
-          </a:xfrm>
-          <a:prstGeom prst="rect">
-            <a:avLst/>
-          </a:prstGeom>
-          <a:noFill/>
-        </p:spPr>
-        <p:txBody>
-          <a:bodyPr wrap="square">
-            <a:spAutoFit/>
-          </a:bodyPr>
-          <a:lstStyle/>
-          <a:p>
-            <a:pPr marL="171450" indent="-171450">
-              <a:buFont typeface="Arial" panose="020B0604020202020204" pitchFamily="34" charset="0"/>
-              <a:buChar char="•"/>
-            </a:pPr>
-            <a:r>
-              <a:rPr lang="en-US" sz="2000" b="1" i="0" u="sng" dirty="0">
-                <a:effectLst/>
-                <a:latin typeface="Calibri" panose="020F0502020204030204" pitchFamily="34" charset="0"/>
-                <a:ea typeface="Calibri" panose="020F0502020204030204" pitchFamily="34" charset="0"/>
-                <a:cs typeface="Calibri" panose="020F0502020204030204" pitchFamily="34" charset="0"/>
-                <a:hlinkClick r:id="rId3"/>
-              </a:rPr>
-              <a:t>Find Landmarks on Web Page with A11Y Bookmarklet | HolisticA11Y</a:t>
-            </a:r>
-            <a:endParaRPr lang="en-US" sz="2000" b="1" i="0" u="sng" dirty="0">
-              <a:effectLst/>
-              <a:latin typeface="Calibri" panose="020F0502020204030204" pitchFamily="34" charset="0"/>
-              <a:ea typeface="Calibri" panose="020F0502020204030204" pitchFamily="34" charset="0"/>
-              <a:cs typeface="Calibri" panose="020F0502020204030204" pitchFamily="34" charset="0"/>
-            </a:endParaRPr>
-          </a:p>
-          <a:p>
-            <a:pPr marL="171450" indent="-171450">
-              <a:buFont typeface="Arial" panose="020B0604020202020204" pitchFamily="34" charset="0"/>
-              <a:buChar char="•"/>
-            </a:pPr>
-            <a:r>
-              <a:rPr lang="en-US" sz="2000" b="1" i="0" u="none" strike="noStrike" dirty="0">
-                <a:effectLst/>
-                <a:latin typeface="Calibri" panose="020F0502020204030204" pitchFamily="34" charset="0"/>
-                <a:ea typeface="Calibri" panose="020F0502020204030204" pitchFamily="34" charset="0"/>
-                <a:cs typeface="Calibri" panose="020F0502020204030204" pitchFamily="34" charset="0"/>
-                <a:hlinkClick r:id="rId4"/>
-              </a:rPr>
-              <a:t>Forms Bookmarklet for Accessibility Testing (pauljadam.com)</a:t>
-            </a:r>
-            <a:endParaRPr lang="en-US" sz="2000" b="1" i="0" u="sng" strike="noStrike" dirty="0">
-              <a:effectLst/>
-              <a:latin typeface="Calibri" panose="020F0502020204030204" pitchFamily="34" charset="0"/>
-              <a:ea typeface="Calibri" panose="020F0502020204030204" pitchFamily="34" charset="0"/>
-              <a:cs typeface="Calibri" panose="020F0502020204030204" pitchFamily="34" charset="0"/>
-            </a:endParaRPr>
-          </a:p>
-          <a:p>
-            <a:pPr marL="171450" indent="-171450">
-              <a:buFont typeface="Arial" panose="020B0604020202020204" pitchFamily="34" charset="0"/>
-              <a:buChar char="•"/>
-            </a:pPr>
-            <a:r>
-              <a:rPr lang="en-US" sz="2000" b="1" i="0" u="none" strike="noStrike" dirty="0">
-                <a:effectLst/>
-                <a:latin typeface="Calibri" panose="020F0502020204030204" pitchFamily="34" charset="0"/>
-                <a:ea typeface="Calibri" panose="020F0502020204030204" pitchFamily="34" charset="0"/>
-                <a:cs typeface="Calibri" panose="020F0502020204030204" pitchFamily="34" charset="0"/>
-                <a:hlinkClick r:id="rId5"/>
-              </a:rPr>
-              <a:t>ARIA Bookmarklet for Accessibility Testing (pauljadam.com)</a:t>
-            </a:r>
-            <a:endParaRPr lang="en-US" sz="2000" b="1" i="0" u="sng" strike="noStrike" dirty="0">
-              <a:effectLst/>
-              <a:latin typeface="Calibri" panose="020F0502020204030204" pitchFamily="34" charset="0"/>
-              <a:ea typeface="Calibri" panose="020F0502020204030204" pitchFamily="34" charset="0"/>
-              <a:cs typeface="Calibri" panose="020F0502020204030204" pitchFamily="34" charset="0"/>
-            </a:endParaRPr>
-          </a:p>
-          <a:p>
-            <a:pPr marL="171450" indent="-171450">
-              <a:buFont typeface="Arial" panose="020B0604020202020204" pitchFamily="34" charset="0"/>
-              <a:buChar char="•"/>
-            </a:pPr>
-            <a:r>
-              <a:rPr lang="en-US" sz="2000" b="1" i="0" u="sng" strike="noStrike" dirty="0">
-                <a:effectLst/>
-                <a:latin typeface="Calibri" panose="020F0502020204030204" pitchFamily="34" charset="0"/>
-                <a:ea typeface="Calibri" panose="020F0502020204030204" pitchFamily="34" charset="0"/>
-                <a:cs typeface="Calibri" panose="020F0502020204030204" pitchFamily="34" charset="0"/>
-              </a:rPr>
-              <a:t>Text spacing bookmarklet - </a:t>
-            </a:r>
-            <a:r>
-              <a:rPr lang="en-US" sz="2000" b="1" dirty="0">
-                <a:latin typeface="Calibri" panose="020F0502020204030204" pitchFamily="34" charset="0"/>
-                <a:ea typeface="Calibri" panose="020F0502020204030204" pitchFamily="34" charset="0"/>
-                <a:cs typeface="Calibri" panose="020F0502020204030204" pitchFamily="34" charset="0"/>
-                <a:hlinkClick r:id="rId6"/>
-              </a:rPr>
-              <a:t>Bookmarklets (dylanb.github.io)</a:t>
-            </a:r>
-            <a:endParaRPr lang="en-US" sz="2000" b="1" dirty="0">
-              <a:latin typeface="Calibri" panose="020F0502020204030204" pitchFamily="34" charset="0"/>
-              <a:ea typeface="Calibri" panose="020F0502020204030204" pitchFamily="34" charset="0"/>
-              <a:cs typeface="Calibri" panose="020F0502020204030204" pitchFamily="34" charset="0"/>
-            </a:endParaRPr>
-          </a:p>
-          <a:p>
-            <a:pPr marL="171450" indent="-171450">
-              <a:buFont typeface="Arial" panose="020B0604020202020204" pitchFamily="34" charset="0"/>
-              <a:buChar char="•"/>
-            </a:pPr>
-            <a:r>
-              <a:rPr lang="en-US" sz="2000" b="1" dirty="0">
-                <a:latin typeface="Calibri" panose="020F0502020204030204" pitchFamily="34" charset="0"/>
-                <a:ea typeface="Calibri" panose="020F0502020204030204" pitchFamily="34" charset="0"/>
-                <a:cs typeface="Calibri" panose="020F0502020204030204" pitchFamily="34" charset="0"/>
-              </a:rPr>
-              <a:t>Assorted Accessibility Bookmarklets for Landmarks, Headings, and more: </a:t>
-            </a:r>
-            <a:r>
-              <a:rPr lang="en-US" sz="2000" b="1" dirty="0">
-                <a:latin typeface="Calibri" panose="020F0502020204030204" pitchFamily="34" charset="0"/>
-                <a:ea typeface="Calibri" panose="020F0502020204030204" pitchFamily="34" charset="0"/>
-                <a:cs typeface="Calibri" panose="020F0502020204030204" pitchFamily="34" charset="0"/>
-                <a:hlinkClick r:id="rId7"/>
-              </a:rPr>
-              <a:t>Accessibility Bookmarklets (accessibility-bookmarklets.org)</a:t>
-            </a:r>
-            <a:endParaRPr lang="en-US" sz="2000" b="1" dirty="0">
-              <a:latin typeface="Calibri" panose="020F0502020204030204" pitchFamily="34" charset="0"/>
-              <a:ea typeface="Calibri" panose="020F0502020204030204" pitchFamily="34" charset="0"/>
-              <a:cs typeface="Calibri" panose="020F0502020204030204" pitchFamily="34" charset="0"/>
-            </a:endParaRPr>
-          </a:p>
-          <a:p>
-            <a:pPr marL="171450" indent="-171450">
-              <a:buFont typeface="Arial" panose="020B0604020202020204" pitchFamily="34" charset="0"/>
-              <a:buChar char="•"/>
-            </a:pPr>
-            <a:r>
-              <a:rPr lang="en-US" sz="2000" b="1" dirty="0">
-                <a:latin typeface="Calibri" panose="020F0502020204030204" pitchFamily="34" charset="0"/>
-                <a:ea typeface="Calibri" panose="020F0502020204030204" pitchFamily="34" charset="0"/>
-                <a:cs typeface="Calibri" panose="020F0502020204030204" pitchFamily="34" charset="0"/>
-                <a:hlinkClick r:id="rId8"/>
-              </a:rPr>
-              <a:t>ANDI - Accessibility Testing Tool - Install (ssa.gov)</a:t>
-            </a:r>
-            <a:endParaRPr lang="en-US" sz="2000" b="1" dirty="0">
-              <a:latin typeface="Calibri" panose="020F0502020204030204" pitchFamily="34" charset="0"/>
-              <a:ea typeface="Calibri" panose="020F0502020204030204" pitchFamily="34" charset="0"/>
-              <a:cs typeface="Calibri" panose="020F0502020204030204" pitchFamily="34" charset="0"/>
-            </a:endParaRPr>
-          </a:p>
-        </p:txBody>
-      </p:sp>
-    </p:spTree>
-    <p:extLst>
-      <p:ext uri="{BB962C8B-B14F-4D97-AF65-F5344CB8AC3E}">
-        <p14:creationId xmlns:p14="http://schemas.microsoft.com/office/powerpoint/2010/main" val="3740727404"/>
-      </p:ext>
-    </p:extLst>
-  </p:cSld>
-  <p:clrMapOvr>
-    <a:masterClrMapping/>
-  </p:clrMapOvr>
-</p:sld>
-</file>
-
 <file path=ppt/slides/slide15.xml><?xml version="1.0" encoding="utf-8"?>
 <p:sld xmlns:a="http://schemas.openxmlformats.org/drawingml/2006/main" xmlns:r="http://schemas.openxmlformats.org/officeDocument/2006/relationships" xmlns:p="http://schemas.openxmlformats.org/presentationml/2006/main">
   <p:cSld>
@@ -14197,9 +14182,7 @@
           </a:xfrm>
         </p:spPr>
         <p:txBody>
-          <a:bodyPr>
-            <a:normAutofit fontScale="90000"/>
-          </a:bodyPr>
+          <a:bodyPr/>
           <a:lstStyle/>
           <a:p>
             <a:r>
@@ -14210,243 +14193,296 @@
               <a:rPr lang="en-US" dirty="0"/>
             </a:br>
             <a:r>
-              <a:rPr lang="en-US" sz="2000" dirty="0"/>
-              <a:t>Additional Resources</a:t>
-            </a:r>
-            <a:br>
-              <a:rPr lang="en-US" dirty="0"/>
-            </a:br>
-            <a:endParaRPr lang="en-US" dirty="0"/>
-          </a:p>
-        </p:txBody>
-      </p:sp>
-      <p:sp>
-        <p:nvSpPr>
-          <p:cNvPr id="3" name="Content Placeholder 2">
+              <a:rPr lang="en-US" sz="1800" dirty="0"/>
+              <a:t>Bookmarklets</a:t>
+            </a:r>
+          </a:p>
+        </p:txBody>
+      </p:sp>
+      <p:sp>
+        <p:nvSpPr>
+          <p:cNvPr id="6" name="TextBox 5">
             <a:extLst>
               <a:ext uri="{FF2B5EF4-FFF2-40B4-BE49-F238E27FC236}">
-                <a16:creationId xmlns:a16="http://schemas.microsoft.com/office/drawing/2014/main" id="{7829BE99-CC9F-E89F-67D7-DD0AF66AC11A}"/>
+                <a16:creationId xmlns:a16="http://schemas.microsoft.com/office/drawing/2014/main" id="{2E84A865-1719-50D2-090C-372A6B8E1E71}"/>
               </a:ext>
             </a:extLst>
           </p:cNvPr>
-          <p:cNvSpPr>
-            <a:spLocks noGrp="1"/>
-          </p:cNvSpPr>
-          <p:nvPr>
-            <p:ph idx="1"/>
-          </p:nvPr>
+          <p:cNvSpPr txBox="1"/>
+          <p:nvPr/>
         </p:nvSpPr>
         <p:spPr>
           <a:xfrm>
-            <a:off x="685798" y="1801028"/>
-            <a:ext cx="10820403" cy="4717338"/>
+            <a:off x="731520" y="2413337"/>
+            <a:ext cx="10528663" cy="2246769"/>
           </a:xfrm>
+          <a:prstGeom prst="rect">
+            <a:avLst/>
+          </a:prstGeom>
+          <a:noFill/>
         </p:spPr>
         <p:txBody>
-          <a:bodyPr>
-            <a:noAutofit/>
+          <a:bodyPr wrap="square">
+            <a:spAutoFit/>
           </a:bodyPr>
           <a:lstStyle/>
           <a:p>
-            <a:r>
-              <a:rPr lang="en-US" sz="1600" b="1" dirty="0">
-                <a:hlinkClick r:id="rId3"/>
+            <a:pPr marL="171450" indent="-171450">
+              <a:buFont typeface="Arial" panose="020B0604020202020204" pitchFamily="34" charset="0"/>
+              <a:buChar char="•"/>
+            </a:pPr>
+            <a:r>
+              <a:rPr lang="en-US" sz="2000" b="1" i="0" u="sng" dirty="0">
+                <a:solidFill>
+                  <a:schemeClr val="accent6">
+                    <a:lumMod val="60000"/>
+                    <a:lumOff val="40000"/>
+                  </a:schemeClr>
+                </a:solidFill>
+                <a:effectLst/>
+                <a:latin typeface="Calibri" panose="020F0502020204030204" pitchFamily="34" charset="0"/>
+                <a:ea typeface="Calibri" panose="020F0502020204030204" pitchFamily="34" charset="0"/>
+                <a:cs typeface="Calibri" panose="020F0502020204030204" pitchFamily="34" charset="0"/>
+                <a:hlinkClick r:id="rId3">
+                  <a:extLst>
+                    <a:ext uri="{A12FA001-AC4F-418D-AE19-62706E023703}">
+                      <ahyp:hlinkClr xmlns:ahyp="http://schemas.microsoft.com/office/drawing/2018/hyperlinkcolor" val="tx"/>
+                    </a:ext>
+                  </a:extLst>
+                </a:hlinkClick>
               </a:rPr>
-              <a:t>Accessibility Insights</a:t>
-            </a:r>
-            <a:r>
-              <a:rPr lang="en-US" sz="1600" dirty="0"/>
-              <a:t> – Accessibility testing tool made by Microsoft</a:t>
-            </a:r>
-          </a:p>
-          <a:p>
-            <a:pPr lvl="1"/>
-            <a:r>
-              <a:rPr lang="en-US" sz="1600" dirty="0"/>
-              <a:t>Has browser extension and desktop application versions</a:t>
-            </a:r>
-          </a:p>
-          <a:p>
-            <a:pPr lvl="1"/>
-            <a:r>
-              <a:rPr lang="en-US" sz="1600" dirty="0"/>
-              <a:t>Also have the option to include the automated tests in CI/CD</a:t>
-            </a:r>
-          </a:p>
-          <a:p>
-            <a:pPr lvl="1"/>
-            <a:r>
-              <a:rPr lang="en-US" sz="1600" dirty="0"/>
-              <a:t>DON’T depend on automated tests</a:t>
-            </a:r>
-          </a:p>
-          <a:p>
-            <a:r>
-              <a:rPr lang="en-US" sz="1600" b="1" dirty="0">
-                <a:hlinkClick r:id="rId4"/>
+              <a:t>Find Landmarks on Web Page with A11Y Bookmarklet | HolisticA11Y</a:t>
+            </a:r>
+            <a:endParaRPr lang="en-US" sz="2000" b="1" i="0" u="sng" dirty="0">
+              <a:solidFill>
+                <a:schemeClr val="accent6">
+                  <a:lumMod val="60000"/>
+                  <a:lumOff val="40000"/>
+                </a:schemeClr>
+              </a:solidFill>
+              <a:effectLst/>
+              <a:latin typeface="Calibri" panose="020F0502020204030204" pitchFamily="34" charset="0"/>
+              <a:ea typeface="Calibri" panose="020F0502020204030204" pitchFamily="34" charset="0"/>
+              <a:cs typeface="Calibri" panose="020F0502020204030204" pitchFamily="34" charset="0"/>
+            </a:endParaRPr>
+          </a:p>
+          <a:p>
+            <a:pPr marL="171450" indent="-171450">
+              <a:buFont typeface="Arial" panose="020B0604020202020204" pitchFamily="34" charset="0"/>
+              <a:buChar char="•"/>
+            </a:pPr>
+            <a:r>
+              <a:rPr lang="en-US" sz="2000" b="1" i="0" u="none" strike="noStrike" dirty="0">
+                <a:solidFill>
+                  <a:schemeClr val="accent6">
+                    <a:lumMod val="60000"/>
+                    <a:lumOff val="40000"/>
+                  </a:schemeClr>
+                </a:solidFill>
+                <a:effectLst/>
+                <a:latin typeface="Calibri" panose="020F0502020204030204" pitchFamily="34" charset="0"/>
+                <a:ea typeface="Calibri" panose="020F0502020204030204" pitchFamily="34" charset="0"/>
+                <a:cs typeface="Calibri" panose="020F0502020204030204" pitchFamily="34" charset="0"/>
+                <a:hlinkClick r:id="rId4">
+                  <a:extLst>
+                    <a:ext uri="{A12FA001-AC4F-418D-AE19-62706E023703}">
+                      <ahyp:hlinkClr xmlns:ahyp="http://schemas.microsoft.com/office/drawing/2018/hyperlinkcolor" val="tx"/>
+                    </a:ext>
+                  </a:extLst>
+                </a:hlinkClick>
               </a:rPr>
-              <a:t>NVDA</a:t>
-            </a:r>
-            <a:r>
-              <a:rPr lang="en-US" sz="1600" dirty="0"/>
-              <a:t> – free, open-sourced screen reader</a:t>
-            </a:r>
-          </a:p>
-          <a:p>
-            <a:pPr lvl="1"/>
-            <a:r>
-              <a:rPr lang="en-US" sz="1600" dirty="0"/>
-              <a:t>View keyboard shortcuts on at the Deque article entitled: </a:t>
-            </a:r>
-            <a:r>
-              <a:rPr lang="en-US" sz="1600" b="1" dirty="0">
-                <a:hlinkClick r:id="rId5"/>
+              <a:t>Forms Bookmarklet for Accessibility Testing (pauljadam.com)</a:t>
+            </a:r>
+            <a:endParaRPr lang="en-US" sz="2000" b="1" i="0" u="sng" strike="noStrike" dirty="0">
+              <a:solidFill>
+                <a:schemeClr val="accent6">
+                  <a:lumMod val="60000"/>
+                  <a:lumOff val="40000"/>
+                </a:schemeClr>
+              </a:solidFill>
+              <a:effectLst/>
+              <a:latin typeface="Calibri" panose="020F0502020204030204" pitchFamily="34" charset="0"/>
+              <a:ea typeface="Calibri" panose="020F0502020204030204" pitchFamily="34" charset="0"/>
+              <a:cs typeface="Calibri" panose="020F0502020204030204" pitchFamily="34" charset="0"/>
+            </a:endParaRPr>
+          </a:p>
+          <a:p>
+            <a:pPr marL="171450" indent="-171450">
+              <a:buFont typeface="Arial" panose="020B0604020202020204" pitchFamily="34" charset="0"/>
+              <a:buChar char="•"/>
+            </a:pPr>
+            <a:r>
+              <a:rPr lang="en-US" sz="2000" b="1" i="0" u="none" strike="noStrike" dirty="0">
+                <a:solidFill>
+                  <a:schemeClr val="accent6">
+                    <a:lumMod val="60000"/>
+                    <a:lumOff val="40000"/>
+                  </a:schemeClr>
+                </a:solidFill>
+                <a:effectLst/>
+                <a:latin typeface="Calibri" panose="020F0502020204030204" pitchFamily="34" charset="0"/>
+                <a:ea typeface="Calibri" panose="020F0502020204030204" pitchFamily="34" charset="0"/>
+                <a:cs typeface="Calibri" panose="020F0502020204030204" pitchFamily="34" charset="0"/>
+                <a:hlinkClick r:id="rId5">
+                  <a:extLst>
+                    <a:ext uri="{A12FA001-AC4F-418D-AE19-62706E023703}">
+                      <ahyp:hlinkClr xmlns:ahyp="http://schemas.microsoft.com/office/drawing/2018/hyperlinkcolor" val="tx"/>
+                    </a:ext>
+                  </a:extLst>
+                </a:hlinkClick>
               </a:rPr>
-              <a:t>NVDA Keyboard Shortcuts</a:t>
-            </a:r>
-            <a:r>
-              <a:rPr lang="en-US" sz="1600" dirty="0"/>
-              <a:t>.</a:t>
-            </a:r>
-          </a:p>
-          <a:p>
-            <a:r>
-              <a:rPr lang="en-US" sz="1600" b="1" dirty="0"/>
-              <a:t>Narrator</a:t>
-            </a:r>
-            <a:r>
-              <a:rPr lang="en-US" sz="1600" dirty="0"/>
-              <a:t> – screen reader built-in to Windows.</a:t>
-            </a:r>
-          </a:p>
-          <a:p>
-            <a:pPr lvl="1"/>
-            <a:r>
-              <a:rPr lang="en-US" sz="1600" dirty="0"/>
-              <a:t>View keyboard shortcuts for Narrator in the Deque article entitled </a:t>
-            </a:r>
-            <a:r>
-              <a:rPr lang="en-US" sz="1600" b="1" dirty="0">
-                <a:hlinkClick r:id="rId6"/>
+              <a:t>ARIA Bookmarklet for Accessibility Testing (pauljadam.com)</a:t>
+            </a:r>
+            <a:endParaRPr lang="en-US" sz="2000" b="1" i="0" u="sng" strike="noStrike" dirty="0">
+              <a:solidFill>
+                <a:schemeClr val="accent6">
+                  <a:lumMod val="60000"/>
+                  <a:lumOff val="40000"/>
+                </a:schemeClr>
+              </a:solidFill>
+              <a:effectLst/>
+              <a:latin typeface="Calibri" panose="020F0502020204030204" pitchFamily="34" charset="0"/>
+              <a:ea typeface="Calibri" panose="020F0502020204030204" pitchFamily="34" charset="0"/>
+              <a:cs typeface="Calibri" panose="020F0502020204030204" pitchFamily="34" charset="0"/>
+            </a:endParaRPr>
+          </a:p>
+          <a:p>
+            <a:pPr marL="171450" indent="-171450">
+              <a:buFont typeface="Arial" panose="020B0604020202020204" pitchFamily="34" charset="0"/>
+              <a:buChar char="•"/>
+            </a:pPr>
+            <a:r>
+              <a:rPr lang="en-US" sz="2000" b="1" i="0" strike="noStrike" dirty="0">
+                <a:effectLst/>
+                <a:latin typeface="Calibri" panose="020F0502020204030204" pitchFamily="34" charset="0"/>
+                <a:ea typeface="Calibri" panose="020F0502020204030204" pitchFamily="34" charset="0"/>
+                <a:cs typeface="Calibri" panose="020F0502020204030204" pitchFamily="34" charset="0"/>
               </a:rPr>
-              <a:t>Narrator Keyboard Shortcuts</a:t>
-            </a:r>
-            <a:r>
-              <a:rPr lang="en-US" sz="1600" dirty="0"/>
-              <a:t>.</a:t>
-            </a:r>
-          </a:p>
-          <a:p>
-            <a:r>
-              <a:rPr lang="en-US" sz="1600" b="1" dirty="0" err="1"/>
-              <a:t>VoiceOver</a:t>
-            </a:r>
-            <a:r>
-              <a:rPr lang="en-US" sz="1600" b="1" dirty="0"/>
-              <a:t> </a:t>
-            </a:r>
-            <a:r>
-              <a:rPr lang="en-US" sz="1600" dirty="0"/>
-              <a:t>– is a built screen reader found on iOS and MacOS devices.</a:t>
-            </a:r>
-          </a:p>
-          <a:p>
-            <a:r>
-              <a:rPr lang="en-US" sz="1600" b="1" dirty="0" err="1"/>
-              <a:t>TalkBack</a:t>
-            </a:r>
-            <a:r>
-              <a:rPr lang="en-US" sz="1600" b="1" dirty="0"/>
-              <a:t> </a:t>
-            </a:r>
-            <a:r>
-              <a:rPr lang="en-US" sz="1600" dirty="0"/>
-              <a:t>– is a built screen reader found on iOS and MacOS devices.</a:t>
-            </a:r>
-          </a:p>
-          <a:p>
-            <a:r>
-              <a:rPr lang="en-US" sz="1600" b="1" dirty="0">
-                <a:hlinkClick r:id="rId7"/>
+              <a:t>Text spacing bookmarklet - </a:t>
+            </a:r>
+            <a:r>
+              <a:rPr lang="en-US" sz="2000" b="1" dirty="0">
+                <a:solidFill>
+                  <a:schemeClr val="accent6">
+                    <a:lumMod val="60000"/>
+                    <a:lumOff val="40000"/>
+                  </a:schemeClr>
+                </a:solidFill>
+                <a:latin typeface="Calibri" panose="020F0502020204030204" pitchFamily="34" charset="0"/>
+                <a:ea typeface="Calibri" panose="020F0502020204030204" pitchFamily="34" charset="0"/>
+                <a:cs typeface="Calibri" panose="020F0502020204030204" pitchFamily="34" charset="0"/>
+                <a:hlinkClick r:id="rId6">
+                  <a:extLst>
+                    <a:ext uri="{A12FA001-AC4F-418D-AE19-62706E023703}">
+                      <ahyp:hlinkClr xmlns:ahyp="http://schemas.microsoft.com/office/drawing/2018/hyperlinkcolor" val="tx"/>
+                    </a:ext>
+                  </a:extLst>
+                </a:hlinkClick>
               </a:rPr>
-              <a:t>Microsoft Accessibility</a:t>
-            </a:r>
-            <a:r>
-              <a:rPr lang="en-US" sz="1600" dirty="0">
-                <a:hlinkClick r:id="rId7"/>
+              <a:t>Bookmarklets (dylanb.github.io)</a:t>
+            </a:r>
+            <a:endParaRPr lang="en-US" sz="2000" b="1" dirty="0">
+              <a:solidFill>
+                <a:schemeClr val="accent6">
+                  <a:lumMod val="60000"/>
+                  <a:lumOff val="40000"/>
+                </a:schemeClr>
+              </a:solidFill>
+              <a:latin typeface="Calibri" panose="020F0502020204030204" pitchFamily="34" charset="0"/>
+              <a:ea typeface="Calibri" panose="020F0502020204030204" pitchFamily="34" charset="0"/>
+              <a:cs typeface="Calibri" panose="020F0502020204030204" pitchFamily="34" charset="0"/>
+            </a:endParaRPr>
+          </a:p>
+          <a:p>
+            <a:pPr marL="171450" indent="-171450">
+              <a:buFont typeface="Arial" panose="020B0604020202020204" pitchFamily="34" charset="0"/>
+              <a:buChar char="•"/>
+            </a:pPr>
+            <a:r>
+              <a:rPr lang="en-US" sz="2000" b="1" dirty="0">
+                <a:latin typeface="Calibri" panose="020F0502020204030204" pitchFamily="34" charset="0"/>
+                <a:ea typeface="Calibri" panose="020F0502020204030204" pitchFamily="34" charset="0"/>
+                <a:cs typeface="Calibri" panose="020F0502020204030204" pitchFamily="34" charset="0"/>
               </a:rPr>
-              <a:t> </a:t>
-            </a:r>
-            <a:r>
-              <a:rPr lang="en-US" sz="1600" dirty="0"/>
-              <a:t>on Twitter at </a:t>
-            </a:r>
-            <a:r>
-              <a:rPr lang="en-US" sz="1600" b="1" dirty="0">
-                <a:hlinkClick r:id="rId8"/>
+              <a:t>Assorted Accessibility Bookmarklets for Landmarks, Headings, and more: </a:t>
+            </a:r>
+            <a:r>
+              <a:rPr lang="en-US" sz="2000" b="1" dirty="0">
+                <a:solidFill>
+                  <a:schemeClr val="accent6">
+                    <a:lumMod val="60000"/>
+                    <a:lumOff val="40000"/>
+                  </a:schemeClr>
+                </a:solidFill>
+                <a:latin typeface="Calibri" panose="020F0502020204030204" pitchFamily="34" charset="0"/>
+                <a:ea typeface="Calibri" panose="020F0502020204030204" pitchFamily="34" charset="0"/>
+                <a:cs typeface="Calibri" panose="020F0502020204030204" pitchFamily="34" charset="0"/>
+                <a:hlinkClick r:id="rId7">
+                  <a:extLst>
+                    <a:ext uri="{A12FA001-AC4F-418D-AE19-62706E023703}">
+                      <ahyp:hlinkClr xmlns:ahyp="http://schemas.microsoft.com/office/drawing/2018/hyperlinkcolor" val="tx"/>
+                    </a:ext>
+                  </a:extLst>
+                </a:hlinkClick>
               </a:rPr>
-              <a:t>@MSFTEnable</a:t>
-            </a:r>
-            <a:r>
-              <a:rPr lang="en-US" sz="1600" b="1" dirty="0"/>
-              <a:t> </a:t>
-            </a:r>
-            <a:r>
-              <a:rPr lang="en-US" sz="1600" dirty="0"/>
-              <a:t>and at on the </a:t>
-            </a:r>
-            <a:r>
-              <a:rPr lang="en-US" sz="1600" dirty="0">
-                <a:hlinkClick r:id="rId7"/>
+              <a:t>Accessibility Bookmarklets (accessibility-bookmarklets.org)</a:t>
+            </a:r>
+            <a:endParaRPr lang="en-US" sz="2000" b="1" dirty="0">
+              <a:solidFill>
+                <a:schemeClr val="accent6">
+                  <a:lumMod val="60000"/>
+                  <a:lumOff val="40000"/>
+                </a:schemeClr>
+              </a:solidFill>
+              <a:latin typeface="Calibri" panose="020F0502020204030204" pitchFamily="34" charset="0"/>
+              <a:ea typeface="Calibri" panose="020F0502020204030204" pitchFamily="34" charset="0"/>
+              <a:cs typeface="Calibri" panose="020F0502020204030204" pitchFamily="34" charset="0"/>
+            </a:endParaRPr>
+          </a:p>
+          <a:p>
+            <a:pPr marL="171450" indent="-171450">
+              <a:buFont typeface="Arial" panose="020B0604020202020204" pitchFamily="34" charset="0"/>
+              <a:buChar char="•"/>
+            </a:pPr>
+            <a:r>
+              <a:rPr lang="en-US" sz="2000" b="1" dirty="0">
+                <a:solidFill>
+                  <a:schemeClr val="accent6">
+                    <a:lumMod val="60000"/>
+                    <a:lumOff val="40000"/>
+                  </a:schemeClr>
+                </a:solidFill>
+                <a:latin typeface="Calibri" panose="020F0502020204030204" pitchFamily="34" charset="0"/>
+                <a:ea typeface="Calibri" panose="020F0502020204030204" pitchFamily="34" charset="0"/>
+                <a:cs typeface="Calibri" panose="020F0502020204030204" pitchFamily="34" charset="0"/>
+                <a:hlinkClick r:id="rId8">
+                  <a:extLst>
+                    <a:ext uri="{A12FA001-AC4F-418D-AE19-62706E023703}">
+                      <ahyp:hlinkClr xmlns:ahyp="http://schemas.microsoft.com/office/drawing/2018/hyperlinkcolor" val="tx"/>
+                    </a:ext>
+                  </a:extLst>
+                </a:hlinkClick>
               </a:rPr>
-              <a:t>Microsoft Accessibility page</a:t>
-            </a:r>
-            <a:r>
-              <a:rPr lang="en-US" sz="1600" dirty="0"/>
-              <a:t>.</a:t>
-            </a:r>
-            <a:endParaRPr lang="en-US" sz="1600" b="1" dirty="0"/>
-          </a:p>
-          <a:p>
-            <a:r>
-              <a:rPr lang="en-US" sz="1600" b="1" dirty="0">
-                <a:hlinkClick r:id="rId9"/>
-              </a:rPr>
-              <a:t>Microsoft Accessibility Fundamentals course</a:t>
-            </a:r>
-            <a:endParaRPr lang="en-US" sz="1600" b="1" dirty="0"/>
-          </a:p>
-          <a:p>
-            <a:r>
-              <a:rPr lang="en-US" sz="1600" b="1" dirty="0">
-                <a:hlinkClick r:id="rId10"/>
-              </a:rPr>
-              <a:t>ANDI</a:t>
-            </a:r>
-            <a:r>
-              <a:rPr lang="en-US" sz="1600" b="1" dirty="0"/>
-              <a:t> – </a:t>
-            </a:r>
-            <a:r>
-              <a:rPr lang="en-US" sz="1600" dirty="0"/>
-              <a:t>Bookmark applet developed by the Social Security Administration to aid in Accessibility testing.</a:t>
-            </a:r>
-          </a:p>
-          <a:p>
-            <a:r>
-              <a:rPr lang="it-IT" sz="1600" b="1" dirty="0">
-                <a:hlinkClick r:id="rId11"/>
-              </a:rPr>
-              <a:t>Accessibility - Erissa Duvall (corgidev.com)</a:t>
-            </a:r>
-            <a:endParaRPr lang="en-US" sz="1600" b="1" dirty="0"/>
+              <a:t>ANDI - Accessibility Testing Tool - Install (ssa.gov)</a:t>
+            </a:r>
+            <a:endParaRPr lang="en-US" sz="2000" b="1" dirty="0">
+              <a:solidFill>
+                <a:schemeClr val="accent6">
+                  <a:lumMod val="60000"/>
+                  <a:lumOff val="40000"/>
+                </a:schemeClr>
+              </a:solidFill>
+              <a:latin typeface="Calibri" panose="020F0502020204030204" pitchFamily="34" charset="0"/>
+              <a:ea typeface="Calibri" panose="020F0502020204030204" pitchFamily="34" charset="0"/>
+              <a:cs typeface="Calibri" panose="020F0502020204030204" pitchFamily="34" charset="0"/>
+            </a:endParaRPr>
           </a:p>
         </p:txBody>
       </p:sp>
     </p:spTree>
     <p:extLst>
       <p:ext uri="{BB962C8B-B14F-4D97-AF65-F5344CB8AC3E}">
-        <p14:creationId xmlns:p14="http://schemas.microsoft.com/office/powerpoint/2010/main" val="436887274"/>
+        <p14:creationId xmlns:p14="http://schemas.microsoft.com/office/powerpoint/2010/main" val="3740727404"/>
       </p:ext>
     </p:extLst>
   </p:cSld>
@@ -14606,17 +14642,30 @@
         <p:spPr>
           <a:xfrm>
             <a:off x="1" y="764373"/>
-            <a:ext cx="11289791" cy="1293028"/>
+            <a:ext cx="11506200" cy="1293028"/>
           </a:xfrm>
         </p:spPr>
         <p:txBody>
-          <a:bodyPr/>
+          <a:bodyPr>
+            <a:normAutofit fontScale="90000"/>
+          </a:bodyPr>
           <a:lstStyle/>
           <a:p>
             <a:r>
               <a:rPr lang="en-US" dirty="0"/>
-              <a:t>Thank You!</a:t>
-            </a:r>
+              <a:t>Tools and resources</a:t>
+            </a:r>
+            <a:br>
+              <a:rPr lang="en-US" dirty="0"/>
+            </a:br>
+            <a:r>
+              <a:rPr lang="en-US" sz="2000" dirty="0"/>
+              <a:t>Additional Resources</a:t>
+            </a:r>
+            <a:br>
+              <a:rPr lang="en-US" dirty="0"/>
+            </a:br>
+            <a:endParaRPr lang="en-US" dirty="0"/>
           </a:p>
         </p:txBody>
       </p:sp>
@@ -14638,6 +14687,458 @@
         </p:nvSpPr>
         <p:spPr>
           <a:xfrm>
+            <a:off x="685798" y="1801028"/>
+            <a:ext cx="10820403" cy="4717338"/>
+          </a:xfrm>
+        </p:spPr>
+        <p:txBody>
+          <a:bodyPr>
+            <a:noAutofit/>
+          </a:bodyPr>
+          <a:lstStyle/>
+          <a:p>
+            <a:r>
+              <a:rPr lang="en-US" sz="1600" b="1" dirty="0">
+                <a:solidFill>
+                  <a:schemeClr val="accent6">
+                    <a:lumMod val="60000"/>
+                    <a:lumOff val="40000"/>
+                  </a:schemeClr>
+                </a:solidFill>
+                <a:hlinkClick r:id="rId3">
+                  <a:extLst>
+                    <a:ext uri="{A12FA001-AC4F-418D-AE19-62706E023703}">
+                      <ahyp:hlinkClr xmlns:ahyp="http://schemas.microsoft.com/office/drawing/2018/hyperlinkcolor" val="tx"/>
+                    </a:ext>
+                  </a:extLst>
+                </a:hlinkClick>
+              </a:rPr>
+              <a:t>Accessibility Insights</a:t>
+            </a:r>
+            <a:r>
+              <a:rPr lang="en-US" sz="1600" dirty="0"/>
+              <a:t> – Accessibility testing tool made by Microsoft</a:t>
+            </a:r>
+          </a:p>
+          <a:p>
+            <a:pPr lvl="1"/>
+            <a:r>
+              <a:rPr lang="en-US" sz="1600" dirty="0"/>
+              <a:t>Has browser extension and desktop application versions</a:t>
+            </a:r>
+          </a:p>
+          <a:p>
+            <a:pPr lvl="1"/>
+            <a:r>
+              <a:rPr lang="en-US" sz="1600" dirty="0"/>
+              <a:t>Also have the option to include the automated tests in CI/CD</a:t>
+            </a:r>
+          </a:p>
+          <a:p>
+            <a:pPr lvl="1"/>
+            <a:r>
+              <a:rPr lang="en-US" sz="1600" dirty="0"/>
+              <a:t>DON’T depend on automated tests</a:t>
+            </a:r>
+          </a:p>
+          <a:p>
+            <a:r>
+              <a:rPr lang="en-US" sz="1600" b="1" dirty="0">
+                <a:solidFill>
+                  <a:schemeClr val="accent6">
+                    <a:lumMod val="60000"/>
+                    <a:lumOff val="40000"/>
+                  </a:schemeClr>
+                </a:solidFill>
+                <a:hlinkClick r:id="rId4">
+                  <a:extLst>
+                    <a:ext uri="{A12FA001-AC4F-418D-AE19-62706E023703}">
+                      <ahyp:hlinkClr xmlns:ahyp="http://schemas.microsoft.com/office/drawing/2018/hyperlinkcolor" val="tx"/>
+                    </a:ext>
+                  </a:extLst>
+                </a:hlinkClick>
+              </a:rPr>
+              <a:t>NVDA</a:t>
+            </a:r>
+            <a:r>
+              <a:rPr lang="en-US" sz="1600" dirty="0"/>
+              <a:t> – free, open-sourced screen reader</a:t>
+            </a:r>
+          </a:p>
+          <a:p>
+            <a:pPr lvl="1"/>
+            <a:r>
+              <a:rPr lang="en-US" sz="1600" dirty="0"/>
+              <a:t>View keyboard shortcuts on at the Deque article entitled: </a:t>
+            </a:r>
+            <a:r>
+              <a:rPr lang="en-US" sz="1600" b="1" dirty="0">
+                <a:solidFill>
+                  <a:schemeClr val="accent6">
+                    <a:lumMod val="60000"/>
+                    <a:lumOff val="40000"/>
+                  </a:schemeClr>
+                </a:solidFill>
+                <a:hlinkClick r:id="rId5">
+                  <a:extLst>
+                    <a:ext uri="{A12FA001-AC4F-418D-AE19-62706E023703}">
+                      <ahyp:hlinkClr xmlns:ahyp="http://schemas.microsoft.com/office/drawing/2018/hyperlinkcolor" val="tx"/>
+                    </a:ext>
+                  </a:extLst>
+                </a:hlinkClick>
+              </a:rPr>
+              <a:t>NVDA Keyboard Shortcuts</a:t>
+            </a:r>
+            <a:r>
+              <a:rPr lang="en-US" sz="1600" dirty="0">
+                <a:solidFill>
+                  <a:schemeClr val="accent6">
+                    <a:lumMod val="60000"/>
+                    <a:lumOff val="40000"/>
+                  </a:schemeClr>
+                </a:solidFill>
+              </a:rPr>
+              <a:t>.</a:t>
+            </a:r>
+          </a:p>
+          <a:p>
+            <a:r>
+              <a:rPr lang="en-US" sz="1600" b="1" dirty="0"/>
+              <a:t>Narrator</a:t>
+            </a:r>
+            <a:r>
+              <a:rPr lang="en-US" sz="1600" dirty="0"/>
+              <a:t> – screen reader built-in to Windows.</a:t>
+            </a:r>
+          </a:p>
+          <a:p>
+            <a:pPr lvl="1"/>
+            <a:r>
+              <a:rPr lang="en-US" sz="1600" dirty="0"/>
+              <a:t>View keyboard shortcuts for Narrator in the Deque article entitled </a:t>
+            </a:r>
+            <a:r>
+              <a:rPr lang="en-US" sz="1600" b="1" dirty="0">
+                <a:solidFill>
+                  <a:schemeClr val="accent6">
+                    <a:lumMod val="60000"/>
+                    <a:lumOff val="40000"/>
+                  </a:schemeClr>
+                </a:solidFill>
+                <a:hlinkClick r:id="rId6">
+                  <a:extLst>
+                    <a:ext uri="{A12FA001-AC4F-418D-AE19-62706E023703}">
+                      <ahyp:hlinkClr xmlns:ahyp="http://schemas.microsoft.com/office/drawing/2018/hyperlinkcolor" val="tx"/>
+                    </a:ext>
+                  </a:extLst>
+                </a:hlinkClick>
+              </a:rPr>
+              <a:t>Narrator Keyboard Shortcuts</a:t>
+            </a:r>
+            <a:r>
+              <a:rPr lang="en-US" sz="1600" dirty="0">
+                <a:solidFill>
+                  <a:schemeClr val="accent6">
+                    <a:lumMod val="60000"/>
+                    <a:lumOff val="40000"/>
+                  </a:schemeClr>
+                </a:solidFill>
+              </a:rPr>
+              <a:t>.</a:t>
+            </a:r>
+          </a:p>
+          <a:p>
+            <a:r>
+              <a:rPr lang="en-US" sz="1600" b="1" dirty="0" err="1"/>
+              <a:t>VoiceOver</a:t>
+            </a:r>
+            <a:r>
+              <a:rPr lang="en-US" sz="1600" b="1" dirty="0"/>
+              <a:t> </a:t>
+            </a:r>
+            <a:r>
+              <a:rPr lang="en-US" sz="1600" dirty="0"/>
+              <a:t>– is a built screen reader found on iOS and MacOS devices.</a:t>
+            </a:r>
+          </a:p>
+          <a:p>
+            <a:r>
+              <a:rPr lang="en-US" sz="1600" b="1" dirty="0" err="1"/>
+              <a:t>TalkBack</a:t>
+            </a:r>
+            <a:r>
+              <a:rPr lang="en-US" sz="1600" b="1" dirty="0"/>
+              <a:t> </a:t>
+            </a:r>
+            <a:r>
+              <a:rPr lang="en-US" sz="1600" dirty="0"/>
+              <a:t>– is a built screen reader found on iOS and MacOS devices.</a:t>
+            </a:r>
+          </a:p>
+          <a:p>
+            <a:r>
+              <a:rPr lang="en-US" sz="1600" b="1" dirty="0">
+                <a:solidFill>
+                  <a:schemeClr val="accent6">
+                    <a:lumMod val="60000"/>
+                    <a:lumOff val="40000"/>
+                  </a:schemeClr>
+                </a:solidFill>
+                <a:hlinkClick r:id="rId7">
+                  <a:extLst>
+                    <a:ext uri="{A12FA001-AC4F-418D-AE19-62706E023703}">
+                      <ahyp:hlinkClr xmlns:ahyp="http://schemas.microsoft.com/office/drawing/2018/hyperlinkcolor" val="tx"/>
+                    </a:ext>
+                  </a:extLst>
+                </a:hlinkClick>
+              </a:rPr>
+              <a:t>Microsoft Accessibility</a:t>
+            </a:r>
+            <a:r>
+              <a:rPr lang="en-US" sz="1600" dirty="0">
+                <a:solidFill>
+                  <a:schemeClr val="accent6">
+                    <a:lumMod val="60000"/>
+                    <a:lumOff val="40000"/>
+                  </a:schemeClr>
+                </a:solidFill>
+                <a:hlinkClick r:id="rId7">
+                  <a:extLst>
+                    <a:ext uri="{A12FA001-AC4F-418D-AE19-62706E023703}">
+                      <ahyp:hlinkClr xmlns:ahyp="http://schemas.microsoft.com/office/drawing/2018/hyperlinkcolor" val="tx"/>
+                    </a:ext>
+                  </a:extLst>
+                </a:hlinkClick>
+              </a:rPr>
+              <a:t> </a:t>
+            </a:r>
+            <a:r>
+              <a:rPr lang="en-US" sz="1600" dirty="0"/>
+              <a:t>on Twitter at </a:t>
+            </a:r>
+            <a:r>
+              <a:rPr lang="en-US" sz="1600" b="1" dirty="0">
+                <a:solidFill>
+                  <a:schemeClr val="accent6">
+                    <a:lumMod val="60000"/>
+                    <a:lumOff val="40000"/>
+                  </a:schemeClr>
+                </a:solidFill>
+                <a:hlinkClick r:id="rId8">
+                  <a:extLst>
+                    <a:ext uri="{A12FA001-AC4F-418D-AE19-62706E023703}">
+                      <ahyp:hlinkClr xmlns:ahyp="http://schemas.microsoft.com/office/drawing/2018/hyperlinkcolor" val="tx"/>
+                    </a:ext>
+                  </a:extLst>
+                </a:hlinkClick>
+              </a:rPr>
+              <a:t>@MSFTEnable</a:t>
+            </a:r>
+            <a:r>
+              <a:rPr lang="en-US" sz="1600" b="1" dirty="0"/>
+              <a:t> </a:t>
+            </a:r>
+            <a:r>
+              <a:rPr lang="en-US" sz="1600" dirty="0"/>
+              <a:t>and at on the </a:t>
+            </a:r>
+            <a:r>
+              <a:rPr lang="en-US" sz="1600" b="1" dirty="0">
+                <a:solidFill>
+                  <a:schemeClr val="accent6">
+                    <a:lumMod val="60000"/>
+                    <a:lumOff val="40000"/>
+                  </a:schemeClr>
+                </a:solidFill>
+                <a:hlinkClick r:id="rId7">
+                  <a:extLst>
+                    <a:ext uri="{A12FA001-AC4F-418D-AE19-62706E023703}">
+                      <ahyp:hlinkClr xmlns:ahyp="http://schemas.microsoft.com/office/drawing/2018/hyperlinkcolor" val="tx"/>
+                    </a:ext>
+                  </a:extLst>
+                </a:hlinkClick>
+              </a:rPr>
+              <a:t>Microsoft Accessibility page</a:t>
+            </a:r>
+            <a:r>
+              <a:rPr lang="en-US" sz="1600" b="1" dirty="0">
+                <a:solidFill>
+                  <a:schemeClr val="accent6">
+                    <a:lumMod val="60000"/>
+                    <a:lumOff val="40000"/>
+                  </a:schemeClr>
+                </a:solidFill>
+              </a:rPr>
+              <a:t>.</a:t>
+            </a:r>
+          </a:p>
+          <a:p>
+            <a:r>
+              <a:rPr lang="en-US" sz="1600" b="1" dirty="0">
+                <a:solidFill>
+                  <a:schemeClr val="accent6">
+                    <a:lumMod val="60000"/>
+                    <a:lumOff val="40000"/>
+                  </a:schemeClr>
+                </a:solidFill>
+                <a:hlinkClick r:id="rId9">
+                  <a:extLst>
+                    <a:ext uri="{A12FA001-AC4F-418D-AE19-62706E023703}">
+                      <ahyp:hlinkClr xmlns:ahyp="http://schemas.microsoft.com/office/drawing/2018/hyperlinkcolor" val="tx"/>
+                    </a:ext>
+                  </a:extLst>
+                </a:hlinkClick>
+              </a:rPr>
+              <a:t>Microsoft Accessibility Fundamentals course</a:t>
+            </a:r>
+            <a:endParaRPr lang="en-US" sz="1600" b="1" dirty="0">
+              <a:solidFill>
+                <a:schemeClr val="accent6">
+                  <a:lumMod val="60000"/>
+                  <a:lumOff val="40000"/>
+                </a:schemeClr>
+              </a:solidFill>
+            </a:endParaRPr>
+          </a:p>
+          <a:p>
+            <a:r>
+              <a:rPr lang="en-US" sz="1600" b="1" dirty="0">
+                <a:solidFill>
+                  <a:schemeClr val="accent6">
+                    <a:lumMod val="60000"/>
+                    <a:lumOff val="40000"/>
+                  </a:schemeClr>
+                </a:solidFill>
+                <a:hlinkClick r:id="rId10">
+                  <a:extLst>
+                    <a:ext uri="{A12FA001-AC4F-418D-AE19-62706E023703}">
+                      <ahyp:hlinkClr xmlns:ahyp="http://schemas.microsoft.com/office/drawing/2018/hyperlinkcolor" val="tx"/>
+                    </a:ext>
+                  </a:extLst>
+                </a:hlinkClick>
+              </a:rPr>
+              <a:t>ANDI</a:t>
+            </a:r>
+            <a:r>
+              <a:rPr lang="en-US" sz="1600" b="1" dirty="0"/>
+              <a:t> – </a:t>
+            </a:r>
+            <a:r>
+              <a:rPr lang="en-US" sz="1600" dirty="0"/>
+              <a:t>Bookmark applet developed by the Social Security Administration to aid in Accessibility testing.</a:t>
+            </a:r>
+          </a:p>
+          <a:p>
+            <a:r>
+              <a:rPr lang="it-IT" sz="1600" b="1" dirty="0">
+                <a:solidFill>
+                  <a:schemeClr val="accent6">
+                    <a:lumMod val="60000"/>
+                    <a:lumOff val="40000"/>
+                  </a:schemeClr>
+                </a:solidFill>
+                <a:hlinkClick r:id="rId11">
+                  <a:extLst>
+                    <a:ext uri="{A12FA001-AC4F-418D-AE19-62706E023703}">
+                      <ahyp:hlinkClr xmlns:ahyp="http://schemas.microsoft.com/office/drawing/2018/hyperlinkcolor" val="tx"/>
+                    </a:ext>
+                  </a:extLst>
+                </a:hlinkClick>
+              </a:rPr>
+              <a:t>Accessibility - Erissa Duvall (corgidev.com)</a:t>
+            </a:r>
+            <a:endParaRPr lang="en-US" sz="1600" b="1" dirty="0">
+              <a:solidFill>
+                <a:schemeClr val="accent6">
+                  <a:lumMod val="60000"/>
+                  <a:lumOff val="40000"/>
+                </a:schemeClr>
+              </a:solidFill>
+            </a:endParaRPr>
+          </a:p>
+        </p:txBody>
+      </p:sp>
+    </p:spTree>
+    <p:extLst>
+      <p:ext uri="{BB962C8B-B14F-4D97-AF65-F5344CB8AC3E}">
+        <p14:creationId xmlns:p14="http://schemas.microsoft.com/office/powerpoint/2010/main" val="436887274"/>
+      </p:ext>
+    </p:extLst>
+  </p:cSld>
+  <p:clrMapOvr>
+    <a:masterClrMapping/>
+  </p:clrMapOvr>
+</p:sld>
+</file>
+
+<file path=ppt/slides/slide18.xml><?xml version="1.0" encoding="utf-8"?>
+<p:sld xmlns:a="http://schemas.openxmlformats.org/drawingml/2006/main" xmlns:r="http://schemas.openxmlformats.org/officeDocument/2006/relationships" xmlns:p="http://schemas.openxmlformats.org/presentationml/2006/main">
+  <p:cSld>
+    <p:spTree>
+      <p:nvGrpSpPr>
+        <p:cNvPr id="1" name=""/>
+        <p:cNvGrpSpPr/>
+        <p:nvPr/>
+      </p:nvGrpSpPr>
+      <p:grpSpPr>
+        <a:xfrm>
+          <a:off x="0" y="0"/>
+          <a:ext cx="0" cy="0"/>
+          <a:chOff x="0" y="0"/>
+          <a:chExt cx="0" cy="0"/>
+        </a:xfrm>
+      </p:grpSpPr>
+      <p:sp>
+        <p:nvSpPr>
+          <p:cNvPr id="2" name="Title 1">
+            <a:extLst>
+              <a:ext uri="{FF2B5EF4-FFF2-40B4-BE49-F238E27FC236}">
+                <a16:creationId xmlns:a16="http://schemas.microsoft.com/office/drawing/2014/main" id="{BFBE0A40-EF52-730B-174C-8DEE5AF23CE4}"/>
+              </a:ext>
+            </a:extLst>
+          </p:cNvPr>
+          <p:cNvSpPr>
+            <a:spLocks noGrp="1"/>
+          </p:cNvSpPr>
+          <p:nvPr>
+            <p:ph type="title"/>
+          </p:nvPr>
+        </p:nvSpPr>
+        <p:spPr>
+          <a:xfrm>
+            <a:off x="1" y="764373"/>
+            <a:ext cx="11289791" cy="1293028"/>
+          </a:xfrm>
+        </p:spPr>
+        <p:txBody>
+          <a:bodyPr/>
+          <a:lstStyle/>
+          <a:p>
+            <a:r>
+              <a:rPr lang="en-US" dirty="0"/>
+              <a:t>Thank You!</a:t>
+            </a:r>
+          </a:p>
+        </p:txBody>
+      </p:sp>
+      <p:sp>
+        <p:nvSpPr>
+          <p:cNvPr id="3" name="Content Placeholder 2">
+            <a:extLst>
+              <a:ext uri="{FF2B5EF4-FFF2-40B4-BE49-F238E27FC236}">
+                <a16:creationId xmlns:a16="http://schemas.microsoft.com/office/drawing/2014/main" id="{7829BE99-CC9F-E89F-67D7-DD0AF66AC11A}"/>
+              </a:ext>
+            </a:extLst>
+          </p:cNvPr>
+          <p:cNvSpPr>
+            <a:spLocks noGrp="1"/>
+          </p:cNvSpPr>
+          <p:nvPr>
+            <p:ph idx="1"/>
+          </p:nvPr>
+        </p:nvSpPr>
+        <p:spPr>
+          <a:xfrm>
             <a:off x="685800" y="2249424"/>
             <a:ext cx="5350933" cy="4100576"/>
           </a:xfrm>
@@ -14650,31 +15151,59 @@
           <a:p>
             <a:r>
               <a:rPr lang="en-US" sz="1800" b="1" dirty="0">
-                <a:hlinkClick r:id="rId3"/>
+                <a:solidFill>
+                  <a:schemeClr val="accent6">
+                    <a:lumMod val="60000"/>
+                    <a:lumOff val="40000"/>
+                  </a:schemeClr>
+                </a:solidFill>
+                <a:hlinkClick r:id="rId3">
+                  <a:extLst>
+                    <a:ext uri="{A12FA001-AC4F-418D-AE19-62706E023703}">
+                      <ahyp:hlinkClr xmlns:ahyp="http://schemas.microsoft.com/office/drawing/2018/hyperlinkcolor" val="tx"/>
+                    </a:ext>
+                  </a:extLst>
+                </a:hlinkClick>
               </a:rPr>
               <a:t>https://corgidev.com</a:t>
             </a:r>
-            <a:endParaRPr lang="en-US" sz="1800" b="1" dirty="0"/>
-          </a:p>
-          <a:p>
+            <a:endParaRPr lang="en-US" sz="1800" b="1" dirty="0">
+              <a:solidFill>
+                <a:schemeClr val="accent6">
+                  <a:lumMod val="60000"/>
+                  <a:lumOff val="40000"/>
+                </a:schemeClr>
+              </a:solidFill>
+            </a:endParaRPr>
+          </a:p>
+          <a:p>
+            <a:pPr>
+              <a:lnSpc>
+                <a:spcPct val="100000"/>
+              </a:lnSpc>
+            </a:pPr>
             <a:r>
               <a:rPr lang="en-US" sz="1800" b="1" dirty="0">
-                <a:hlinkClick r:id="rId4"/>
+                <a:solidFill>
+                  <a:schemeClr val="accent6">
+                    <a:lumMod val="60000"/>
+                    <a:lumOff val="40000"/>
+                  </a:schemeClr>
+                </a:solidFill>
+                <a:hlinkClick r:id="rId4">
+                  <a:extLst>
+                    <a:ext uri="{A12FA001-AC4F-418D-AE19-62706E023703}">
+                      <ahyp:hlinkClr xmlns:ahyp="http://schemas.microsoft.com/office/drawing/2018/hyperlinkcolor" val="tx"/>
+                    </a:ext>
+                  </a:extLst>
+                </a:hlinkClick>
               </a:rPr>
               <a:t>https://github.com/CorgiDev/A11y-Materials </a:t>
             </a:r>
             <a:r>
-              <a:rPr lang="en-US" sz="1800" b="1" dirty="0"/>
+              <a:rPr lang="en-US" sz="1800" dirty="0"/>
               <a:t>- Under Presentations/2023 Presentations</a:t>
             </a:r>
-          </a:p>
-          <a:p>
-            <a:endParaRPr lang="en-US" sz="1800" b="1" dirty="0"/>
-          </a:p>
-          <a:p>
-            <a:pPr marL="0" indent="0">
-              <a:buNone/>
-            </a:pPr>
             <a:endParaRPr lang="en-US" sz="1800" b="1" dirty="0"/>
           </a:p>
         </p:txBody>
@@ -14747,99 +15276,680 @@
       </p:grpSpPr>
       <p:sp>
         <p:nvSpPr>
-          <p:cNvPr id="2" name="Title 1">
+          <p:cNvPr id="7" name="Title 1">
             <a:extLst>
               <a:ext uri="{FF2B5EF4-FFF2-40B4-BE49-F238E27FC236}">
-                <a16:creationId xmlns:a16="http://schemas.microsoft.com/office/drawing/2014/main" id="{BFBE0A40-EF52-730B-174C-8DEE5AF23CE4}"/>
+                <a16:creationId xmlns:a16="http://schemas.microsoft.com/office/drawing/2014/main" id="{587ACB0C-17D4-10BD-1086-99E53B011BAE}"/>
               </a:ext>
             </a:extLst>
           </p:cNvPr>
-          <p:cNvSpPr>
-            <a:spLocks noGrp="1"/>
-          </p:cNvSpPr>
-          <p:nvPr>
-            <p:ph type="title"/>
-          </p:nvPr>
-        </p:nvSpPr>
-        <p:spPr/>
-        <p:txBody>
-          <a:bodyPr>
-            <a:normAutofit/>
-          </a:bodyPr>
-          <a:lstStyle/>
-          <a:p>
-            <a:r>
-              <a:rPr lang="en-US" sz="3600" dirty="0"/>
-              <a:t>Agenda</a:t>
-            </a:r>
-          </a:p>
-        </p:txBody>
-      </p:sp>
-      <p:sp>
-        <p:nvSpPr>
-          <p:cNvPr id="3" name="Content Placeholder 2">
+          <p:cNvSpPr txBox="1">
+            <a:spLocks/>
+          </p:cNvSpPr>
+          <p:nvPr/>
+        </p:nvSpPr>
+        <p:spPr>
+          <a:xfrm>
+            <a:off x="4146241" y="641469"/>
+            <a:ext cx="8072846" cy="759895"/>
+          </a:xfrm>
+          <a:prstGeom prst="rect">
+            <a:avLst/>
+          </a:prstGeom>
+        </p:spPr>
+        <p:txBody>
+          <a:bodyPr/>
+          <a:lstStyle>
+            <a:lvl1pPr algn="r" defTabSz="914400" rtl="0" eaLnBrk="1" latinLnBrk="0" hangingPunct="1">
+              <a:lnSpc>
+                <a:spcPct val="90000"/>
+              </a:lnSpc>
+              <a:spcBef>
+                <a:spcPct val="0"/>
+              </a:spcBef>
+              <a:buNone/>
+              <a:defRPr sz="4000" kern="1200" cap="all" baseline="0">
+                <a:solidFill>
+                  <a:schemeClr val="tx1"/>
+                </a:solidFill>
+                <a:latin typeface="+mj-lt"/>
+                <a:ea typeface="+mj-ea"/>
+                <a:cs typeface="+mj-cs"/>
+              </a:defRPr>
+            </a:lvl1pPr>
+          </a:lstStyle>
+          <a:p>
+            <a:r>
+              <a:rPr lang="en-US" dirty="0" err="1"/>
+              <a:t>CincyDeliver</a:t>
+            </a:r>
+            <a:r>
+              <a:rPr lang="en-US" dirty="0"/>
+              <a:t> 2023 Sponsors</a:t>
+            </a:r>
+          </a:p>
+        </p:txBody>
+      </p:sp>
+      <p:pic>
+        <p:nvPicPr>
+          <p:cNvPr id="6" name="Picture 5" descr="CincyDeliver.org &#10;Deliver Value through quality software">
             <a:extLst>
               <a:ext uri="{FF2B5EF4-FFF2-40B4-BE49-F238E27FC236}">
-                <a16:creationId xmlns:a16="http://schemas.microsoft.com/office/drawing/2014/main" id="{7829BE99-CC9F-E89F-67D7-DD0AF66AC11A}"/>
+                <a16:creationId xmlns:a16="http://schemas.microsoft.com/office/drawing/2014/main" id="{336D5E78-AD0C-BF79-B253-25DB60C8B12E}"/>
               </a:ext>
             </a:extLst>
           </p:cNvPr>
-          <p:cNvSpPr>
-            <a:spLocks noGrp="1"/>
-          </p:cNvSpPr>
-          <p:nvPr>
-            <p:ph idx="1"/>
-          </p:nvPr>
-        </p:nvSpPr>
-        <p:spPr/>
-        <p:txBody>
-          <a:bodyPr>
-            <a:normAutofit/>
+          <p:cNvPicPr>
+            <a:picLocks noChangeAspect="1"/>
+          </p:cNvPicPr>
+          <p:nvPr/>
+        </p:nvPicPr>
+        <p:blipFill>
+          <a:blip r:embed="rId3"/>
+          <a:stretch>
+            <a:fillRect/>
+          </a:stretch>
+        </p:blipFill>
+        <p:spPr>
+          <a:xfrm>
+            <a:off x="10600342" y="1401364"/>
+            <a:ext cx="1618745" cy="1737360"/>
+          </a:xfrm>
+          <a:prstGeom prst="rect">
+            <a:avLst/>
+          </a:prstGeom>
+        </p:spPr>
+      </p:pic>
+      <p:sp>
+        <p:nvSpPr>
+          <p:cNvPr id="10" name="TextBox 9">
+            <a:extLst>
+              <a:ext uri="{FF2B5EF4-FFF2-40B4-BE49-F238E27FC236}">
+                <a16:creationId xmlns:a16="http://schemas.microsoft.com/office/drawing/2014/main" id="{EB87E238-7715-22D8-AD90-FEBCE03A3387}"/>
+              </a:ext>
+            </a:extLst>
+          </p:cNvPr>
+          <p:cNvSpPr txBox="1"/>
+          <p:nvPr/>
+        </p:nvSpPr>
+        <p:spPr>
+          <a:xfrm>
+            <a:off x="232148" y="1355564"/>
+            <a:ext cx="1625766" cy="523220"/>
+          </a:xfrm>
+          <a:prstGeom prst="rect">
+            <a:avLst/>
+          </a:prstGeom>
+          <a:noFill/>
+        </p:spPr>
+        <p:txBody>
+          <a:bodyPr wrap="none" rtlCol="0">
+            <a:spAutoFit/>
           </a:bodyPr>
           <a:lstStyle/>
           <a:p>
-            <a:r>
-              <a:rPr lang="en-US" dirty="0"/>
-              <a:t>What is Accessibility?</a:t>
-            </a:r>
-          </a:p>
-          <a:p>
-            <a:r>
-              <a:rPr lang="en-US" dirty="0"/>
-              <a:t>Why make things Accessible?</a:t>
-            </a:r>
-          </a:p>
-          <a:p>
-            <a:r>
-              <a:rPr lang="en-US" dirty="0"/>
-              <a:t>How do we decide what is Accessible?</a:t>
-            </a:r>
-          </a:p>
-          <a:p>
-            <a:r>
-              <a:rPr lang="en-US" dirty="0"/>
-              <a:t>Building Accessibility Test Plans</a:t>
-            </a:r>
-          </a:p>
-          <a:p>
-            <a:pPr lvl="1"/>
-            <a:r>
-              <a:rPr lang="en-US" dirty="0"/>
-              <a:t>Example Test Plans</a:t>
-            </a:r>
-          </a:p>
-          <a:p>
-            <a:r>
-              <a:rPr lang="en-US" dirty="0"/>
-              <a:t>Tools &amp; Resources</a:t>
-            </a:r>
-          </a:p>
-        </p:txBody>
-      </p:sp>
+            <a:pPr marL="0" marR="0" lvl="0" indent="0" algn="l" defTabSz="914400" rtl="0" eaLnBrk="1" fontAlgn="base" latinLnBrk="0" hangingPunct="1">
+              <a:lnSpc>
+                <a:spcPct val="100000"/>
+              </a:lnSpc>
+              <a:spcBef>
+                <a:spcPct val="0"/>
+              </a:spcBef>
+              <a:spcAft>
+                <a:spcPct val="0"/>
+              </a:spcAft>
+              <a:buClrTx/>
+              <a:buSzTx/>
+              <a:buFontTx/>
+              <a:buNone/>
+              <a:tabLst/>
+              <a:defRPr/>
+            </a:pPr>
+            <a:r>
+              <a:rPr kumimoji="0" lang="en-US" sz="2800" b="0" i="0" u="none" strike="noStrike" kern="1200" cap="none" spc="0" normalizeH="0" baseline="0" noProof="0" dirty="0">
+                <a:ln>
+                  <a:noFill/>
+                </a:ln>
+                <a:effectLst/>
+                <a:uLnTx/>
+                <a:uFillTx/>
+                <a:latin typeface="Arial" charset="0"/>
+                <a:ea typeface="+mn-ea"/>
+                <a:cs typeface="+mn-cs"/>
+              </a:rPr>
+              <a:t>Diamond</a:t>
+            </a:r>
+          </a:p>
+        </p:txBody>
+      </p:sp>
+      <p:pic>
+        <p:nvPicPr>
+          <p:cNvPr id="12" name="Picture 11" descr="Ingage">
+            <a:extLst>
+              <a:ext uri="{FF2B5EF4-FFF2-40B4-BE49-F238E27FC236}">
+                <a16:creationId xmlns:a16="http://schemas.microsoft.com/office/drawing/2014/main" id="{7A2ED032-C02D-EB90-DC5E-F84FC32B0882}"/>
+              </a:ext>
+            </a:extLst>
+          </p:cNvPr>
+          <p:cNvPicPr>
+            <a:picLocks noChangeAspect="1"/>
+          </p:cNvPicPr>
+          <p:nvPr/>
+        </p:nvPicPr>
+        <p:blipFill>
+          <a:blip r:embed="rId4">
+            <a:extLst>
+              <a:ext uri="{28A0092B-C50C-407E-A947-70E740481C1C}">
+                <a14:useLocalDpi xmlns:a14="http://schemas.microsoft.com/office/drawing/2010/main" val="0"/>
+              </a:ext>
+            </a:extLst>
+          </a:blip>
+          <a:stretch>
+            <a:fillRect/>
+          </a:stretch>
+        </p:blipFill>
+        <p:spPr>
+          <a:xfrm>
+            <a:off x="324437" y="1807708"/>
+            <a:ext cx="3200400" cy="916115"/>
+          </a:xfrm>
+          <a:prstGeom prst="rect">
+            <a:avLst/>
+          </a:prstGeom>
+        </p:spPr>
+      </p:pic>
+      <p:pic>
+        <p:nvPicPr>
+          <p:cNvPr id="17" name="Picture 16" descr="Pintas &amp; Mullins Injury Lawyers">
+            <a:extLst>
+              <a:ext uri="{FF2B5EF4-FFF2-40B4-BE49-F238E27FC236}">
+                <a16:creationId xmlns:a16="http://schemas.microsoft.com/office/drawing/2014/main" id="{132A5655-7CFE-03C7-5C70-492A99A9FFB9}"/>
+              </a:ext>
+            </a:extLst>
+          </p:cNvPr>
+          <p:cNvPicPr>
+            <a:picLocks noChangeAspect="1"/>
+          </p:cNvPicPr>
+          <p:nvPr/>
+        </p:nvPicPr>
+        <p:blipFill>
+          <a:blip r:embed="rId5">
+            <a:extLst>
+              <a:ext uri="{28A0092B-C50C-407E-A947-70E740481C1C}">
+                <a14:useLocalDpi xmlns:a14="http://schemas.microsoft.com/office/drawing/2010/main" val="0"/>
+              </a:ext>
+            </a:extLst>
+          </a:blip>
+          <a:stretch>
+            <a:fillRect/>
+          </a:stretch>
+        </p:blipFill>
+        <p:spPr>
+          <a:xfrm>
+            <a:off x="3726503" y="1737404"/>
+            <a:ext cx="5005250" cy="1030313"/>
+          </a:xfrm>
+          <a:prstGeom prst="rect">
+            <a:avLst/>
+          </a:prstGeom>
+          <a:solidFill>
+            <a:schemeClr val="tx1"/>
+          </a:solidFill>
+        </p:spPr>
+      </p:pic>
+      <p:sp>
+        <p:nvSpPr>
+          <p:cNvPr id="9" name="TextBox 8">
+            <a:extLst>
+              <a:ext uri="{FF2B5EF4-FFF2-40B4-BE49-F238E27FC236}">
+                <a16:creationId xmlns:a16="http://schemas.microsoft.com/office/drawing/2014/main" id="{AA5273D4-CA33-E12C-B07C-92E528CE8C3D}"/>
+              </a:ext>
+            </a:extLst>
+          </p:cNvPr>
+          <p:cNvSpPr txBox="1"/>
+          <p:nvPr/>
+        </p:nvSpPr>
+        <p:spPr>
+          <a:xfrm>
+            <a:off x="232148" y="2709575"/>
+            <a:ext cx="1584088" cy="523220"/>
+          </a:xfrm>
+          <a:prstGeom prst="rect">
+            <a:avLst/>
+          </a:prstGeom>
+          <a:noFill/>
+        </p:spPr>
+        <p:txBody>
+          <a:bodyPr wrap="none" rtlCol="0">
+            <a:spAutoFit/>
+          </a:bodyPr>
+          <a:lstStyle/>
+          <a:p>
+            <a:pPr marL="0" marR="0" lvl="0" indent="0" algn="l" defTabSz="914400" rtl="0" eaLnBrk="1" fontAlgn="base" latinLnBrk="0" hangingPunct="1">
+              <a:lnSpc>
+                <a:spcPct val="100000"/>
+              </a:lnSpc>
+              <a:spcBef>
+                <a:spcPct val="0"/>
+              </a:spcBef>
+              <a:spcAft>
+                <a:spcPct val="0"/>
+              </a:spcAft>
+              <a:buClrTx/>
+              <a:buSzTx/>
+              <a:buFontTx/>
+              <a:buNone/>
+              <a:tabLst/>
+              <a:defRPr/>
+            </a:pPr>
+            <a:r>
+              <a:rPr kumimoji="0" lang="en-US" sz="2800" b="0" i="0" u="none" strike="noStrike" kern="1200" cap="none" spc="0" normalizeH="0" baseline="0" noProof="0" dirty="0">
+                <a:ln>
+                  <a:noFill/>
+                </a:ln>
+                <a:effectLst/>
+                <a:uLnTx/>
+                <a:uFillTx/>
+                <a:latin typeface="Arial" charset="0"/>
+                <a:ea typeface="+mn-ea"/>
+                <a:cs typeface="+mn-cs"/>
+              </a:rPr>
+              <a:t>Platinum</a:t>
+            </a:r>
+          </a:p>
+        </p:txBody>
+      </p:sp>
+      <p:pic>
+        <p:nvPicPr>
+          <p:cNvPr id="13" name="Picture 4" descr="Ascendum &#10;Rise Together">
+            <a:extLst>
+              <a:ext uri="{FF2B5EF4-FFF2-40B4-BE49-F238E27FC236}">
+                <a16:creationId xmlns:a16="http://schemas.microsoft.com/office/drawing/2014/main" id="{585F588A-7EC6-3D48-5E41-4B207032034D}"/>
+              </a:ext>
+            </a:extLst>
+          </p:cNvPr>
+          <p:cNvPicPr>
+            <a:picLocks noChangeAspect="1" noChangeArrowheads="1"/>
+          </p:cNvPicPr>
+          <p:nvPr/>
+        </p:nvPicPr>
+        <p:blipFill>
+          <a:blip r:embed="rId6">
+            <a:extLst>
+              <a:ext uri="{28A0092B-C50C-407E-A947-70E740481C1C}">
+                <a14:useLocalDpi xmlns:a14="http://schemas.microsoft.com/office/drawing/2010/main" val="0"/>
+              </a:ext>
+            </a:extLst>
+          </a:blip>
+          <a:srcRect/>
+          <a:stretch>
+            <a:fillRect/>
+          </a:stretch>
+        </p:blipFill>
+        <p:spPr bwMode="auto">
+          <a:xfrm>
+            <a:off x="324437" y="3207573"/>
+            <a:ext cx="3371850" cy="895350"/>
+          </a:xfrm>
+          <a:prstGeom prst="rect">
+            <a:avLst/>
+          </a:prstGeom>
+          <a:solidFill>
+            <a:schemeClr val="tx1"/>
+          </a:solidFill>
+        </p:spPr>
+      </p:pic>
+      <p:sp>
+        <p:nvSpPr>
+          <p:cNvPr id="11" name="TextBox 10">
+            <a:extLst>
+              <a:ext uri="{FF2B5EF4-FFF2-40B4-BE49-F238E27FC236}">
+                <a16:creationId xmlns:a16="http://schemas.microsoft.com/office/drawing/2014/main" id="{192AADA5-11AF-FA5B-49DF-89AE6E6E388B}"/>
+              </a:ext>
+            </a:extLst>
+          </p:cNvPr>
+          <p:cNvSpPr txBox="1"/>
+          <p:nvPr/>
+        </p:nvSpPr>
+        <p:spPr>
+          <a:xfrm>
+            <a:off x="232148" y="4067355"/>
+            <a:ext cx="944489" cy="523220"/>
+          </a:xfrm>
+          <a:prstGeom prst="rect">
+            <a:avLst/>
+          </a:prstGeom>
+          <a:noFill/>
+        </p:spPr>
+        <p:txBody>
+          <a:bodyPr wrap="none" rtlCol="0">
+            <a:spAutoFit/>
+          </a:bodyPr>
+          <a:lstStyle/>
+          <a:p>
+            <a:pPr marL="0" marR="0" lvl="0" indent="0" algn="l" defTabSz="914400" rtl="0" eaLnBrk="1" fontAlgn="base" latinLnBrk="0" hangingPunct="1">
+              <a:lnSpc>
+                <a:spcPct val="100000"/>
+              </a:lnSpc>
+              <a:spcBef>
+                <a:spcPct val="0"/>
+              </a:spcBef>
+              <a:spcAft>
+                <a:spcPct val="0"/>
+              </a:spcAft>
+              <a:buClrTx/>
+              <a:buSzTx/>
+              <a:buFontTx/>
+              <a:buNone/>
+              <a:tabLst/>
+              <a:defRPr/>
+            </a:pPr>
+            <a:r>
+              <a:rPr kumimoji="0" lang="en-US" sz="2800" b="0" i="0" u="none" strike="noStrike" kern="1200" cap="none" spc="0" normalizeH="0" baseline="0" noProof="0" dirty="0">
+                <a:ln>
+                  <a:noFill/>
+                </a:ln>
+                <a:effectLst/>
+                <a:uLnTx/>
+                <a:uFillTx/>
+                <a:latin typeface="Arial" charset="0"/>
+                <a:ea typeface="+mn-ea"/>
+                <a:cs typeface="+mn-cs"/>
+              </a:rPr>
+              <a:t>Gold</a:t>
+            </a:r>
+          </a:p>
+        </p:txBody>
+      </p:sp>
+      <p:pic>
+        <p:nvPicPr>
+          <p:cNvPr id="18" name="Picture 17" descr="TQL">
+            <a:extLst>
+              <a:ext uri="{FF2B5EF4-FFF2-40B4-BE49-F238E27FC236}">
+                <a16:creationId xmlns:a16="http://schemas.microsoft.com/office/drawing/2014/main" id="{73B116E6-8A65-7F27-25E9-F49FB6CBFAD6}"/>
+              </a:ext>
+            </a:extLst>
+          </p:cNvPr>
+          <p:cNvPicPr>
+            <a:picLocks noChangeAspect="1"/>
+          </p:cNvPicPr>
+          <p:nvPr/>
+        </p:nvPicPr>
+        <p:blipFill>
+          <a:blip r:embed="rId7">
+            <a:extLst>
+              <a:ext uri="{28A0092B-C50C-407E-A947-70E740481C1C}">
+                <a14:useLocalDpi xmlns:a14="http://schemas.microsoft.com/office/drawing/2010/main" val="0"/>
+              </a:ext>
+            </a:extLst>
+          </a:blip>
+          <a:stretch>
+            <a:fillRect/>
+          </a:stretch>
+        </p:blipFill>
+        <p:spPr>
+          <a:xfrm>
+            <a:off x="302751" y="4788374"/>
+            <a:ext cx="2599187" cy="756378"/>
+          </a:xfrm>
+          <a:prstGeom prst="rect">
+            <a:avLst/>
+          </a:prstGeom>
+          <a:solidFill>
+            <a:schemeClr val="tx1"/>
+          </a:solidFill>
+        </p:spPr>
+      </p:pic>
+      <p:pic>
+        <p:nvPicPr>
+          <p:cNvPr id="19" name="Picture 18" descr="Qual IT Resources&#10;Quality, Qualified, Qual IT">
+            <a:extLst>
+              <a:ext uri="{FF2B5EF4-FFF2-40B4-BE49-F238E27FC236}">
+                <a16:creationId xmlns:a16="http://schemas.microsoft.com/office/drawing/2014/main" id="{76D3B762-3BC1-C0FC-B26F-F9BD3DAFA259}"/>
+              </a:ext>
+            </a:extLst>
+          </p:cNvPr>
+          <p:cNvPicPr>
+            <a:picLocks noChangeAspect="1"/>
+          </p:cNvPicPr>
+          <p:nvPr/>
+        </p:nvPicPr>
+        <p:blipFill>
+          <a:blip r:embed="rId8">
+            <a:extLst>
+              <a:ext uri="{28A0092B-C50C-407E-A947-70E740481C1C}">
+                <a14:useLocalDpi xmlns:a14="http://schemas.microsoft.com/office/drawing/2010/main" val="0"/>
+              </a:ext>
+            </a:extLst>
+          </a:blip>
+          <a:stretch>
+            <a:fillRect/>
+          </a:stretch>
+        </p:blipFill>
+        <p:spPr>
+          <a:xfrm>
+            <a:off x="3209743" y="4541545"/>
+            <a:ext cx="2721500" cy="1039613"/>
+          </a:xfrm>
+          <a:prstGeom prst="rect">
+            <a:avLst/>
+          </a:prstGeom>
+        </p:spPr>
+      </p:pic>
+      <p:sp>
+        <p:nvSpPr>
+          <p:cNvPr id="16" name="TextBox 15">
+            <a:extLst>
+              <a:ext uri="{FF2B5EF4-FFF2-40B4-BE49-F238E27FC236}">
+                <a16:creationId xmlns:a16="http://schemas.microsoft.com/office/drawing/2014/main" id="{CA81B24A-701D-5DFC-1737-701EA09B0CA2}"/>
+              </a:ext>
+            </a:extLst>
+          </p:cNvPr>
+          <p:cNvSpPr txBox="1"/>
+          <p:nvPr/>
+        </p:nvSpPr>
+        <p:spPr>
+          <a:xfrm>
+            <a:off x="162416" y="5581158"/>
+            <a:ext cx="1083951" cy="523220"/>
+          </a:xfrm>
+          <a:prstGeom prst="rect">
+            <a:avLst/>
+          </a:prstGeom>
+          <a:noFill/>
+        </p:spPr>
+        <p:txBody>
+          <a:bodyPr wrap="none" rtlCol="0">
+            <a:spAutoFit/>
+          </a:bodyPr>
+          <a:lstStyle/>
+          <a:p>
+            <a:pPr marL="0" marR="0" lvl="0" indent="0" algn="l" defTabSz="914400" rtl="0" eaLnBrk="1" fontAlgn="base" latinLnBrk="0" hangingPunct="1">
+              <a:lnSpc>
+                <a:spcPct val="100000"/>
+              </a:lnSpc>
+              <a:spcBef>
+                <a:spcPct val="0"/>
+              </a:spcBef>
+              <a:spcAft>
+                <a:spcPct val="0"/>
+              </a:spcAft>
+              <a:buClrTx/>
+              <a:buSzTx/>
+              <a:buFontTx/>
+              <a:buNone/>
+              <a:tabLst/>
+              <a:defRPr/>
+            </a:pPr>
+            <a:r>
+              <a:rPr kumimoji="0" lang="en-US" sz="2800" b="0" i="0" u="none" strike="noStrike" kern="1200" cap="none" spc="0" normalizeH="0" baseline="0" noProof="0" dirty="0">
+                <a:ln>
+                  <a:noFill/>
+                </a:ln>
+                <a:effectLst/>
+                <a:uLnTx/>
+                <a:uFillTx/>
+                <a:latin typeface="Arial" charset="0"/>
+                <a:ea typeface="+mn-ea"/>
+                <a:cs typeface="+mn-cs"/>
+              </a:rPr>
+              <a:t>Silver</a:t>
+            </a:r>
+          </a:p>
+        </p:txBody>
+      </p:sp>
+      <p:pic>
+        <p:nvPicPr>
+          <p:cNvPr id="14" name="Picture 13" descr="Scrum.org &#10;The Home of Scrum">
+            <a:extLst>
+              <a:ext uri="{FF2B5EF4-FFF2-40B4-BE49-F238E27FC236}">
+                <a16:creationId xmlns:a16="http://schemas.microsoft.com/office/drawing/2014/main" id="{2ACC0D5F-1270-BF26-9A19-C3B3690A57F1}"/>
+              </a:ext>
+            </a:extLst>
+          </p:cNvPr>
+          <p:cNvPicPr>
+            <a:picLocks noChangeAspect="1"/>
+          </p:cNvPicPr>
+          <p:nvPr/>
+        </p:nvPicPr>
+        <p:blipFill>
+          <a:blip r:embed="rId9">
+            <a:extLst>
+              <a:ext uri="{28A0092B-C50C-407E-A947-70E740481C1C}">
+                <a14:useLocalDpi xmlns:a14="http://schemas.microsoft.com/office/drawing/2010/main" val="0"/>
+              </a:ext>
+            </a:extLst>
+          </a:blip>
+          <a:srcRect/>
+          <a:stretch>
+            <a:fillRect/>
+          </a:stretch>
+        </p:blipFill>
+        <p:spPr bwMode="auto">
+          <a:xfrm>
+            <a:off x="329833" y="6090107"/>
+            <a:ext cx="2527300" cy="666750"/>
+          </a:xfrm>
+          <a:prstGeom prst="rect">
+            <a:avLst/>
+          </a:prstGeom>
+          <a:solidFill>
+            <a:schemeClr val="tx1"/>
+          </a:solidFill>
+          <a:ln>
+            <a:noFill/>
+          </a:ln>
+        </p:spPr>
+      </p:pic>
+      <p:sp>
+        <p:nvSpPr>
+          <p:cNvPr id="8" name="TextBox 7">
+            <a:extLst>
+              <a:ext uri="{FF2B5EF4-FFF2-40B4-BE49-F238E27FC236}">
+                <a16:creationId xmlns:a16="http://schemas.microsoft.com/office/drawing/2014/main" id="{1A0C4FC3-1E35-2AA9-3F4A-D65C5717A68A}"/>
+              </a:ext>
+            </a:extLst>
+          </p:cNvPr>
+          <p:cNvSpPr txBox="1"/>
+          <p:nvPr/>
+        </p:nvSpPr>
+        <p:spPr>
+          <a:xfrm>
+            <a:off x="7874726" y="6255207"/>
+            <a:ext cx="2004075" cy="523220"/>
+          </a:xfrm>
+          <a:prstGeom prst="rect">
+            <a:avLst/>
+          </a:prstGeom>
+          <a:noFill/>
+        </p:spPr>
+        <p:txBody>
+          <a:bodyPr wrap="none" rtlCol="0">
+            <a:spAutoFit/>
+          </a:bodyPr>
+          <a:lstStyle/>
+          <a:p>
+            <a:pPr marL="0" marR="0" lvl="0" indent="0" algn="l" defTabSz="914400" rtl="0" eaLnBrk="1" fontAlgn="base" latinLnBrk="0" hangingPunct="1">
+              <a:lnSpc>
+                <a:spcPct val="100000"/>
+              </a:lnSpc>
+              <a:spcBef>
+                <a:spcPct val="0"/>
+              </a:spcBef>
+              <a:spcAft>
+                <a:spcPct val="0"/>
+              </a:spcAft>
+              <a:buClrTx/>
+              <a:buSzTx/>
+              <a:buFontTx/>
+              <a:buNone/>
+              <a:tabLst/>
+              <a:defRPr/>
+            </a:pPr>
+            <a:r>
+              <a:rPr kumimoji="0" lang="en-US" sz="2800" b="0" i="0" u="none" strike="noStrike" kern="1200" cap="none" spc="0" normalizeH="0" baseline="0" noProof="0" dirty="0">
+                <a:ln>
+                  <a:noFill/>
+                </a:ln>
+                <a:effectLst/>
+                <a:uLnTx/>
+                <a:uFillTx/>
+                <a:latin typeface="Arial" charset="0"/>
+                <a:ea typeface="+mn-ea"/>
+                <a:cs typeface="+mn-cs"/>
+              </a:rPr>
+              <a:t>Community</a:t>
+            </a:r>
+          </a:p>
+        </p:txBody>
+      </p:sp>
+      <p:pic>
+        <p:nvPicPr>
+          <p:cNvPr id="15" name="Picture 14" descr="Tech Elevator">
+            <a:extLst>
+              <a:ext uri="{FF2B5EF4-FFF2-40B4-BE49-F238E27FC236}">
+                <a16:creationId xmlns:a16="http://schemas.microsoft.com/office/drawing/2014/main" id="{C6C555D8-BDDE-5C8B-4B60-1A6EB677F5B7}"/>
+              </a:ext>
+            </a:extLst>
+          </p:cNvPr>
+          <p:cNvPicPr>
+            <a:picLocks noChangeAspect="1"/>
+          </p:cNvPicPr>
+          <p:nvPr/>
+        </p:nvPicPr>
+        <p:blipFill>
+          <a:blip r:embed="rId10">
+            <a:extLst>
+              <a:ext uri="{28A0092B-C50C-407E-A947-70E740481C1C}">
+                <a14:useLocalDpi xmlns:a14="http://schemas.microsoft.com/office/drawing/2010/main" val="0"/>
+              </a:ext>
+            </a:extLst>
+          </a:blip>
+          <a:srcRect/>
+          <a:stretch>
+            <a:fillRect/>
+          </a:stretch>
+        </p:blipFill>
+        <p:spPr bwMode="auto">
+          <a:xfrm>
+            <a:off x="10025938" y="6255207"/>
+            <a:ext cx="1888490" cy="501650"/>
+          </a:xfrm>
+          <a:prstGeom prst="rect">
+            <a:avLst/>
+          </a:prstGeom>
+          <a:solidFill>
+            <a:schemeClr val="tx1"/>
+          </a:solidFill>
+          <a:ln>
+            <a:noFill/>
+          </a:ln>
+        </p:spPr>
+      </p:pic>
     </p:spTree>
     <p:extLst>
       <p:ext uri="{BB962C8B-B14F-4D97-AF65-F5344CB8AC3E}">
-        <p14:creationId xmlns:p14="http://schemas.microsoft.com/office/powerpoint/2010/main" val="3102484952"/>
+        <p14:creationId xmlns:p14="http://schemas.microsoft.com/office/powerpoint/2010/main" val="2066095294"/>
       </p:ext>
     </p:extLst>
   </p:cSld>
@@ -14882,6 +15992,127 @@
             <p:ph type="title"/>
           </p:nvPr>
         </p:nvSpPr>
+        <p:spPr/>
+        <p:txBody>
+          <a:bodyPr>
+            <a:normAutofit/>
+          </a:bodyPr>
+          <a:lstStyle/>
+          <a:p>
+            <a:r>
+              <a:rPr lang="en-US" sz="3600" dirty="0"/>
+              <a:t>Agenda</a:t>
+            </a:r>
+          </a:p>
+        </p:txBody>
+      </p:sp>
+      <p:sp>
+        <p:nvSpPr>
+          <p:cNvPr id="3" name="Content Placeholder 2">
+            <a:extLst>
+              <a:ext uri="{FF2B5EF4-FFF2-40B4-BE49-F238E27FC236}">
+                <a16:creationId xmlns:a16="http://schemas.microsoft.com/office/drawing/2014/main" id="{7829BE99-CC9F-E89F-67D7-DD0AF66AC11A}"/>
+              </a:ext>
+            </a:extLst>
+          </p:cNvPr>
+          <p:cNvSpPr>
+            <a:spLocks noGrp="1"/>
+          </p:cNvSpPr>
+          <p:nvPr>
+            <p:ph idx="1"/>
+          </p:nvPr>
+        </p:nvSpPr>
+        <p:spPr/>
+        <p:txBody>
+          <a:bodyPr>
+            <a:normAutofit/>
+          </a:bodyPr>
+          <a:lstStyle/>
+          <a:p>
+            <a:r>
+              <a:rPr lang="en-US" dirty="0"/>
+              <a:t>What is Accessibility?</a:t>
+            </a:r>
+          </a:p>
+          <a:p>
+            <a:r>
+              <a:rPr lang="en-US" dirty="0"/>
+              <a:t>Why make things Accessible?</a:t>
+            </a:r>
+          </a:p>
+          <a:p>
+            <a:r>
+              <a:rPr lang="en-US" dirty="0"/>
+              <a:t>How do we decide what is Accessible?</a:t>
+            </a:r>
+          </a:p>
+          <a:p>
+            <a:r>
+              <a:rPr lang="en-US" dirty="0"/>
+              <a:t>Building Accessibility Test Plans</a:t>
+            </a:r>
+          </a:p>
+          <a:p>
+            <a:pPr lvl="1"/>
+            <a:r>
+              <a:rPr lang="en-US" dirty="0"/>
+              <a:t>Example Test Plans</a:t>
+            </a:r>
+          </a:p>
+          <a:p>
+            <a:r>
+              <a:rPr lang="en-US" dirty="0"/>
+              <a:t>Tools &amp; Resources</a:t>
+            </a:r>
+          </a:p>
+        </p:txBody>
+      </p:sp>
+    </p:spTree>
+    <p:extLst>
+      <p:ext uri="{BB962C8B-B14F-4D97-AF65-F5344CB8AC3E}">
+        <p14:creationId xmlns:p14="http://schemas.microsoft.com/office/powerpoint/2010/main" val="3102484952"/>
+      </p:ext>
+    </p:extLst>
+  </p:cSld>
+  <p:clrMapOvr>
+    <a:masterClrMapping/>
+  </p:clrMapOvr>
+</p:sld>
+</file>
+
+<file path=ppt/slides/slide4.xml><?xml version="1.0" encoding="utf-8"?>
+<p:sld xmlns:a="http://schemas.openxmlformats.org/drawingml/2006/main" xmlns:r="http://schemas.openxmlformats.org/officeDocument/2006/relationships" xmlns:p="http://schemas.openxmlformats.org/presentationml/2006/main">
+  <p:cSld>
+    <p:spTree>
+      <p:nvGrpSpPr>
+        <p:cNvPr id="1" name=""/>
+        <p:cNvGrpSpPr/>
+        <p:nvPr/>
+      </p:nvGrpSpPr>
+      <p:grpSpPr>
+        <a:xfrm>
+          <a:off x="0" y="0"/>
+          <a:ext cx="0" cy="0"/>
+          <a:chOff x="0" y="0"/>
+          <a:chExt cx="0" cy="0"/>
+        </a:xfrm>
+      </p:grpSpPr>
+      <p:sp>
+        <p:nvSpPr>
+          <p:cNvPr id="2" name="Title 1">
+            <a:extLst>
+              <a:ext uri="{FF2B5EF4-FFF2-40B4-BE49-F238E27FC236}">
+                <a16:creationId xmlns:a16="http://schemas.microsoft.com/office/drawing/2014/main" id="{BFBE0A40-EF52-730B-174C-8DEE5AF23CE4}"/>
+              </a:ext>
+            </a:extLst>
+          </p:cNvPr>
+          <p:cNvSpPr>
+            <a:spLocks noGrp="1"/>
+          </p:cNvSpPr>
+          <p:nvPr>
+            <p:ph type="title"/>
+          </p:nvPr>
+        </p:nvSpPr>
         <p:spPr>
           <a:xfrm>
             <a:off x="1" y="764373"/>
@@ -14917,7 +16148,7 @@
             <p:ph idx="1"/>
             <p:extLst>
               <p:ext uri="{D42A27DB-BD31-4B8C-83A1-F6EECF244321}">
-                <p14:modId xmlns:p14="http://schemas.microsoft.com/office/powerpoint/2010/main" val="4111405394"/>
+                <p14:modId xmlns:p14="http://schemas.microsoft.com/office/powerpoint/2010/main" val="1790085389"/>
               </p:ext>
             </p:extLst>
           </p:nvPr>
@@ -15086,102 +16317,6 @@
 </p:sld>
 </file>
 
-<file path=ppt/slides/slide4.xml><?xml version="1.0" encoding="utf-8"?>
-<p:sld xmlns:a="http://schemas.openxmlformats.org/drawingml/2006/main" xmlns:r="http://schemas.openxmlformats.org/officeDocument/2006/relationships" xmlns:p="http://schemas.openxmlformats.org/presentationml/2006/main">
-  <p:cSld>
-    <p:spTree>
-      <p:nvGrpSpPr>
-        <p:cNvPr id="1" name=""/>
-        <p:cNvGrpSpPr/>
-        <p:nvPr/>
-      </p:nvGrpSpPr>
-      <p:grpSpPr>
-        <a:xfrm>
-          <a:off x="0" y="0"/>
-          <a:ext cx="0" cy="0"/>
-          <a:chOff x="0" y="0"/>
-          <a:chExt cx="0" cy="0"/>
-        </a:xfrm>
-      </p:grpSpPr>
-      <p:sp>
-        <p:nvSpPr>
-          <p:cNvPr id="2" name="Title 1">
-            <a:extLst>
-              <a:ext uri="{FF2B5EF4-FFF2-40B4-BE49-F238E27FC236}">
-                <a16:creationId xmlns:a16="http://schemas.microsoft.com/office/drawing/2014/main" id="{BFBE0A40-EF52-730B-174C-8DEE5AF23CE4}"/>
-              </a:ext>
-            </a:extLst>
-          </p:cNvPr>
-          <p:cNvSpPr>
-            <a:spLocks noGrp="1"/>
-          </p:cNvSpPr>
-          <p:nvPr>
-            <p:ph type="title"/>
-          </p:nvPr>
-        </p:nvSpPr>
-        <p:spPr>
-          <a:xfrm>
-            <a:off x="1" y="764373"/>
-            <a:ext cx="11506200" cy="1293028"/>
-          </a:xfrm>
-        </p:spPr>
-        <p:txBody>
-          <a:bodyPr>
-            <a:normAutofit/>
-          </a:bodyPr>
-          <a:lstStyle/>
-          <a:p>
-            <a:r>
-              <a:rPr lang="en-US" sz="3600" dirty="0"/>
-              <a:t>What is Accessibility - Continued</a:t>
-            </a:r>
-          </a:p>
-        </p:txBody>
-      </p:sp>
-      <p:graphicFrame>
-        <p:nvGraphicFramePr>
-          <p:cNvPr id="6" name="Content Placeholder 2" descr="Example Accessibility Categories and subcategories">
-            <a:extLst>
-              <a:ext uri="{FF2B5EF4-FFF2-40B4-BE49-F238E27FC236}">
-                <a16:creationId xmlns:a16="http://schemas.microsoft.com/office/drawing/2014/main" id="{FA820D58-D4E6-FBFE-77ED-DD49F7FAC9D2}"/>
-              </a:ext>
-            </a:extLst>
-          </p:cNvPr>
-          <p:cNvGraphicFramePr>
-            <a:graphicFrameLocks noGrp="1"/>
-          </p:cNvGraphicFramePr>
-          <p:nvPr>
-            <p:ph idx="1"/>
-            <p:extLst>
-              <p:ext uri="{D42A27DB-BD31-4B8C-83A1-F6EECF244321}">
-                <p14:modId xmlns:p14="http://schemas.microsoft.com/office/powerpoint/2010/main" val="589986761"/>
-              </p:ext>
-            </p:extLst>
-          </p:nvPr>
-        </p:nvGraphicFramePr>
-        <p:xfrm>
-          <a:off x="685801" y="2243138"/>
-          <a:ext cx="10820400" cy="3340100"/>
-        </p:xfrm>
-        <a:graphic>
-          <a:graphicData uri="http://schemas.openxmlformats.org/drawingml/2006/diagram">
-            <dgm:relIds xmlns:dgm="http://schemas.openxmlformats.org/drawingml/2006/diagram" xmlns:r="http://schemas.openxmlformats.org/officeDocument/2006/relationships" r:dm="rId2" r:lo="rId3" r:qs="rId4" r:cs="rId5"/>
-          </a:graphicData>
-        </a:graphic>
-      </p:graphicFrame>
-    </p:spTree>
-    <p:extLst>
-      <p:ext uri="{BB962C8B-B14F-4D97-AF65-F5344CB8AC3E}">
-        <p14:creationId xmlns:p14="http://schemas.microsoft.com/office/powerpoint/2010/main" val="675978995"/>
-      </p:ext>
-    </p:extLst>
-  </p:cSld>
-  <p:clrMapOvr>
-    <a:masterClrMapping/>
-  </p:clrMapOvr>
-</p:sld>
-</file>
-
 <file path=ppt/slides/slide5.xml><?xml version="1.0" encoding="utf-8"?>
 <p:sld xmlns:a="http://schemas.openxmlformats.org/drawingml/2006/main" xmlns:r="http://schemas.openxmlformats.org/officeDocument/2006/relationships" xmlns:p="http://schemas.openxmlformats.org/presentationml/2006/main">
   <p:cSld>
@@ -15229,77 +16364,46 @@
           <a:p>
             <a:r>
               <a:rPr lang="en-US" sz="3600" dirty="0"/>
-              <a:t>Why make things Accessible?</a:t>
-            </a:r>
-          </a:p>
-        </p:txBody>
-      </p:sp>
-      <p:sp>
-        <p:nvSpPr>
-          <p:cNvPr id="4" name="Content Placeholder 3">
+              <a:t>What is Accessibility - Continued</a:t>
+            </a:r>
+          </a:p>
+        </p:txBody>
+      </p:sp>
+      <p:graphicFrame>
+        <p:nvGraphicFramePr>
+          <p:cNvPr id="6" name="Content Placeholder 2" descr="Example Accessibility Categories and subcategories">
             <a:extLst>
               <a:ext uri="{FF2B5EF4-FFF2-40B4-BE49-F238E27FC236}">
-                <a16:creationId xmlns:a16="http://schemas.microsoft.com/office/drawing/2014/main" id="{7FC6A545-C8D8-62C0-B240-12747FBCDEDE}"/>
+                <a16:creationId xmlns:a16="http://schemas.microsoft.com/office/drawing/2014/main" id="{FA820D58-D4E6-FBFE-77ED-DD49F7FAC9D2}"/>
               </a:ext>
             </a:extLst>
           </p:cNvPr>
-          <p:cNvSpPr>
-            <a:spLocks noGrp="1"/>
-          </p:cNvSpPr>
+          <p:cNvGraphicFramePr>
+            <a:graphicFrameLocks noGrp="1"/>
+          </p:cNvGraphicFramePr>
           <p:nvPr>
             <p:ph idx="1"/>
-          </p:nvPr>
-        </p:nvSpPr>
-        <p:spPr/>
-        <p:txBody>
-          <a:bodyPr>
-            <a:normAutofit/>
-          </a:bodyPr>
-          <a:lstStyle/>
-          <a:p>
-            <a:r>
-              <a:rPr lang="en-US" dirty="0"/>
-              <a:t>Because it is the right thing to do</a:t>
-            </a:r>
-          </a:p>
-          <a:p>
-            <a:r>
-              <a:rPr lang="en-US" dirty="0"/>
-              <a:t>Better retention of employees and customers</a:t>
-            </a:r>
-          </a:p>
-          <a:p>
-            <a:r>
-              <a:rPr lang="en-US"/>
-              <a:t>More likely to be innovative</a:t>
-            </a:r>
-          </a:p>
-          <a:p>
-            <a:r>
-              <a:rPr lang="en-US"/>
-              <a:t>Don’t </a:t>
-            </a:r>
-            <a:r>
-              <a:rPr lang="en-US" dirty="0"/>
-              <a:t>miss out on the market</a:t>
-            </a:r>
-          </a:p>
-          <a:p>
-            <a:pPr lvl="1"/>
-            <a:r>
-              <a:rPr lang="en-US" dirty="0">
-                <a:hlinkClick r:id="rId3"/>
-              </a:rPr>
-              <a:t>A Hidden Market: The Purchasing Power of Working-Age Adults With Disabilities | American Institutes for Research (air.org)</a:t>
-            </a:r>
-            <a:endParaRPr lang="en-US" dirty="0"/>
-          </a:p>
-        </p:txBody>
-      </p:sp>
+            <p:extLst>
+              <p:ext uri="{D42A27DB-BD31-4B8C-83A1-F6EECF244321}">
+                <p14:modId xmlns:p14="http://schemas.microsoft.com/office/powerpoint/2010/main" val="3473438812"/>
+              </p:ext>
+            </p:extLst>
+          </p:nvPr>
+        </p:nvGraphicFramePr>
+        <p:xfrm>
+          <a:off x="685801" y="2243138"/>
+          <a:ext cx="10820400" cy="3340100"/>
+        </p:xfrm>
+        <a:graphic>
+          <a:graphicData uri="http://schemas.openxmlformats.org/drawingml/2006/diagram">
+            <dgm:relIds xmlns:dgm="http://schemas.openxmlformats.org/drawingml/2006/diagram" xmlns:r="http://schemas.openxmlformats.org/officeDocument/2006/relationships" r:dm="rId2" r:lo="rId3" r:qs="rId4" r:cs="rId5"/>
+          </a:graphicData>
+        </a:graphic>
+      </p:graphicFrame>
     </p:spTree>
     <p:extLst>
       <p:ext uri="{BB962C8B-B14F-4D97-AF65-F5344CB8AC3E}">
-        <p14:creationId xmlns:p14="http://schemas.microsoft.com/office/powerpoint/2010/main" val="2528127634"/>
+        <p14:creationId xmlns:p14="http://schemas.microsoft.com/office/powerpoint/2010/main" val="675978995"/>
       </p:ext>
     </p:extLst>
   </p:cSld>
@@ -15356,17 +16460,17 @@
           <a:p>
             <a:r>
               <a:rPr lang="en-US" sz="3600" dirty="0"/>
-              <a:t>How do we decide what is Accessible?</a:t>
-            </a:r>
-          </a:p>
-        </p:txBody>
-      </p:sp>
-      <p:sp>
-        <p:nvSpPr>
-          <p:cNvPr id="3" name="Content Placeholder 2">
+              <a:t>Why make things Accessible?</a:t>
+            </a:r>
+          </a:p>
+        </p:txBody>
+      </p:sp>
+      <p:sp>
+        <p:nvSpPr>
+          <p:cNvPr id="4" name="Content Placeholder 3">
             <a:extLst>
               <a:ext uri="{FF2B5EF4-FFF2-40B4-BE49-F238E27FC236}">
-                <a16:creationId xmlns:a16="http://schemas.microsoft.com/office/drawing/2014/main" id="{7829BE99-CC9F-E89F-67D7-DD0AF66AC11A}"/>
+                <a16:creationId xmlns:a16="http://schemas.microsoft.com/office/drawing/2014/main" id="{7FC6A545-C8D8-62C0-B240-12747FBCDEDE}"/>
               </a:ext>
             </a:extLst>
           </p:cNvPr>
@@ -15377,114 +16481,71 @@
             <p:ph idx="1"/>
           </p:nvPr>
         </p:nvSpPr>
-        <p:spPr>
-          <a:xfrm>
-            <a:off x="685800" y="1845733"/>
-            <a:ext cx="10820400" cy="4792134"/>
-          </a:xfrm>
-        </p:spPr>
+        <p:spPr/>
         <p:txBody>
           <a:bodyPr>
             <a:normAutofit/>
           </a:bodyPr>
           <a:lstStyle/>
           <a:p>
-            <a:endParaRPr lang="en-US" b="1" dirty="0"/>
-          </a:p>
-          <a:p>
-            <a:r>
-              <a:rPr lang="en-US" b="1" dirty="0"/>
-              <a:t>Regulations</a:t>
+            <a:r>
+              <a:rPr lang="en-US" dirty="0"/>
+              <a:t>Because it is the right thing to do</a:t>
+            </a:r>
+          </a:p>
+          <a:p>
+            <a:r>
+              <a:rPr lang="en-US" dirty="0"/>
+              <a:t>Better retention of employees and customers</a:t>
+            </a:r>
+          </a:p>
+          <a:p>
+            <a:r>
+              <a:rPr lang="en-US" dirty="0"/>
+              <a:t>More likely to be innovative</a:t>
+            </a:r>
+          </a:p>
+          <a:p>
+            <a:r>
+              <a:rPr lang="en-US" dirty="0"/>
+              <a:t>Don’t miss out on the market</a:t>
             </a:r>
           </a:p>
           <a:p>
             <a:pPr lvl="1"/>
             <a:r>
-              <a:rPr lang="en-US" dirty="0"/>
-              <a:t>Americans with Disabilities Act (ADA)</a:t>
-            </a:r>
-          </a:p>
-          <a:p>
-            <a:pPr lvl="1"/>
-            <a:r>
-              <a:rPr lang="en-US" dirty="0"/>
-              <a:t>Section 508 of the Rehabilitation Act of 1973</a:t>
-            </a:r>
-          </a:p>
-          <a:p>
-            <a:pPr lvl="1"/>
-            <a:r>
-              <a:rPr lang="en-US" dirty="0"/>
-              <a:t>Accessibility for Ontarians Act (AODA)</a:t>
-            </a:r>
-          </a:p>
-          <a:p>
-            <a:pPr lvl="1"/>
-            <a:r>
-              <a:rPr lang="en-US" dirty="0"/>
-              <a:t>Learn more at: </a:t>
-            </a:r>
-            <a:r>
               <a:rPr lang="en-US" dirty="0">
-                <a:hlinkClick r:id="rId3"/>
+                <a:solidFill>
+                  <a:schemeClr val="accent6">
+                    <a:lumMod val="60000"/>
+                    <a:lumOff val="40000"/>
+                  </a:schemeClr>
+                </a:solidFill>
+                <a:hlinkClick r:id="rId3">
+                  <a:extLst>
+                    <a:ext uri="{A12FA001-AC4F-418D-AE19-62706E023703}">
+                      <ahyp:hlinkClr xmlns:ahyp="http://schemas.microsoft.com/office/drawing/2018/hyperlinkcolor" val="tx"/>
+                    </a:ext>
+                  </a:extLst>
+                </a:hlinkClick>
               </a:rPr>
-              <a:t>Web Accessibility Laws &amp; Policies | Web Accessibility Initiative (WAI) | W3C</a:t>
-            </a:r>
-            <a:endParaRPr lang="en-US" dirty="0"/>
-          </a:p>
-          <a:p>
-            <a:r>
-              <a:rPr lang="en-US" b="1" dirty="0"/>
-              <a:t>Guidelines</a:t>
-            </a:r>
-          </a:p>
-          <a:p>
-            <a:pPr lvl="1"/>
-            <a:r>
-              <a:rPr lang="en-US" dirty="0"/>
-              <a:t>Web Content Accessibility Guidelines (WCAG)</a:t>
-            </a:r>
-          </a:p>
-          <a:p>
-            <a:pPr lvl="1"/>
-            <a:r>
-              <a:rPr lang="en-US" dirty="0"/>
-              <a:t>Authoring Tools Accessibility Guidelines (ATAG)</a:t>
-            </a:r>
-          </a:p>
-          <a:p>
-            <a:pPr lvl="1"/>
-            <a:r>
-              <a:rPr lang="en-US" dirty="0"/>
-              <a:t>User Agent Accessibility Guidelines (UAAG)</a:t>
-            </a:r>
-          </a:p>
-          <a:p>
-            <a:pPr lvl="1"/>
-            <a:r>
-              <a:rPr lang="en-US" dirty="0"/>
-              <a:t>Accessible Rich Internet Applications (ARIA)</a:t>
-            </a:r>
-          </a:p>
-          <a:p>
-            <a:pPr lvl="1"/>
-            <a:r>
-              <a:rPr lang="en-US" dirty="0"/>
-              <a:t>Accessible Electronic Documents Community of Practice (AED COP)</a:t>
-            </a:r>
-          </a:p>
-          <a:p>
-            <a:pPr marL="457200" lvl="1" indent="0">
-              <a:buNone/>
-            </a:pPr>
-            <a:endParaRPr lang="en-US" dirty="0"/>
+              <a:t>A Hidden Market: The Purchasing Power of Working-Age Adults With Disabilities | American Institutes for Research (air.org)</a:t>
+            </a:r>
+            <a:endParaRPr lang="en-US" dirty="0">
+              <a:solidFill>
+                <a:schemeClr val="accent6">
+                  <a:lumMod val="60000"/>
+                  <a:lumOff val="40000"/>
+                </a:schemeClr>
+              </a:solidFill>
+            </a:endParaRPr>
           </a:p>
         </p:txBody>
       </p:sp>
     </p:spTree>
     <p:extLst>
       <p:ext uri="{BB962C8B-B14F-4D97-AF65-F5344CB8AC3E}">
-        <p14:creationId xmlns:p14="http://schemas.microsoft.com/office/powerpoint/2010/main" val="2878205625"/>
+        <p14:creationId xmlns:p14="http://schemas.microsoft.com/office/powerpoint/2010/main" val="2528127634"/>
       </p:ext>
     </p:extLst>
   </p:cSld>
@@ -15541,7 +16602,7 @@
           <a:p>
             <a:r>
               <a:rPr lang="en-US" sz="3600" dirty="0"/>
-              <a:t>Building Accessibility Test Plans</a:t>
+              <a:t>How do we decide what is Accessible?</a:t>
             </a:r>
           </a:p>
         </p:txBody>
@@ -15570,6 +16631,210 @@
         </p:spPr>
         <p:txBody>
           <a:bodyPr>
+            <a:normAutofit/>
+          </a:bodyPr>
+          <a:lstStyle/>
+          <a:p>
+            <a:endParaRPr lang="en-US" b="1" dirty="0"/>
+          </a:p>
+          <a:p>
+            <a:r>
+              <a:rPr lang="en-US" b="1" dirty="0"/>
+              <a:t>Regulations</a:t>
+            </a:r>
+          </a:p>
+          <a:p>
+            <a:pPr lvl="1"/>
+            <a:r>
+              <a:rPr lang="en-US" dirty="0"/>
+              <a:t>Americans with Disabilities Act (ADA)</a:t>
+            </a:r>
+          </a:p>
+          <a:p>
+            <a:pPr lvl="1"/>
+            <a:r>
+              <a:rPr lang="en-US" dirty="0"/>
+              <a:t>Section 508 of the Rehabilitation Act of 1973</a:t>
+            </a:r>
+          </a:p>
+          <a:p>
+            <a:pPr lvl="1"/>
+            <a:r>
+              <a:rPr lang="en-US" dirty="0"/>
+              <a:t>Accessibility for Ontarians Act (AODA)</a:t>
+            </a:r>
+          </a:p>
+          <a:p>
+            <a:pPr lvl="1"/>
+            <a:r>
+              <a:rPr lang="en-US" dirty="0"/>
+              <a:t>Learn more at: </a:t>
+            </a:r>
+            <a:r>
+              <a:rPr lang="en-US" dirty="0">
+                <a:solidFill>
+                  <a:schemeClr val="accent6">
+                    <a:lumMod val="60000"/>
+                    <a:lumOff val="40000"/>
+                  </a:schemeClr>
+                </a:solidFill>
+                <a:hlinkClick r:id="rId3">
+                  <a:extLst>
+                    <a:ext uri="{A12FA001-AC4F-418D-AE19-62706E023703}">
+                      <ahyp:hlinkClr xmlns:ahyp="http://schemas.microsoft.com/office/drawing/2018/hyperlinkcolor" val="tx"/>
+                    </a:ext>
+                  </a:extLst>
+                </a:hlinkClick>
+              </a:rPr>
+              <a:t>Web Accessibility Laws &amp; Policies | Web Accessibility Initiative (WAI) | W3C</a:t>
+            </a:r>
+            <a:endParaRPr lang="en-US" dirty="0">
+              <a:solidFill>
+                <a:schemeClr val="accent6">
+                  <a:lumMod val="60000"/>
+                  <a:lumOff val="40000"/>
+                </a:schemeClr>
+              </a:solidFill>
+            </a:endParaRPr>
+          </a:p>
+          <a:p>
+            <a:r>
+              <a:rPr lang="en-US" b="1" dirty="0"/>
+              <a:t>Guidelines</a:t>
+            </a:r>
+          </a:p>
+          <a:p>
+            <a:pPr lvl="1"/>
+            <a:r>
+              <a:rPr lang="en-US" dirty="0"/>
+              <a:t>Web Content Accessibility Guidelines (WCAG)</a:t>
+            </a:r>
+          </a:p>
+          <a:p>
+            <a:pPr lvl="1"/>
+            <a:r>
+              <a:rPr lang="en-US" dirty="0"/>
+              <a:t>Authoring Tools Accessibility Guidelines (ATAG)</a:t>
+            </a:r>
+          </a:p>
+          <a:p>
+            <a:pPr lvl="1"/>
+            <a:r>
+              <a:rPr lang="en-US" dirty="0"/>
+              <a:t>User Agent Accessibility Guidelines (UAAG)</a:t>
+            </a:r>
+          </a:p>
+          <a:p>
+            <a:pPr lvl="1"/>
+            <a:r>
+              <a:rPr lang="en-US" dirty="0"/>
+              <a:t>Accessible Rich Internet Applications (ARIA)</a:t>
+            </a:r>
+          </a:p>
+          <a:p>
+            <a:pPr lvl="1"/>
+            <a:r>
+              <a:rPr lang="en-US" dirty="0"/>
+              <a:t>Accessible Electronic Documents Community of Practice (AED COP)</a:t>
+            </a:r>
+          </a:p>
+          <a:p>
+            <a:pPr marL="457200" lvl="1" indent="0">
+              <a:buNone/>
+            </a:pPr>
+            <a:endParaRPr lang="en-US" dirty="0"/>
+          </a:p>
+        </p:txBody>
+      </p:sp>
+    </p:spTree>
+    <p:extLst>
+      <p:ext uri="{BB962C8B-B14F-4D97-AF65-F5344CB8AC3E}">
+        <p14:creationId xmlns:p14="http://schemas.microsoft.com/office/powerpoint/2010/main" val="2878205625"/>
+      </p:ext>
+    </p:extLst>
+  </p:cSld>
+  <p:clrMapOvr>
+    <a:masterClrMapping/>
+  </p:clrMapOvr>
+</p:sld>
+</file>
+
+<file path=ppt/slides/slide8.xml><?xml version="1.0" encoding="utf-8"?>
+<p:sld xmlns:a="http://schemas.openxmlformats.org/drawingml/2006/main" xmlns:r="http://schemas.openxmlformats.org/officeDocument/2006/relationships" xmlns:p="http://schemas.openxmlformats.org/presentationml/2006/main">
+  <p:cSld>
+    <p:spTree>
+      <p:nvGrpSpPr>
+        <p:cNvPr id="1" name=""/>
+        <p:cNvGrpSpPr/>
+        <p:nvPr/>
+      </p:nvGrpSpPr>
+      <p:grpSpPr>
+        <a:xfrm>
+          <a:off x="0" y="0"/>
+          <a:ext cx="0" cy="0"/>
+          <a:chOff x="0" y="0"/>
+          <a:chExt cx="0" cy="0"/>
+        </a:xfrm>
+      </p:grpSpPr>
+      <p:sp>
+        <p:nvSpPr>
+          <p:cNvPr id="2" name="Title 1">
+            <a:extLst>
+              <a:ext uri="{FF2B5EF4-FFF2-40B4-BE49-F238E27FC236}">
+                <a16:creationId xmlns:a16="http://schemas.microsoft.com/office/drawing/2014/main" id="{BFBE0A40-EF52-730B-174C-8DEE5AF23CE4}"/>
+              </a:ext>
+            </a:extLst>
+          </p:cNvPr>
+          <p:cNvSpPr>
+            <a:spLocks noGrp="1"/>
+          </p:cNvSpPr>
+          <p:nvPr>
+            <p:ph type="title"/>
+          </p:nvPr>
+        </p:nvSpPr>
+        <p:spPr>
+          <a:xfrm>
+            <a:off x="1" y="764373"/>
+            <a:ext cx="11506200" cy="1293028"/>
+          </a:xfrm>
+        </p:spPr>
+        <p:txBody>
+          <a:bodyPr>
+            <a:normAutofit/>
+          </a:bodyPr>
+          <a:lstStyle/>
+          <a:p>
+            <a:r>
+              <a:rPr lang="en-US" sz="3600" dirty="0"/>
+              <a:t>Building Accessibility Test Plans</a:t>
+            </a:r>
+          </a:p>
+        </p:txBody>
+      </p:sp>
+      <p:sp>
+        <p:nvSpPr>
+          <p:cNvPr id="3" name="Content Placeholder 2">
+            <a:extLst>
+              <a:ext uri="{FF2B5EF4-FFF2-40B4-BE49-F238E27FC236}">
+                <a16:creationId xmlns:a16="http://schemas.microsoft.com/office/drawing/2014/main" id="{7829BE99-CC9F-E89F-67D7-DD0AF66AC11A}"/>
+              </a:ext>
+            </a:extLst>
+          </p:cNvPr>
+          <p:cNvSpPr>
+            <a:spLocks noGrp="1"/>
+          </p:cNvSpPr>
+          <p:nvPr>
+            <p:ph idx="1"/>
+          </p:nvPr>
+        </p:nvSpPr>
+        <p:spPr>
+          <a:xfrm>
+            <a:off x="685800" y="1845733"/>
+            <a:ext cx="10820400" cy="4792134"/>
+          </a:xfrm>
+        </p:spPr>
+        <p:txBody>
+          <a:bodyPr>
             <a:noAutofit/>
           </a:bodyPr>
           <a:lstStyle/>
@@ -15636,7 +16901,19 @@
             <a:pPr lvl="1"/>
             <a:r>
               <a:rPr lang="en-US" sz="1800" b="1" dirty="0">
-                <a:hlinkClick r:id="rId3"/>
+                <a:solidFill>
+                  <a:schemeClr val="accent6">
+                    <a:lumMod val="60000"/>
+                    <a:lumOff val="40000"/>
+                  </a:schemeClr>
+                </a:solidFill>
+                <a:hlinkClick r:id="rId3">
+                  <a:extLst>
+                    <a:ext uri="{A12FA001-AC4F-418D-AE19-62706E023703}">
+                      <ahyp:hlinkClr xmlns:ahyp="http://schemas.microsoft.com/office/drawing/2018/hyperlinkcolor" val="tx"/>
+                    </a:ext>
+                  </a:extLst>
+                </a:hlinkClick>
               </a:rPr>
               <a:t>VGAR</a:t>
             </a:r>
@@ -15649,7 +16926,19 @@
             <a:pPr lvl="1"/>
             <a:r>
               <a:rPr lang="en-US" sz="1800" b="1" dirty="0">
-                <a:hlinkClick r:id="rId4"/>
+                <a:solidFill>
+                  <a:schemeClr val="accent6">
+                    <a:lumMod val="60000"/>
+                    <a:lumOff val="40000"/>
+                  </a:schemeClr>
+                </a:solidFill>
+                <a:hlinkClick r:id="rId4">
+                  <a:extLst>
+                    <a:ext uri="{A12FA001-AC4F-418D-AE19-62706E023703}">
+                      <ahyp:hlinkClr xmlns:ahyp="http://schemas.microsoft.com/office/drawing/2018/hyperlinkcolor" val="tx"/>
+                    </a:ext>
+                  </a:extLst>
+                </a:hlinkClick>
               </a:rPr>
               <a:t>Section 508 ICT Testing Baseline for Web</a:t>
             </a:r>
@@ -15673,7 +16962,7 @@
 </p:sld>
 </file>
 
-<file path=ppt/slides/slide8.xml><?xml version="1.0" encoding="utf-8"?>
+<file path=ppt/slides/slide9.xml><?xml version="1.0" encoding="utf-8"?>
 <p:sld xmlns:a="http://schemas.openxmlformats.org/drawingml/2006/main" xmlns:r="http://schemas.openxmlformats.org/officeDocument/2006/relationships" xmlns:p="http://schemas.openxmlformats.org/presentationml/2006/main">
   <p:cSld>
     <p:spTree>
@@ -15794,153 +17083,6 @@
     <p:extLst>
       <p:ext uri="{BB962C8B-B14F-4D97-AF65-F5344CB8AC3E}">
         <p14:creationId xmlns:p14="http://schemas.microsoft.com/office/powerpoint/2010/main" val="3298386697"/>
-      </p:ext>
-    </p:extLst>
-  </p:cSld>
-  <p:clrMapOvr>
-    <a:masterClrMapping/>
-  </p:clrMapOvr>
-</p:sld>
-</file>
-
-<file path=ppt/slides/slide9.xml><?xml version="1.0" encoding="utf-8"?>
-<p:sld xmlns:a="http://schemas.openxmlformats.org/drawingml/2006/main" xmlns:r="http://schemas.openxmlformats.org/officeDocument/2006/relationships" xmlns:p="http://schemas.openxmlformats.org/presentationml/2006/main">
-  <p:cSld>
-    <p:spTree>
-      <p:nvGrpSpPr>
-        <p:cNvPr id="1" name=""/>
-        <p:cNvGrpSpPr/>
-        <p:nvPr/>
-      </p:nvGrpSpPr>
-      <p:grpSpPr>
-        <a:xfrm>
-          <a:off x="0" y="0"/>
-          <a:ext cx="0" cy="0"/>
-          <a:chOff x="0" y="0"/>
-          <a:chExt cx="0" cy="0"/>
-        </a:xfrm>
-      </p:grpSpPr>
-      <p:sp>
-        <p:nvSpPr>
-          <p:cNvPr id="2" name="Title 1">
-            <a:extLst>
-              <a:ext uri="{FF2B5EF4-FFF2-40B4-BE49-F238E27FC236}">
-                <a16:creationId xmlns:a16="http://schemas.microsoft.com/office/drawing/2014/main" id="{BFBE0A40-EF52-730B-174C-8DEE5AF23CE4}"/>
-              </a:ext>
-            </a:extLst>
-          </p:cNvPr>
-          <p:cNvSpPr>
-            <a:spLocks noGrp="1"/>
-          </p:cNvSpPr>
-          <p:nvPr>
-            <p:ph type="title"/>
-          </p:nvPr>
-        </p:nvSpPr>
-        <p:spPr>
-          <a:xfrm>
-            <a:off x="1" y="764373"/>
-            <a:ext cx="11506200" cy="1293028"/>
-          </a:xfrm>
-        </p:spPr>
-        <p:txBody>
-          <a:bodyPr/>
-          <a:lstStyle/>
-          <a:p>
-            <a:r>
-              <a:rPr lang="en-US" dirty="0"/>
-              <a:t>Tools and resources</a:t>
-            </a:r>
-            <a:br>
-              <a:rPr lang="en-US" dirty="0"/>
-            </a:br>
-            <a:r>
-              <a:rPr lang="en-US" sz="1800" dirty="0"/>
-              <a:t>Built-In to Operating System</a:t>
-            </a:r>
-          </a:p>
-        </p:txBody>
-      </p:sp>
-      <p:pic>
-        <p:nvPicPr>
-          <p:cNvPr id="5" name="Picture 4" descr="Windows Accessibility settings window with options to alter the visual appearance of windows, change audio settings, and change certain interaction behaviors to better suite your needs.">
-            <a:extLst>
-              <a:ext uri="{FF2B5EF4-FFF2-40B4-BE49-F238E27FC236}">
-                <a16:creationId xmlns:a16="http://schemas.microsoft.com/office/drawing/2014/main" id="{33F6C664-202A-B087-D96B-10F8E817CD86}"/>
-              </a:ext>
-            </a:extLst>
-          </p:cNvPr>
-          <p:cNvPicPr>
-            <a:picLocks noChangeAspect="1"/>
-          </p:cNvPicPr>
-          <p:nvPr/>
-        </p:nvPicPr>
-        <p:blipFill>
-          <a:blip r:embed="rId3"/>
-          <a:stretch>
-            <a:fillRect/>
-          </a:stretch>
-        </p:blipFill>
-        <p:spPr>
-          <a:xfrm>
-            <a:off x="685799" y="1789022"/>
-            <a:ext cx="6028350" cy="4684259"/>
-          </a:xfrm>
-          <a:prstGeom prst="rect">
-            <a:avLst/>
-          </a:prstGeom>
-        </p:spPr>
-      </p:pic>
-      <p:pic>
-        <p:nvPicPr>
-          <p:cNvPr id="1028" name="Picture 4" descr="MacOS Accessibility Shortcuts divided up into categories for vision, motor, and hearing.">
-            <a:extLst>
-              <a:ext uri="{FF2B5EF4-FFF2-40B4-BE49-F238E27FC236}">
-                <a16:creationId xmlns:a16="http://schemas.microsoft.com/office/drawing/2014/main" id="{801FDBB5-D9E9-3474-A1D1-27EEF42F9C3B}"/>
-              </a:ext>
-            </a:extLst>
-          </p:cNvPr>
-          <p:cNvPicPr>
-            <a:picLocks noChangeAspect="1" noChangeArrowheads="1"/>
-          </p:cNvPicPr>
-          <p:nvPr/>
-        </p:nvPicPr>
-        <p:blipFill>
-          <a:blip r:embed="rId4">
-            <a:extLst>
-              <a:ext uri="{28A0092B-C50C-407E-A947-70E740481C1C}">
-                <a14:useLocalDpi xmlns:a14="http://schemas.microsoft.com/office/drawing/2010/main" val="0"/>
-              </a:ext>
-            </a:extLst>
-          </a:blip>
-          <a:srcRect/>
-          <a:stretch>
-            <a:fillRect/>
-          </a:stretch>
-        </p:blipFill>
-        <p:spPr bwMode="auto">
-          <a:xfrm>
-            <a:off x="7615646" y="2017225"/>
-            <a:ext cx="2399256" cy="4456056"/>
-          </a:xfrm>
-          <a:prstGeom prst="rect">
-            <a:avLst/>
-          </a:prstGeom>
-          <a:noFill/>
-          <a:extLst>
-            <a:ext uri="{909E8E84-426E-40DD-AFC4-6F175D3DCCD1}">
-              <a14:hiddenFill xmlns:a14="http://schemas.microsoft.com/office/drawing/2010/main">
-                <a:solidFill>
-                  <a:srgbClr val="FFFFFF"/>
-                </a:solidFill>
-              </a14:hiddenFill>
-            </a:ext>
-          </a:extLst>
-        </p:spPr>
-      </p:pic>
-    </p:spTree>
-    <p:extLst>
-      <p:ext uri="{BB962C8B-B14F-4D97-AF65-F5344CB8AC3E}">
-        <p14:creationId xmlns:p14="http://schemas.microsoft.com/office/powerpoint/2010/main" val="941048227"/>
       </p:ext>
     </p:extLst>
   </p:cSld>

</xml_diff>